<commit_message>
Suite du diaporama de soutenance
</commit_message>
<xml_diff>
--- a/Documents/diaporama_soutenance.pptx
+++ b/Documents/diaporama_soutenance.pptx
@@ -111,6 +111,11 @@
       </a:defRPr>
     </a:lvl9pPr>
   </p:defaultTextStyle>
+  <p:extLst>
+    <p:ext uri="{EFAFB233-063F-42B5-8137-9DF3F51BA10A}">
+      <p15:sldGuideLst xmlns:p15="http://schemas.microsoft.com/office/powerpoint/2012/main"/>
+    </p:ext>
+  </p:extLst>
 </p:presentation>
 </file>
 
@@ -171,7 +176,7 @@
           <a:noFill/>
           <a:extLst>
             <a:ext uri="{909E8E84-426E-40dd-AFC4-6F175D3DCCD1}">
-              <a14:hiddenFill xmlns:a14="http://schemas.microsoft.com/office/drawing/2010/main" xmlns="">
+              <a14:hiddenFill xmlns="" xmlns:a14="http://schemas.microsoft.com/office/drawing/2010/main">
                 <a:solidFill>
                   <a:srgbClr val="FFFFFF"/>
                 </a:solidFill>
@@ -230,7 +235,7 @@
             </a:ln>
             <a:extLst>
               <a:ext uri="{91240B29-F687-4f45-9708-019B960494DF}">
-                <a14:hiddenLine xmlns:a14="http://schemas.microsoft.com/office/drawing/2010/main" xmlns="" w="9525">
+                <a14:hiddenLine xmlns="" xmlns:a14="http://schemas.microsoft.com/office/drawing/2010/main" w="9525">
                   <a:solidFill>
                     <a:srgbClr val="000000"/>
                   </a:solidFill>
@@ -320,7 +325,7 @@
             </a:ln>
             <a:extLst>
               <a:ext uri="{91240B29-F687-4f45-9708-019B960494DF}">
-                <a14:hiddenLine xmlns:a14="http://schemas.microsoft.com/office/drawing/2010/main" xmlns="" w="9525">
+                <a14:hiddenLine xmlns="" xmlns:a14="http://schemas.microsoft.com/office/drawing/2010/main" w="9525">
                   <a:solidFill>
                     <a:srgbClr val="000000"/>
                   </a:solidFill>
@@ -410,7 +415,7 @@
             </a:ln>
             <a:extLst>
               <a:ext uri="{91240B29-F687-4f45-9708-019B960494DF}">
-                <a14:hiddenLine xmlns:a14="http://schemas.microsoft.com/office/drawing/2010/main" xmlns="" w="9525">
+                <a14:hiddenLine xmlns="" xmlns:a14="http://schemas.microsoft.com/office/drawing/2010/main" w="9525">
                   <a:solidFill>
                     <a:srgbClr val="000000"/>
                   </a:solidFill>
@@ -444,7 +449,7 @@
             </a:ln>
             <a:extLst>
               <a:ext uri="{91240B29-F687-4f45-9708-019B960494DF}">
-                <a14:hiddenLine xmlns:a14="http://schemas.microsoft.com/office/drawing/2010/main" xmlns="" w="9525">
+                <a14:hiddenLine xmlns="" xmlns:a14="http://schemas.microsoft.com/office/drawing/2010/main" w="9525">
                   <a:solidFill>
                     <a:srgbClr val="000000"/>
                   </a:solidFill>
@@ -534,7 +539,7 @@
             </a:ln>
             <a:extLst>
               <a:ext uri="{91240B29-F687-4f45-9708-019B960494DF}">
-                <a14:hiddenLine xmlns:a14="http://schemas.microsoft.com/office/drawing/2010/main" xmlns="" w="9525">
+                <a14:hiddenLine xmlns="" xmlns:a14="http://schemas.microsoft.com/office/drawing/2010/main" w="9525">
                   <a:solidFill>
                     <a:srgbClr val="000000"/>
                   </a:solidFill>
@@ -596,7 +601,7 @@
             </a:ln>
             <a:extLst>
               <a:ext uri="{91240B29-F687-4f45-9708-019B960494DF}">
-                <a14:hiddenLine xmlns:a14="http://schemas.microsoft.com/office/drawing/2010/main" xmlns="" w="9525">
+                <a14:hiddenLine xmlns="" xmlns:a14="http://schemas.microsoft.com/office/drawing/2010/main" w="9525">
                   <a:solidFill>
                     <a:srgbClr val="000000"/>
                   </a:solidFill>
@@ -658,7 +663,7 @@
             </a:ln>
             <a:extLst>
               <a:ext uri="{91240B29-F687-4f45-9708-019B960494DF}">
-                <a14:hiddenLine xmlns:a14="http://schemas.microsoft.com/office/drawing/2010/main" xmlns="" w="9525">
+                <a14:hiddenLine xmlns="" xmlns:a14="http://schemas.microsoft.com/office/drawing/2010/main" w="9525">
                   <a:solidFill>
                     <a:srgbClr val="000000"/>
                   </a:solidFill>
@@ -748,7 +753,7 @@
             </a:ln>
             <a:extLst>
               <a:ext uri="{91240B29-F687-4f45-9708-019B960494DF}">
-                <a14:hiddenLine xmlns:a14="http://schemas.microsoft.com/office/drawing/2010/main" xmlns="" w="9525">
+                <a14:hiddenLine xmlns="" xmlns:a14="http://schemas.microsoft.com/office/drawing/2010/main" w="9525">
                   <a:solidFill>
                     <a:srgbClr val="000000"/>
                   </a:solidFill>
@@ -810,7 +815,7 @@
             </a:ln>
             <a:extLst>
               <a:ext uri="{91240B29-F687-4f45-9708-019B960494DF}">
-                <a14:hiddenLine xmlns:a14="http://schemas.microsoft.com/office/drawing/2010/main" xmlns="" w="9525">
+                <a14:hiddenLine xmlns="" xmlns:a14="http://schemas.microsoft.com/office/drawing/2010/main" w="9525">
                   <a:solidFill>
                     <a:srgbClr val="000000"/>
                   </a:solidFill>
@@ -872,7 +877,7 @@
             </a:ln>
             <a:extLst>
               <a:ext uri="{91240B29-F687-4f45-9708-019B960494DF}">
-                <a14:hiddenLine xmlns:a14="http://schemas.microsoft.com/office/drawing/2010/main" xmlns="" w="9525">
+                <a14:hiddenLine xmlns="" xmlns:a14="http://schemas.microsoft.com/office/drawing/2010/main" w="9525">
                   <a:solidFill>
                     <a:srgbClr val="000000"/>
                   </a:solidFill>
@@ -962,7 +967,7 @@
             </a:ln>
             <a:extLst>
               <a:ext uri="{91240B29-F687-4f45-9708-019B960494DF}">
-                <a14:hiddenLine xmlns:a14="http://schemas.microsoft.com/office/drawing/2010/main" xmlns="" w="9525">
+                <a14:hiddenLine xmlns="" xmlns:a14="http://schemas.microsoft.com/office/drawing/2010/main" w="9525">
                   <a:solidFill>
                     <a:srgbClr val="000000"/>
                   </a:solidFill>
@@ -1052,7 +1057,7 @@
             </a:ln>
             <a:extLst>
               <a:ext uri="{91240B29-F687-4f45-9708-019B960494DF}">
-                <a14:hiddenLine xmlns:a14="http://schemas.microsoft.com/office/drawing/2010/main" xmlns="" w="9525">
+                <a14:hiddenLine xmlns="" xmlns:a14="http://schemas.microsoft.com/office/drawing/2010/main" w="9525">
                   <a:solidFill>
                     <a:srgbClr val="000000"/>
                   </a:solidFill>
@@ -1114,7 +1119,7 @@
             </a:ln>
             <a:extLst>
               <a:ext uri="{91240B29-F687-4f45-9708-019B960494DF}">
-                <a14:hiddenLine xmlns:a14="http://schemas.microsoft.com/office/drawing/2010/main" xmlns="" w="9525">
+                <a14:hiddenLine xmlns="" xmlns:a14="http://schemas.microsoft.com/office/drawing/2010/main" w="9525">
                   <a:solidFill>
                     <a:srgbClr val="000000"/>
                   </a:solidFill>
@@ -1224,7 +1229,7 @@
             </a:ln>
             <a:extLst>
               <a:ext uri="{91240B29-F687-4f45-9708-019B960494DF}">
-                <a14:hiddenLine xmlns:a14="http://schemas.microsoft.com/office/drawing/2010/main" xmlns="" w="9525">
+                <a14:hiddenLine xmlns="" xmlns:a14="http://schemas.microsoft.com/office/drawing/2010/main" w="9525">
                   <a:solidFill>
                     <a:srgbClr val="000000"/>
                   </a:solidFill>
@@ -1286,7 +1291,7 @@
             </a:ln>
             <a:extLst>
               <a:ext uri="{91240B29-F687-4f45-9708-019B960494DF}">
-                <a14:hiddenLine xmlns:a14="http://schemas.microsoft.com/office/drawing/2010/main" xmlns="" w="9525">
+                <a14:hiddenLine xmlns="" xmlns:a14="http://schemas.microsoft.com/office/drawing/2010/main" w="9525">
                   <a:solidFill>
                     <a:srgbClr val="000000"/>
                   </a:solidFill>
@@ -1376,7 +1381,7 @@
             </a:ln>
             <a:extLst>
               <a:ext uri="{91240B29-F687-4f45-9708-019B960494DF}">
-                <a14:hiddenLine xmlns:a14="http://schemas.microsoft.com/office/drawing/2010/main" xmlns="" w="9525">
+                <a14:hiddenLine xmlns="" xmlns:a14="http://schemas.microsoft.com/office/drawing/2010/main" w="9525">
                   <a:solidFill>
                     <a:srgbClr val="000000"/>
                   </a:solidFill>
@@ -1466,7 +1471,7 @@
             </a:ln>
             <a:extLst>
               <a:ext uri="{91240B29-F687-4f45-9708-019B960494DF}">
-                <a14:hiddenLine xmlns:a14="http://schemas.microsoft.com/office/drawing/2010/main" xmlns="" w="9525">
+                <a14:hiddenLine xmlns="" xmlns:a14="http://schemas.microsoft.com/office/drawing/2010/main" w="9525">
                   <a:solidFill>
                     <a:srgbClr val="000000"/>
                   </a:solidFill>
@@ -1528,7 +1533,7 @@
             </a:ln>
             <a:extLst>
               <a:ext uri="{91240B29-F687-4f45-9708-019B960494DF}">
-                <a14:hiddenLine xmlns:a14="http://schemas.microsoft.com/office/drawing/2010/main" xmlns="" w="9525">
+                <a14:hiddenLine xmlns="" xmlns:a14="http://schemas.microsoft.com/office/drawing/2010/main" w="9525">
                   <a:solidFill>
                     <a:srgbClr val="000000"/>
                   </a:solidFill>
@@ -1618,7 +1623,7 @@
             </a:ln>
             <a:extLst>
               <a:ext uri="{91240B29-F687-4f45-9708-019B960494DF}">
-                <a14:hiddenLine xmlns:a14="http://schemas.microsoft.com/office/drawing/2010/main" xmlns="" w="9525">
+                <a14:hiddenLine xmlns="" xmlns:a14="http://schemas.microsoft.com/office/drawing/2010/main" w="9525">
                   <a:solidFill>
                     <a:srgbClr val="000000"/>
                   </a:solidFill>
@@ -1708,7 +1713,7 @@
             </a:ln>
             <a:extLst>
               <a:ext uri="{91240B29-F687-4f45-9708-019B960494DF}">
-                <a14:hiddenLine xmlns:a14="http://schemas.microsoft.com/office/drawing/2010/main" xmlns="" w="9525">
+                <a14:hiddenLine xmlns="" xmlns:a14="http://schemas.microsoft.com/office/drawing/2010/main" w="9525">
                   <a:solidFill>
                     <a:srgbClr val="000000"/>
                   </a:solidFill>
@@ -1764,7 +1769,7 @@
             </a:ln>
             <a:extLst>
               <a:ext uri="{91240B29-F687-4f45-9708-019B960494DF}">
-                <a14:hiddenLine xmlns:a14="http://schemas.microsoft.com/office/drawing/2010/main" xmlns="" w="9525">
+                <a14:hiddenLine xmlns="" xmlns:a14="http://schemas.microsoft.com/office/drawing/2010/main" w="9525">
                   <a:solidFill>
                     <a:srgbClr val="000000"/>
                   </a:solidFill>
@@ -1854,7 +1859,7 @@
             </a:ln>
             <a:extLst>
               <a:ext uri="{91240B29-F687-4f45-9708-019B960494DF}">
-                <a14:hiddenLine xmlns:a14="http://schemas.microsoft.com/office/drawing/2010/main" xmlns="" w="9525">
+                <a14:hiddenLine xmlns="" xmlns:a14="http://schemas.microsoft.com/office/drawing/2010/main" w="9525">
                   <a:solidFill>
                     <a:srgbClr val="000000"/>
                   </a:solidFill>
@@ -1910,7 +1915,7 @@
             </a:ln>
             <a:extLst>
               <a:ext uri="{91240B29-F687-4f45-9708-019B960494DF}">
-                <a14:hiddenLine xmlns:a14="http://schemas.microsoft.com/office/drawing/2010/main" xmlns="" w="9525">
+                <a14:hiddenLine xmlns="" xmlns:a14="http://schemas.microsoft.com/office/drawing/2010/main" w="9525">
                   <a:solidFill>
                     <a:srgbClr val="000000"/>
                   </a:solidFill>
@@ -2000,7 +2005,7 @@
             </a:ln>
             <a:extLst>
               <a:ext uri="{91240B29-F687-4f45-9708-019B960494DF}">
-                <a14:hiddenLine xmlns:a14="http://schemas.microsoft.com/office/drawing/2010/main" xmlns="" w="9525">
+                <a14:hiddenLine xmlns="" xmlns:a14="http://schemas.microsoft.com/office/drawing/2010/main" w="9525">
                   <a:solidFill>
                     <a:srgbClr val="000000"/>
                   </a:solidFill>
@@ -2068,7 +2073,7 @@
             </a:ln>
             <a:extLst>
               <a:ext uri="{91240B29-F687-4f45-9708-019B960494DF}">
-                <a14:hiddenLine xmlns:a14="http://schemas.microsoft.com/office/drawing/2010/main" xmlns="" w="9525">
+                <a14:hiddenLine xmlns="" xmlns:a14="http://schemas.microsoft.com/office/drawing/2010/main" w="9525">
                   <a:solidFill>
                     <a:srgbClr val="000000"/>
                   </a:solidFill>
@@ -2158,7 +2163,7 @@
             </a:ln>
             <a:extLst>
               <a:ext uri="{91240B29-F687-4f45-9708-019B960494DF}">
-                <a14:hiddenLine xmlns:a14="http://schemas.microsoft.com/office/drawing/2010/main" xmlns="" w="9525">
+                <a14:hiddenLine xmlns="" xmlns:a14="http://schemas.microsoft.com/office/drawing/2010/main" w="9525">
                   <a:solidFill>
                     <a:srgbClr val="000000"/>
                   </a:solidFill>
@@ -2226,7 +2231,7 @@
             </a:ln>
             <a:extLst>
               <a:ext uri="{91240B29-F687-4f45-9708-019B960494DF}">
-                <a14:hiddenLine xmlns:a14="http://schemas.microsoft.com/office/drawing/2010/main" xmlns="" w="9525">
+                <a14:hiddenLine xmlns="" xmlns:a14="http://schemas.microsoft.com/office/drawing/2010/main" w="9525">
                   <a:solidFill>
                     <a:srgbClr val="000000"/>
                   </a:solidFill>
@@ -2316,7 +2321,7 @@
             </a:ln>
             <a:extLst>
               <a:ext uri="{91240B29-F687-4f45-9708-019B960494DF}">
-                <a14:hiddenLine xmlns:a14="http://schemas.microsoft.com/office/drawing/2010/main" xmlns="" w="9525">
+                <a14:hiddenLine xmlns="" xmlns:a14="http://schemas.microsoft.com/office/drawing/2010/main" w="9525">
                   <a:solidFill>
                     <a:srgbClr val="000000"/>
                   </a:solidFill>
@@ -2350,7 +2355,7 @@
             </a:ln>
             <a:extLst>
               <a:ext uri="{91240B29-F687-4f45-9708-019B960494DF}">
-                <a14:hiddenLine xmlns:a14="http://schemas.microsoft.com/office/drawing/2010/main" xmlns="" w="9525">
+                <a14:hiddenLine xmlns="" xmlns:a14="http://schemas.microsoft.com/office/drawing/2010/main" w="9525">
                   <a:solidFill>
                     <a:srgbClr val="000000"/>
                   </a:solidFill>
@@ -2440,7 +2445,7 @@
             </a:ln>
             <a:extLst>
               <a:ext uri="{91240B29-F687-4f45-9708-019B960494DF}">
-                <a14:hiddenLine xmlns:a14="http://schemas.microsoft.com/office/drawing/2010/main" xmlns="" w="9525">
+                <a14:hiddenLine xmlns="" xmlns:a14="http://schemas.microsoft.com/office/drawing/2010/main" w="9525">
                   <a:solidFill>
                     <a:srgbClr val="000000"/>
                   </a:solidFill>
@@ -2502,7 +2507,7 @@
             </a:ln>
             <a:extLst>
               <a:ext uri="{91240B29-F687-4f45-9708-019B960494DF}">
-                <a14:hiddenLine xmlns:a14="http://schemas.microsoft.com/office/drawing/2010/main" xmlns="" w="9525">
+                <a14:hiddenLine xmlns="" xmlns:a14="http://schemas.microsoft.com/office/drawing/2010/main" w="9525">
                   <a:solidFill>
                     <a:srgbClr val="000000"/>
                   </a:solidFill>
@@ -2564,7 +2569,7 @@
             </a:ln>
             <a:extLst>
               <a:ext uri="{91240B29-F687-4f45-9708-019B960494DF}">
-                <a14:hiddenLine xmlns:a14="http://schemas.microsoft.com/office/drawing/2010/main" xmlns="" w="9525">
+                <a14:hiddenLine xmlns="" xmlns:a14="http://schemas.microsoft.com/office/drawing/2010/main" w="9525">
                   <a:solidFill>
                     <a:srgbClr val="000000"/>
                   </a:solidFill>
@@ -2654,7 +2659,7 @@
             </a:ln>
             <a:extLst>
               <a:ext uri="{91240B29-F687-4f45-9708-019B960494DF}">
-                <a14:hiddenLine xmlns:a14="http://schemas.microsoft.com/office/drawing/2010/main" xmlns="" w="9525">
+                <a14:hiddenLine xmlns="" xmlns:a14="http://schemas.microsoft.com/office/drawing/2010/main" w="9525">
                   <a:solidFill>
                     <a:srgbClr val="000000"/>
                   </a:solidFill>
@@ -2722,7 +2727,7 @@
             </a:ln>
             <a:extLst>
               <a:ext uri="{91240B29-F687-4f45-9708-019B960494DF}">
-                <a14:hiddenLine xmlns:a14="http://schemas.microsoft.com/office/drawing/2010/main" xmlns="" w="9525">
+                <a14:hiddenLine xmlns="" xmlns:a14="http://schemas.microsoft.com/office/drawing/2010/main" w="9525">
                   <a:solidFill>
                     <a:srgbClr val="000000"/>
                   </a:solidFill>
@@ -2784,7 +2789,7 @@
             </a:ln>
             <a:extLst>
               <a:ext uri="{91240B29-F687-4f45-9708-019B960494DF}">
-                <a14:hiddenLine xmlns:a14="http://schemas.microsoft.com/office/drawing/2010/main" xmlns="" w="9525">
+                <a14:hiddenLine xmlns="" xmlns:a14="http://schemas.microsoft.com/office/drawing/2010/main" w="9525">
                   <a:solidFill>
                     <a:srgbClr val="000000"/>
                   </a:solidFill>
@@ -2874,7 +2879,7 @@
             </a:ln>
             <a:extLst>
               <a:ext uri="{91240B29-F687-4f45-9708-019B960494DF}">
-                <a14:hiddenLine xmlns:a14="http://schemas.microsoft.com/office/drawing/2010/main" xmlns="" w="9525">
+                <a14:hiddenLine xmlns="" xmlns:a14="http://schemas.microsoft.com/office/drawing/2010/main" w="9525">
                   <a:solidFill>
                     <a:srgbClr val="000000"/>
                   </a:solidFill>
@@ -2936,7 +2941,7 @@
             </a:ln>
             <a:extLst>
               <a:ext uri="{91240B29-F687-4f45-9708-019B960494DF}">
-                <a14:hiddenLine xmlns:a14="http://schemas.microsoft.com/office/drawing/2010/main" xmlns="" w="9525">
+                <a14:hiddenLine xmlns="" xmlns:a14="http://schemas.microsoft.com/office/drawing/2010/main" w="9525">
                   <a:solidFill>
                     <a:srgbClr val="000000"/>
                   </a:solidFill>
@@ -3026,7 +3031,7 @@
             </a:ln>
             <a:extLst>
               <a:ext uri="{91240B29-F687-4f45-9708-019B960494DF}">
-                <a14:hiddenLine xmlns:a14="http://schemas.microsoft.com/office/drawing/2010/main" xmlns="" w="9525">
+                <a14:hiddenLine xmlns="" xmlns:a14="http://schemas.microsoft.com/office/drawing/2010/main" w="9525">
                   <a:solidFill>
                     <a:srgbClr val="000000"/>
                   </a:solidFill>
@@ -3088,7 +3093,7 @@
             </a:ln>
             <a:extLst>
               <a:ext uri="{91240B29-F687-4f45-9708-019B960494DF}">
-                <a14:hiddenLine xmlns:a14="http://schemas.microsoft.com/office/drawing/2010/main" xmlns="" w="9525">
+                <a14:hiddenLine xmlns="" xmlns:a14="http://schemas.microsoft.com/office/drawing/2010/main" w="9525">
                   <a:solidFill>
                     <a:srgbClr val="000000"/>
                   </a:solidFill>
@@ -3178,7 +3183,7 @@
             </a:ln>
             <a:extLst>
               <a:ext uri="{91240B29-F687-4f45-9708-019B960494DF}">
-                <a14:hiddenLine xmlns:a14="http://schemas.microsoft.com/office/drawing/2010/main" xmlns="" w="9525">
+                <a14:hiddenLine xmlns="" xmlns:a14="http://schemas.microsoft.com/office/drawing/2010/main" w="9525">
                   <a:solidFill>
                     <a:srgbClr val="000000"/>
                   </a:solidFill>
@@ -3212,7 +3217,7 @@
             </a:ln>
             <a:extLst>
               <a:ext uri="{91240B29-F687-4f45-9708-019B960494DF}">
-                <a14:hiddenLine xmlns:a14="http://schemas.microsoft.com/office/drawing/2010/main" xmlns="" w="9525">
+                <a14:hiddenLine xmlns="" xmlns:a14="http://schemas.microsoft.com/office/drawing/2010/main" w="9525">
                   <a:solidFill>
                     <a:srgbClr val="000000"/>
                   </a:solidFill>
@@ -3277,7 +3282,7 @@
             </a:ln>
             <a:extLst>
               <a:ext uri="{91240B29-F687-4f45-9708-019B960494DF}">
-                <a14:hiddenLine xmlns:a14="http://schemas.microsoft.com/office/drawing/2010/main" xmlns="" w="9525">
+                <a14:hiddenLine xmlns="" xmlns:a14="http://schemas.microsoft.com/office/drawing/2010/main" w="9525">
                   <a:solidFill>
                     <a:srgbClr val="000000"/>
                   </a:solidFill>
@@ -3367,7 +3372,7 @@
             </a:ln>
             <a:extLst>
               <a:ext uri="{91240B29-F687-4f45-9708-019B960494DF}">
-                <a14:hiddenLine xmlns:a14="http://schemas.microsoft.com/office/drawing/2010/main" xmlns="" w="9525">
+                <a14:hiddenLine xmlns="" xmlns:a14="http://schemas.microsoft.com/office/drawing/2010/main" w="9525">
                   <a:solidFill>
                     <a:srgbClr val="000000"/>
                   </a:solidFill>
@@ -3429,7 +3434,7 @@
             </a:ln>
             <a:extLst>
               <a:ext uri="{91240B29-F687-4f45-9708-019B960494DF}">
-                <a14:hiddenLine xmlns:a14="http://schemas.microsoft.com/office/drawing/2010/main" xmlns="" w="9525">
+                <a14:hiddenLine xmlns="" xmlns:a14="http://schemas.microsoft.com/office/drawing/2010/main" w="9525">
                   <a:solidFill>
                     <a:srgbClr val="000000"/>
                   </a:solidFill>
@@ -3519,7 +3524,7 @@
             </a:ln>
             <a:extLst>
               <a:ext uri="{91240B29-F687-4f45-9708-019B960494DF}">
-                <a14:hiddenLine xmlns:a14="http://schemas.microsoft.com/office/drawing/2010/main" xmlns="" w="9525">
+                <a14:hiddenLine xmlns="" xmlns:a14="http://schemas.microsoft.com/office/drawing/2010/main" w="9525">
                   <a:solidFill>
                     <a:srgbClr val="000000"/>
                   </a:solidFill>
@@ -3609,7 +3614,7 @@
             </a:ln>
             <a:extLst>
               <a:ext uri="{91240B29-F687-4f45-9708-019B960494DF}">
-                <a14:hiddenLine xmlns:a14="http://schemas.microsoft.com/office/drawing/2010/main" xmlns="" w="9525">
+                <a14:hiddenLine xmlns="" xmlns:a14="http://schemas.microsoft.com/office/drawing/2010/main" w="9525">
                   <a:solidFill>
                     <a:srgbClr val="000000"/>
                   </a:solidFill>
@@ -3674,7 +3679,7 @@
             </a:ln>
             <a:extLst>
               <a:ext uri="{91240B29-F687-4f45-9708-019B960494DF}">
-                <a14:hiddenLine xmlns:a14="http://schemas.microsoft.com/office/drawing/2010/main" xmlns="" w="9525">
+                <a14:hiddenLine xmlns="" xmlns:a14="http://schemas.microsoft.com/office/drawing/2010/main" w="9525">
                   <a:solidFill>
                     <a:srgbClr val="000000"/>
                   </a:solidFill>
@@ -3736,7 +3741,7 @@
             </a:ln>
             <a:extLst>
               <a:ext uri="{91240B29-F687-4f45-9708-019B960494DF}">
-                <a14:hiddenLine xmlns:a14="http://schemas.microsoft.com/office/drawing/2010/main" xmlns="" w="9525">
+                <a14:hiddenLine xmlns="" xmlns:a14="http://schemas.microsoft.com/office/drawing/2010/main" w="9525">
                   <a:solidFill>
                     <a:srgbClr val="000000"/>
                   </a:solidFill>
@@ -3826,7 +3831,7 @@
             </a:ln>
             <a:extLst>
               <a:ext uri="{91240B29-F687-4f45-9708-019B960494DF}">
-                <a14:hiddenLine xmlns:a14="http://schemas.microsoft.com/office/drawing/2010/main" xmlns="" w="9525">
+                <a14:hiddenLine xmlns="" xmlns:a14="http://schemas.microsoft.com/office/drawing/2010/main" w="9525">
                   <a:solidFill>
                     <a:srgbClr val="000000"/>
                   </a:solidFill>
@@ -3916,7 +3921,7 @@
             </a:ln>
             <a:extLst>
               <a:ext uri="{91240B29-F687-4f45-9708-019B960494DF}">
-                <a14:hiddenLine xmlns:a14="http://schemas.microsoft.com/office/drawing/2010/main" xmlns="" w="9525">
+                <a14:hiddenLine xmlns="" xmlns:a14="http://schemas.microsoft.com/office/drawing/2010/main" w="9525">
                   <a:solidFill>
                     <a:srgbClr val="000000"/>
                   </a:solidFill>
@@ -3978,7 +3983,7 @@
             </a:ln>
             <a:extLst>
               <a:ext uri="{91240B29-F687-4f45-9708-019B960494DF}">
-                <a14:hiddenLine xmlns:a14="http://schemas.microsoft.com/office/drawing/2010/main" xmlns="" w="9525">
+                <a14:hiddenLine xmlns="" xmlns:a14="http://schemas.microsoft.com/office/drawing/2010/main" w="9525">
                   <a:solidFill>
                     <a:srgbClr val="000000"/>
                   </a:solidFill>
@@ -4098,7 +4103,7 @@
             </a:ln>
             <a:extLst>
               <a:ext uri="{91240B29-F687-4f45-9708-019B960494DF}">
-                <a14:hiddenLine xmlns:a14="http://schemas.microsoft.com/office/drawing/2010/main" xmlns="" w="9525">
+                <a14:hiddenLine xmlns="" xmlns:a14="http://schemas.microsoft.com/office/drawing/2010/main" w="9525">
                   <a:solidFill>
                     <a:srgbClr val="000000"/>
                   </a:solidFill>
@@ -4166,7 +4171,7 @@
             </a:ln>
             <a:extLst>
               <a:ext uri="{91240B29-F687-4f45-9708-019B960494DF}">
-                <a14:hiddenLine xmlns:a14="http://schemas.microsoft.com/office/drawing/2010/main" xmlns="" w="9525">
+                <a14:hiddenLine xmlns="" xmlns:a14="http://schemas.microsoft.com/office/drawing/2010/main" w="9525">
                   <a:solidFill>
                     <a:srgbClr val="000000"/>
                   </a:solidFill>
@@ -4256,7 +4261,7 @@
             </a:ln>
             <a:extLst>
               <a:ext uri="{91240B29-F687-4f45-9708-019B960494DF}">
-                <a14:hiddenLine xmlns:a14="http://schemas.microsoft.com/office/drawing/2010/main" xmlns="" w="9525">
+                <a14:hiddenLine xmlns="" xmlns:a14="http://schemas.microsoft.com/office/drawing/2010/main" w="9525">
                   <a:solidFill>
                     <a:srgbClr val="000000"/>
                   </a:solidFill>
@@ -4396,7 +4401,7 @@
           <a:p>
             <a:fld id="{48A87A34-81AB-432B-8DAE-1953F412C126}" type="datetimeFigureOut">
               <a:rPr lang="en-US" dirty="0"/>
-              <a:t>5/4/2015</a:t>
+              <a:t>5/5/2015</a:t>
             </a:fld>
             <a:endParaRPr lang="en-US" dirty="0"/>
           </a:p>
@@ -4658,7 +4663,7 @@
           <a:p>
             <a:fld id="{48A87A34-81AB-432B-8DAE-1953F412C126}" type="datetimeFigureOut">
               <a:rPr lang="en-US" dirty="0"/>
-              <a:t>5/4/2015</a:t>
+              <a:t>5/5/2015</a:t>
             </a:fld>
             <a:endParaRPr lang="en-US" dirty="0"/>
           </a:p>
@@ -4849,7 +4854,7 @@
           <a:p>
             <a:fld id="{48A87A34-81AB-432B-8DAE-1953F412C126}" type="datetimeFigureOut">
               <a:rPr lang="en-US" dirty="0"/>
-              <a:t>5/4/2015</a:t>
+              <a:t>5/5/2015</a:t>
             </a:fld>
             <a:endParaRPr lang="en-US" dirty="0"/>
           </a:p>
@@ -5107,7 +5112,7 @@
           <a:p>
             <a:fld id="{48A87A34-81AB-432B-8DAE-1953F412C126}" type="datetimeFigureOut">
               <a:rPr lang="en-US" dirty="0"/>
-              <a:t>5/4/2015</a:t>
+              <a:t>5/5/2015</a:t>
             </a:fld>
             <a:endParaRPr lang="en-US" dirty="0"/>
           </a:p>
@@ -5536,7 +5541,7 @@
           <a:p>
             <a:fld id="{48A87A34-81AB-432B-8DAE-1953F412C126}" type="datetimeFigureOut">
               <a:rPr lang="en-US" dirty="0"/>
-              <a:t>5/4/2015</a:t>
+              <a:t>5/5/2015</a:t>
             </a:fld>
             <a:endParaRPr lang="en-US" dirty="0"/>
           </a:p>
@@ -6077,7 +6082,7 @@
           <a:p>
             <a:fld id="{48A87A34-81AB-432B-8DAE-1953F412C126}" type="datetimeFigureOut">
               <a:rPr lang="en-US" dirty="0"/>
-              <a:t>5/4/2015</a:t>
+              <a:t>5/5/2015</a:t>
             </a:fld>
             <a:endParaRPr lang="en-US" dirty="0"/>
           </a:p>
@@ -6792,7 +6797,7 @@
           <a:p>
             <a:fld id="{48A87A34-81AB-432B-8DAE-1953F412C126}" type="datetimeFigureOut">
               <a:rPr lang="en-US" dirty="0"/>
-              <a:t>5/4/2015</a:t>
+              <a:t>5/5/2015</a:t>
             </a:fld>
             <a:endParaRPr lang="en-US" dirty="0"/>
           </a:p>
@@ -6957,7 +6962,7 @@
           <a:p>
             <a:fld id="{48A87A34-81AB-432B-8DAE-1953F412C126}" type="datetimeFigureOut">
               <a:rPr lang="en-US" dirty="0"/>
-              <a:t>5/4/2015</a:t>
+              <a:t>5/5/2015</a:t>
             </a:fld>
             <a:endParaRPr lang="en-US" dirty="0"/>
           </a:p>
@@ -7132,7 +7137,7 @@
           <a:p>
             <a:fld id="{48A87A34-81AB-432B-8DAE-1953F412C126}" type="datetimeFigureOut">
               <a:rPr lang="en-US" dirty="0"/>
-              <a:t>5/4/2015</a:t>
+              <a:t>5/5/2015</a:t>
             </a:fld>
             <a:endParaRPr lang="en-US" dirty="0"/>
           </a:p>
@@ -7297,7 +7302,7 @@
           <a:p>
             <a:fld id="{48A87A34-81AB-432B-8DAE-1953F412C126}" type="datetimeFigureOut">
               <a:rPr lang="en-US" dirty="0"/>
-              <a:t>5/4/2015</a:t>
+              <a:t>5/5/2015</a:t>
             </a:fld>
             <a:endParaRPr lang="en-US" dirty="0"/>
           </a:p>
@@ -7542,7 +7547,7 @@
           <a:p>
             <a:fld id="{48A87A34-81AB-432B-8DAE-1953F412C126}" type="datetimeFigureOut">
               <a:rPr lang="en-US" dirty="0"/>
-              <a:t>5/4/2015</a:t>
+              <a:t>5/5/2015</a:t>
             </a:fld>
             <a:endParaRPr lang="en-US" dirty="0"/>
           </a:p>
@@ -7769,7 +7774,7 @@
           <a:p>
             <a:fld id="{48A87A34-81AB-432B-8DAE-1953F412C126}" type="datetimeFigureOut">
               <a:rPr lang="en-US" dirty="0"/>
-              <a:t>5/4/2015</a:t>
+              <a:t>5/5/2015</a:t>
             </a:fld>
             <a:endParaRPr lang="en-US" dirty="0"/>
           </a:p>
@@ -8145,7 +8150,7 @@
           <a:p>
             <a:fld id="{48A87A34-81AB-432B-8DAE-1953F412C126}" type="datetimeFigureOut">
               <a:rPr lang="en-US" dirty="0"/>
-              <a:t>5/4/2015</a:t>
+              <a:t>5/5/2015</a:t>
             </a:fld>
             <a:endParaRPr lang="en-US" dirty="0"/>
           </a:p>
@@ -8258,7 +8263,7 @@
           <a:p>
             <a:fld id="{48A87A34-81AB-432B-8DAE-1953F412C126}" type="datetimeFigureOut">
               <a:rPr lang="en-US" dirty="0"/>
-              <a:t>5/4/2015</a:t>
+              <a:t>5/5/2015</a:t>
             </a:fld>
             <a:endParaRPr lang="en-US" dirty="0"/>
           </a:p>
@@ -8348,7 +8353,7 @@
           <a:p>
             <a:fld id="{48A87A34-81AB-432B-8DAE-1953F412C126}" type="datetimeFigureOut">
               <a:rPr lang="en-US" dirty="0"/>
-              <a:t>5/4/2015</a:t>
+              <a:t>5/5/2015</a:t>
             </a:fld>
             <a:endParaRPr lang="en-US" dirty="0"/>
           </a:p>
@@ -8592,7 +8597,7 @@
           <a:p>
             <a:fld id="{48A87A34-81AB-432B-8DAE-1953F412C126}" type="datetimeFigureOut">
               <a:rPr lang="en-US" dirty="0"/>
-              <a:t>5/4/2015</a:t>
+              <a:t>5/5/2015</a:t>
             </a:fld>
             <a:endParaRPr lang="en-US" dirty="0"/>
           </a:p>
@@ -8867,7 +8872,7 @@
           <a:p>
             <a:fld id="{48A87A34-81AB-432B-8DAE-1953F412C126}" type="datetimeFigureOut">
               <a:rPr lang="en-US" dirty="0"/>
-              <a:t>5/4/2015</a:t>
+              <a:t>5/5/2015</a:t>
             </a:fld>
             <a:endParaRPr lang="en-US" dirty="0"/>
           </a:p>
@@ -8985,7 +8990,7 @@
           <a:noFill/>
           <a:extLst>
             <a:ext uri="{909E8E84-426E-40dd-AFC4-6F175D3DCCD1}">
-              <a14:hiddenFill xmlns:a14="http://schemas.microsoft.com/office/drawing/2010/main" xmlns="">
+              <a14:hiddenFill xmlns="" xmlns:a14="http://schemas.microsoft.com/office/drawing/2010/main">
                 <a:solidFill>
                   <a:srgbClr val="FFFFFF"/>
                 </a:solidFill>
@@ -9059,7 +9064,7 @@
               </a:ln>
               <a:extLst>
                 <a:ext uri="{91240B29-F687-4f45-9708-019B960494DF}">
-                  <a14:hiddenLine xmlns:a14="http://schemas.microsoft.com/office/drawing/2010/main" xmlns="" w="9525">
+                  <a14:hiddenLine xmlns="" xmlns:a14="http://schemas.microsoft.com/office/drawing/2010/main" w="9525">
                     <a:solidFill>
                       <a:srgbClr val="000000"/>
                     </a:solidFill>
@@ -9149,7 +9154,7 @@
               </a:ln>
               <a:extLst>
                 <a:ext uri="{91240B29-F687-4f45-9708-019B960494DF}">
-                  <a14:hiddenLine xmlns:a14="http://schemas.microsoft.com/office/drawing/2010/main" xmlns="" w="9525">
+                  <a14:hiddenLine xmlns="" xmlns:a14="http://schemas.microsoft.com/office/drawing/2010/main" w="9525">
                     <a:solidFill>
                       <a:srgbClr val="000000"/>
                     </a:solidFill>
@@ -9239,7 +9244,7 @@
               </a:ln>
               <a:extLst>
                 <a:ext uri="{91240B29-F687-4f45-9708-019B960494DF}">
-                  <a14:hiddenLine xmlns:a14="http://schemas.microsoft.com/office/drawing/2010/main" xmlns="" w="9525">
+                  <a14:hiddenLine xmlns="" xmlns:a14="http://schemas.microsoft.com/office/drawing/2010/main" w="9525">
                     <a:solidFill>
                       <a:srgbClr val="000000"/>
                     </a:solidFill>
@@ -9301,7 +9306,7 @@
               </a:ln>
               <a:extLst>
                 <a:ext uri="{91240B29-F687-4f45-9708-019B960494DF}">
-                  <a14:hiddenLine xmlns:a14="http://schemas.microsoft.com/office/drawing/2010/main" xmlns="" w="9525">
+                  <a14:hiddenLine xmlns="" xmlns:a14="http://schemas.microsoft.com/office/drawing/2010/main" w="9525">
                     <a:solidFill>
                       <a:srgbClr val="000000"/>
                     </a:solidFill>
@@ -9391,7 +9396,7 @@
               </a:ln>
               <a:extLst>
                 <a:ext uri="{91240B29-F687-4f45-9708-019B960494DF}">
-                  <a14:hiddenLine xmlns:a14="http://schemas.microsoft.com/office/drawing/2010/main" xmlns="" w="9525">
+                  <a14:hiddenLine xmlns="" xmlns:a14="http://schemas.microsoft.com/office/drawing/2010/main" w="9525">
                     <a:solidFill>
                       <a:srgbClr val="000000"/>
                     </a:solidFill>
@@ -9453,7 +9458,7 @@
               </a:ln>
               <a:extLst>
                 <a:ext uri="{91240B29-F687-4f45-9708-019B960494DF}">
-                  <a14:hiddenLine xmlns:a14="http://schemas.microsoft.com/office/drawing/2010/main" xmlns="" w="9525">
+                  <a14:hiddenLine xmlns="" xmlns:a14="http://schemas.microsoft.com/office/drawing/2010/main" w="9525">
                     <a:solidFill>
                       <a:srgbClr val="000000"/>
                     </a:solidFill>
@@ -9515,7 +9520,7 @@
               </a:ln>
               <a:extLst>
                 <a:ext uri="{91240B29-F687-4f45-9708-019B960494DF}">
-                  <a14:hiddenLine xmlns:a14="http://schemas.microsoft.com/office/drawing/2010/main" xmlns="" w="9525">
+                  <a14:hiddenLine xmlns="" xmlns:a14="http://schemas.microsoft.com/office/drawing/2010/main" w="9525">
                     <a:solidFill>
                       <a:srgbClr val="000000"/>
                     </a:solidFill>
@@ -9605,7 +9610,7 @@
               </a:ln>
               <a:extLst>
                 <a:ext uri="{91240B29-F687-4f45-9708-019B960494DF}">
-                  <a14:hiddenLine xmlns:a14="http://schemas.microsoft.com/office/drawing/2010/main" xmlns="" w="9525">
+                  <a14:hiddenLine xmlns="" xmlns:a14="http://schemas.microsoft.com/office/drawing/2010/main" w="9525">
                     <a:solidFill>
                       <a:srgbClr val="000000"/>
                     </a:solidFill>
@@ -9695,7 +9700,7 @@
               </a:ln>
               <a:extLst>
                 <a:ext uri="{91240B29-F687-4f45-9708-019B960494DF}">
-                  <a14:hiddenLine xmlns:a14="http://schemas.microsoft.com/office/drawing/2010/main" xmlns="" w="9525">
+                  <a14:hiddenLine xmlns="" xmlns:a14="http://schemas.microsoft.com/office/drawing/2010/main" w="9525">
                     <a:solidFill>
                       <a:srgbClr val="000000"/>
                     </a:solidFill>
@@ -9757,7 +9762,7 @@
               </a:ln>
               <a:extLst>
                 <a:ext uri="{91240B29-F687-4f45-9708-019B960494DF}">
-                  <a14:hiddenLine xmlns:a14="http://schemas.microsoft.com/office/drawing/2010/main" xmlns="" w="9525">
+                  <a14:hiddenLine xmlns="" xmlns:a14="http://schemas.microsoft.com/office/drawing/2010/main" w="9525">
                     <a:solidFill>
                       <a:srgbClr val="000000"/>
                     </a:solidFill>
@@ -9867,7 +9872,7 @@
               </a:ln>
               <a:extLst>
                 <a:ext uri="{91240B29-F687-4f45-9708-019B960494DF}">
-                  <a14:hiddenLine xmlns:a14="http://schemas.microsoft.com/office/drawing/2010/main" xmlns="" w="9525">
+                  <a14:hiddenLine xmlns="" xmlns:a14="http://schemas.microsoft.com/office/drawing/2010/main" w="9525">
                     <a:solidFill>
                       <a:srgbClr val="000000"/>
                     </a:solidFill>
@@ -9951,7 +9956,7 @@
               </a:ln>
               <a:extLst>
                 <a:ext uri="{91240B29-F687-4f45-9708-019B960494DF}">
-                  <a14:hiddenLine xmlns:a14="http://schemas.microsoft.com/office/drawing/2010/main" xmlns="" w="9525">
+                  <a14:hiddenLine xmlns="" xmlns:a14="http://schemas.microsoft.com/office/drawing/2010/main" w="9525">
                     <a:solidFill>
                       <a:srgbClr val="000000"/>
                     </a:solidFill>
@@ -10013,7 +10018,7 @@
               </a:ln>
               <a:extLst>
                 <a:ext uri="{91240B29-F687-4f45-9708-019B960494DF}">
-                  <a14:hiddenLine xmlns:a14="http://schemas.microsoft.com/office/drawing/2010/main" xmlns="" w="9525">
+                  <a14:hiddenLine xmlns="" xmlns:a14="http://schemas.microsoft.com/office/drawing/2010/main" w="9525">
                     <a:solidFill>
                       <a:srgbClr val="000000"/>
                     </a:solidFill>
@@ -10075,7 +10080,7 @@
               </a:ln>
               <a:extLst>
                 <a:ext uri="{91240B29-F687-4f45-9708-019B960494DF}">
-                  <a14:hiddenLine xmlns:a14="http://schemas.microsoft.com/office/drawing/2010/main" xmlns="" w="9525">
+                  <a14:hiddenLine xmlns="" xmlns:a14="http://schemas.microsoft.com/office/drawing/2010/main" w="9525">
                     <a:solidFill>
                       <a:srgbClr val="000000"/>
                     </a:solidFill>
@@ -10165,7 +10170,7 @@
               </a:ln>
               <a:extLst>
                 <a:ext uri="{91240B29-F687-4f45-9708-019B960494DF}">
-                  <a14:hiddenLine xmlns:a14="http://schemas.microsoft.com/office/drawing/2010/main" xmlns="" w="9525">
+                  <a14:hiddenLine xmlns="" xmlns:a14="http://schemas.microsoft.com/office/drawing/2010/main" w="9525">
                     <a:solidFill>
                       <a:srgbClr val="000000"/>
                     </a:solidFill>
@@ -10199,7 +10204,7 @@
               </a:ln>
               <a:extLst>
                 <a:ext uri="{91240B29-F687-4f45-9708-019B960494DF}">
-                  <a14:hiddenLine xmlns:a14="http://schemas.microsoft.com/office/drawing/2010/main" xmlns="" w="9525">
+                  <a14:hiddenLine xmlns="" xmlns:a14="http://schemas.microsoft.com/office/drawing/2010/main" w="9525">
                     <a:solidFill>
                       <a:srgbClr val="000000"/>
                     </a:solidFill>
@@ -10264,7 +10269,7 @@
               </a:ln>
               <a:extLst>
                 <a:ext uri="{91240B29-F687-4f45-9708-019B960494DF}">
-                  <a14:hiddenLine xmlns:a14="http://schemas.microsoft.com/office/drawing/2010/main" xmlns="" w="9525">
+                  <a14:hiddenLine xmlns="" xmlns:a14="http://schemas.microsoft.com/office/drawing/2010/main" w="9525">
                     <a:solidFill>
                       <a:srgbClr val="000000"/>
                     </a:solidFill>
@@ -10354,7 +10359,7 @@
               </a:ln>
               <a:extLst>
                 <a:ext uri="{91240B29-F687-4f45-9708-019B960494DF}">
-                  <a14:hiddenLine xmlns:a14="http://schemas.microsoft.com/office/drawing/2010/main" xmlns="" w="9525">
+                  <a14:hiddenLine xmlns="" xmlns:a14="http://schemas.microsoft.com/office/drawing/2010/main" w="9525">
                     <a:solidFill>
                       <a:srgbClr val="000000"/>
                     </a:solidFill>
@@ -10416,7 +10421,7 @@
               </a:ln>
               <a:extLst>
                 <a:ext uri="{91240B29-F687-4f45-9708-019B960494DF}">
-                  <a14:hiddenLine xmlns:a14="http://schemas.microsoft.com/office/drawing/2010/main" xmlns="" w="9525">
+                  <a14:hiddenLine xmlns="" xmlns:a14="http://schemas.microsoft.com/office/drawing/2010/main" w="9525">
                     <a:solidFill>
                       <a:srgbClr val="000000"/>
                     </a:solidFill>
@@ -10506,7 +10511,7 @@
               </a:ln>
               <a:extLst>
                 <a:ext uri="{91240B29-F687-4f45-9708-019B960494DF}">
-                  <a14:hiddenLine xmlns:a14="http://schemas.microsoft.com/office/drawing/2010/main" xmlns="" w="9525">
+                  <a14:hiddenLine xmlns="" xmlns:a14="http://schemas.microsoft.com/office/drawing/2010/main" w="9525">
                     <a:solidFill>
                       <a:srgbClr val="000000"/>
                     </a:solidFill>
@@ -10571,7 +10576,7 @@
               </a:ln>
               <a:extLst>
                 <a:ext uri="{91240B29-F687-4f45-9708-019B960494DF}">
-                  <a14:hiddenLine xmlns:a14="http://schemas.microsoft.com/office/drawing/2010/main" xmlns="" w="9525">
+                  <a14:hiddenLine xmlns="" xmlns:a14="http://schemas.microsoft.com/office/drawing/2010/main" w="9525">
                     <a:solidFill>
                       <a:srgbClr val="000000"/>
                     </a:solidFill>
@@ -10633,7 +10638,7 @@
               </a:ln>
               <a:extLst>
                 <a:ext uri="{91240B29-F687-4f45-9708-019B960494DF}">
-                  <a14:hiddenLine xmlns:a14="http://schemas.microsoft.com/office/drawing/2010/main" xmlns="" w="9525">
+                  <a14:hiddenLine xmlns="" xmlns:a14="http://schemas.microsoft.com/office/drawing/2010/main" w="9525">
                     <a:solidFill>
                       <a:srgbClr val="000000"/>
                     </a:solidFill>
@@ -10723,7 +10728,7 @@
               </a:ln>
               <a:extLst>
                 <a:ext uri="{91240B29-F687-4f45-9708-019B960494DF}">
-                  <a14:hiddenLine xmlns:a14="http://schemas.microsoft.com/office/drawing/2010/main" xmlns="" w="9525">
+                  <a14:hiddenLine xmlns="" xmlns:a14="http://schemas.microsoft.com/office/drawing/2010/main" w="9525">
                     <a:solidFill>
                       <a:srgbClr val="000000"/>
                     </a:solidFill>
@@ -10813,7 +10818,7 @@
               </a:ln>
               <a:extLst>
                 <a:ext uri="{91240B29-F687-4f45-9708-019B960494DF}">
-                  <a14:hiddenLine xmlns:a14="http://schemas.microsoft.com/office/drawing/2010/main" xmlns="" w="9525">
+                  <a14:hiddenLine xmlns="" xmlns:a14="http://schemas.microsoft.com/office/drawing/2010/main" w="9525">
                     <a:solidFill>
                       <a:srgbClr val="000000"/>
                     </a:solidFill>
@@ -10878,7 +10883,7 @@
               </a:ln>
               <a:extLst>
                 <a:ext uri="{91240B29-F687-4f45-9708-019B960494DF}">
-                  <a14:hiddenLine xmlns:a14="http://schemas.microsoft.com/office/drawing/2010/main" xmlns="" w="9525">
+                  <a14:hiddenLine xmlns="" xmlns:a14="http://schemas.microsoft.com/office/drawing/2010/main" w="9525">
                     <a:solidFill>
                       <a:srgbClr val="000000"/>
                     </a:solidFill>
@@ -10998,7 +11003,7 @@
               </a:ln>
               <a:extLst>
                 <a:ext uri="{91240B29-F687-4f45-9708-019B960494DF}">
-                  <a14:hiddenLine xmlns:a14="http://schemas.microsoft.com/office/drawing/2010/main" xmlns="" w="9525">
+                  <a14:hiddenLine xmlns="" xmlns:a14="http://schemas.microsoft.com/office/drawing/2010/main" w="9525">
                     <a:solidFill>
                       <a:srgbClr val="000000"/>
                     </a:solidFill>
@@ -11079,7 +11084,7 @@
               </a:ln>
               <a:extLst>
                 <a:ext uri="{91240B29-F687-4f45-9708-019B960494DF}">
-                  <a14:hiddenLine xmlns:a14="http://schemas.microsoft.com/office/drawing/2010/main" xmlns="" w="9525">
+                  <a14:hiddenLine xmlns="" xmlns:a14="http://schemas.microsoft.com/office/drawing/2010/main" w="9525">
                     <a:solidFill>
                       <a:srgbClr val="000000"/>
                     </a:solidFill>
@@ -11194,7 +11199,7 @@
               </a:ln>
               <a:extLst>
                 <a:ext uri="{91240B29-F687-4f45-9708-019B960494DF}">
-                  <a14:hiddenLine xmlns:a14="http://schemas.microsoft.com/office/drawing/2010/main" xmlns="" w="9525">
+                  <a14:hiddenLine xmlns="" xmlns:a14="http://schemas.microsoft.com/office/drawing/2010/main" w="9525">
                     <a:solidFill>
                       <a:srgbClr val="000000"/>
                     </a:solidFill>
@@ -11284,7 +11289,7 @@
               </a:ln>
               <a:extLst>
                 <a:ext uri="{91240B29-F687-4f45-9708-019B960494DF}">
-                  <a14:hiddenLine xmlns:a14="http://schemas.microsoft.com/office/drawing/2010/main" xmlns="" w="9525">
+                  <a14:hiddenLine xmlns="" xmlns:a14="http://schemas.microsoft.com/office/drawing/2010/main" w="9525">
                     <a:solidFill>
                       <a:srgbClr val="000000"/>
                     </a:solidFill>
@@ -11349,7 +11354,7 @@
               </a:ln>
               <a:extLst>
                 <a:ext uri="{91240B29-F687-4f45-9708-019B960494DF}">
-                  <a14:hiddenLine xmlns:a14="http://schemas.microsoft.com/office/drawing/2010/main" xmlns="" w="9525">
+                  <a14:hiddenLine xmlns="" xmlns:a14="http://schemas.microsoft.com/office/drawing/2010/main" w="9525">
                     <a:solidFill>
                       <a:srgbClr val="000000"/>
                     </a:solidFill>
@@ -11439,7 +11444,7 @@
               </a:ln>
               <a:extLst>
                 <a:ext uri="{91240B29-F687-4f45-9708-019B960494DF}">
-                  <a14:hiddenLine xmlns:a14="http://schemas.microsoft.com/office/drawing/2010/main" xmlns="" w="9525">
+                  <a14:hiddenLine xmlns="" xmlns:a14="http://schemas.microsoft.com/office/drawing/2010/main" w="9525">
                     <a:solidFill>
                       <a:srgbClr val="000000"/>
                     </a:solidFill>
@@ -11507,7 +11512,7 @@
               </a:ln>
               <a:extLst>
                 <a:ext uri="{91240B29-F687-4f45-9708-019B960494DF}">
-                  <a14:hiddenLine xmlns:a14="http://schemas.microsoft.com/office/drawing/2010/main" xmlns="" w="9525">
+                  <a14:hiddenLine xmlns="" xmlns:a14="http://schemas.microsoft.com/office/drawing/2010/main" w="9525">
                     <a:solidFill>
                       <a:srgbClr val="000000"/>
                     </a:solidFill>
@@ -11597,7 +11602,7 @@
               </a:ln>
               <a:extLst>
                 <a:ext uri="{91240B29-F687-4f45-9708-019B960494DF}">
-                  <a14:hiddenLine xmlns:a14="http://schemas.microsoft.com/office/drawing/2010/main" xmlns="" w="9525">
+                  <a14:hiddenLine xmlns="" xmlns:a14="http://schemas.microsoft.com/office/drawing/2010/main" w="9525">
                     <a:solidFill>
                       <a:srgbClr val="000000"/>
                     </a:solidFill>
@@ -11665,7 +11670,7 @@
               </a:ln>
               <a:extLst>
                 <a:ext uri="{91240B29-F687-4f45-9708-019B960494DF}">
-                  <a14:hiddenLine xmlns:a14="http://schemas.microsoft.com/office/drawing/2010/main" xmlns="" w="9525">
+                  <a14:hiddenLine xmlns="" xmlns:a14="http://schemas.microsoft.com/office/drawing/2010/main" w="9525">
                     <a:solidFill>
                       <a:srgbClr val="000000"/>
                     </a:solidFill>
@@ -11755,7 +11760,7 @@
               </a:ln>
               <a:extLst>
                 <a:ext uri="{91240B29-F687-4f45-9708-019B960494DF}">
-                  <a14:hiddenLine xmlns:a14="http://schemas.microsoft.com/office/drawing/2010/main" xmlns="" w="9525">
+                  <a14:hiddenLine xmlns="" xmlns:a14="http://schemas.microsoft.com/office/drawing/2010/main" w="9525">
                     <a:solidFill>
                       <a:srgbClr val="000000"/>
                     </a:solidFill>
@@ -11789,7 +11794,7 @@
               </a:ln>
               <a:extLst>
                 <a:ext uri="{91240B29-F687-4f45-9708-019B960494DF}">
-                  <a14:hiddenLine xmlns:a14="http://schemas.microsoft.com/office/drawing/2010/main" xmlns="" w="9525">
+                  <a14:hiddenLine xmlns="" xmlns:a14="http://schemas.microsoft.com/office/drawing/2010/main" w="9525">
                     <a:solidFill>
                       <a:srgbClr val="000000"/>
                     </a:solidFill>
@@ -11930,7 +11935,7 @@
             <a:fld id="{48A87A34-81AB-432B-8DAE-1953F412C126}" type="datetimeFigureOut">
               <a:rPr lang="en-US" dirty="0"/>
               <a:pPr/>
-              <a:t>5/4/2015</a:t>
+              <a:t>5/5/2015</a:t>
             </a:fld>
             <a:endParaRPr lang="en-US" dirty="0"/>
           </a:p>
@@ -12664,6 +12669,26 @@
           <a:bodyPr/>
           <a:lstStyle/>
           <a:p>
+            <a:r>
+              <a:rPr lang="fr-FR" dirty="0" smtClean="0"/>
+              <a:t>Robot télécommandé à distance</a:t>
+            </a:r>
+          </a:p>
+          <a:p>
+            <a:r>
+              <a:rPr lang="fr-FR" dirty="0" err="1" smtClean="0"/>
+              <a:t>Raspberry</a:t>
+            </a:r>
+            <a:endParaRPr lang="fr-FR" dirty="0"/>
+          </a:p>
+          <a:p>
+            <a:r>
+              <a:rPr lang="fr-FR" dirty="0" err="1" smtClean="0"/>
+              <a:t>Gopigo</a:t>
+            </a:r>
+            <a:endParaRPr lang="fr-FR" dirty="0" smtClean="0"/>
+          </a:p>
+          <a:p>
             <a:endParaRPr lang="fr-FR" dirty="0"/>
           </a:p>
         </p:txBody>
@@ -12744,7 +12769,28 @@
           <a:bodyPr/>
           <a:lstStyle/>
           <a:p>
-            <a:endParaRPr lang="fr-FR"/>
+            <a:r>
+              <a:rPr lang="fr-FR" dirty="0" smtClean="0"/>
+              <a:t>Mouvements (avant, arrière, droite, gauche)</a:t>
+            </a:r>
+          </a:p>
+          <a:p>
+            <a:r>
+              <a:rPr lang="fr-FR" dirty="0" smtClean="0"/>
+              <a:t>Caméra</a:t>
+            </a:r>
+          </a:p>
+          <a:p>
+            <a:r>
+              <a:rPr lang="fr-FR" dirty="0" smtClean="0"/>
+              <a:t>Reconnaissance vocale</a:t>
+            </a:r>
+          </a:p>
+          <a:p>
+            <a:r>
+              <a:rPr lang="fr-FR" dirty="0" smtClean="0"/>
+              <a:t>Interface web REST</a:t>
+            </a:r>
           </a:p>
         </p:txBody>
       </p:sp>
@@ -12824,7 +12870,10 @@
           <a:bodyPr/>
           <a:lstStyle/>
           <a:p>
-            <a:endParaRPr lang="fr-FR"/>
+            <a:r>
+              <a:rPr lang="fr-FR" smtClean="0"/>
+              <a:t>REST</a:t>
+            </a:r>
           </a:p>
         </p:txBody>
       </p:sp>
@@ -12904,7 +12953,31 @@
           <a:bodyPr/>
           <a:lstStyle/>
           <a:p>
-            <a:endParaRPr lang="fr-FR"/>
+            <a:r>
+              <a:rPr lang="fr-FR" dirty="0" smtClean="0"/>
+              <a:t>Pas de bibliothèque java</a:t>
+            </a:r>
+          </a:p>
+          <a:p>
+            <a:r>
+              <a:rPr lang="fr-FR" dirty="0" smtClean="0"/>
+              <a:t>Problèmes de montage</a:t>
+            </a:r>
+          </a:p>
+          <a:p>
+            <a:r>
+              <a:rPr lang="fr-FR" dirty="0" smtClean="0"/>
+              <a:t>Bibliothèque non adaptée avec la carte fournie</a:t>
+            </a:r>
+          </a:p>
+          <a:p>
+            <a:r>
+              <a:rPr lang="fr-FR" dirty="0" smtClean="0"/>
+              <a:t>Connexion wifi du robot instable</a:t>
+            </a:r>
+          </a:p>
+          <a:p>
+            <a:endParaRPr lang="fr-FR" dirty="0"/>
           </a:p>
         </p:txBody>
       </p:sp>
@@ -12955,7 +13028,12 @@
             <p:ph type="title"/>
           </p:nvPr>
         </p:nvSpPr>
-        <p:spPr/>
+        <p:spPr>
+          <a:xfrm>
+            <a:off x="1027113" y="2561618"/>
+            <a:ext cx="9905998" cy="1478570"/>
+          </a:xfrm>
+        </p:spPr>
         <p:txBody>
           <a:bodyPr/>
           <a:lstStyle/>
@@ -12966,25 +13044,6 @@
               <a:t>Démonstration</a:t>
             </a:r>
             <a:endParaRPr lang="fr-FR" dirty="0"/>
-          </a:p>
-        </p:txBody>
-      </p:sp>
-      <p:sp>
-        <p:nvSpPr>
-          <p:cNvPr id="3" name="Espace réservé du contenu 2"/>
-          <p:cNvSpPr>
-            <a:spLocks noGrp="1"/>
-          </p:cNvSpPr>
-          <p:nvPr>
-            <p:ph idx="1"/>
-          </p:nvPr>
-        </p:nvSpPr>
-        <p:spPr/>
-        <p:txBody>
-          <a:bodyPr/>
-          <a:lstStyle/>
-          <a:p>
-            <a:endParaRPr lang="fr-FR"/>
           </a:p>
         </p:txBody>
       </p:sp>

</xml_diff>

<commit_message>
commentaires du diaporama pour la diapo concernant les problèmes rencontrés
</commit_message>
<xml_diff>
--- a/Documents/diaporama_soutenance.pptx
+++ b/Documents/diaporama_soutenance.pptx
@@ -205,7 +205,7 @@
           <a:p>
             <a:fld id="{67F2E138-F33C-4BBE-8258-725ED9228797}" type="datetimeFigureOut">
               <a:rPr lang="fr-FR" smtClean="0"/>
-              <a:t>07/05/2015</a:t>
+              <a:t>09/05/2015</a:t>
             </a:fld>
             <a:endParaRPr lang="fr-FR"/>
           </a:p>
@@ -875,6 +875,238 @@
 </file>
 
 <file path=ppt/notesSlides/notesSlide5.xml><?xml version="1.0" encoding="utf-8"?>
+<p:notes xmlns:a="http://schemas.openxmlformats.org/drawingml/2006/main" xmlns:r="http://schemas.openxmlformats.org/officeDocument/2006/relationships" xmlns:p="http://schemas.openxmlformats.org/presentationml/2006/main">
+  <p:cSld>
+    <p:spTree>
+      <p:nvGrpSpPr>
+        <p:cNvPr id="1" name=""/>
+        <p:cNvGrpSpPr/>
+        <p:nvPr/>
+      </p:nvGrpSpPr>
+      <p:grpSpPr>
+        <a:xfrm>
+          <a:off x="0" y="0"/>
+          <a:ext cx="0" cy="0"/>
+          <a:chOff x="0" y="0"/>
+          <a:chExt cx="0" cy="0"/>
+        </a:xfrm>
+      </p:grpSpPr>
+      <p:sp>
+        <p:nvSpPr>
+          <p:cNvPr id="2" name="Espace réservé de l'image des diapositives 1"/>
+          <p:cNvSpPr>
+            <a:spLocks noGrp="1" noRot="1" noChangeAspect="1"/>
+          </p:cNvSpPr>
+          <p:nvPr>
+            <p:ph type="sldImg"/>
+          </p:nvPr>
+        </p:nvSpPr>
+        <p:spPr/>
+      </p:sp>
+      <p:sp>
+        <p:nvSpPr>
+          <p:cNvPr id="3" name="Espace réservé des commentaires 2"/>
+          <p:cNvSpPr>
+            <a:spLocks noGrp="1"/>
+          </p:cNvSpPr>
+          <p:nvPr>
+            <p:ph type="body" idx="1"/>
+          </p:nvPr>
+        </p:nvSpPr>
+        <p:spPr/>
+        <p:txBody>
+          <a:bodyPr/>
+          <a:lstStyle/>
+          <a:p>
+            <a:endParaRPr lang="fr-FR" dirty="0"/>
+          </a:p>
+        </p:txBody>
+      </p:sp>
+      <p:sp>
+        <p:nvSpPr>
+          <p:cNvPr id="4" name="Espace réservé du numéro de diapositive 3"/>
+          <p:cNvSpPr>
+            <a:spLocks noGrp="1"/>
+          </p:cNvSpPr>
+          <p:nvPr>
+            <p:ph type="sldNum" sz="quarter" idx="10"/>
+          </p:nvPr>
+        </p:nvSpPr>
+        <p:spPr/>
+        <p:txBody>
+          <a:bodyPr/>
+          <a:lstStyle/>
+          <a:p>
+            <a:fld id="{250B77DF-6315-45C9-B503-67AC2F67F5E9}" type="slidenum">
+              <a:rPr lang="fr-FR" smtClean="0"/>
+              <a:t>6</a:t>
+            </a:fld>
+            <a:endParaRPr lang="fr-FR"/>
+          </a:p>
+        </p:txBody>
+      </p:sp>
+    </p:spTree>
+    <p:extLst>
+      <p:ext uri="{BB962C8B-B14F-4D97-AF65-F5344CB8AC3E}">
+        <p14:creationId xmlns:p14="http://schemas.microsoft.com/office/powerpoint/2010/main" val="203354392"/>
+      </p:ext>
+    </p:extLst>
+  </p:cSld>
+  <p:clrMapOvr>
+    <a:masterClrMapping/>
+  </p:clrMapOvr>
+</p:notes>
+</file>
+
+<file path=ppt/notesSlides/notesSlide6.xml><?xml version="1.0" encoding="utf-8"?>
+<p:notes xmlns:a="http://schemas.openxmlformats.org/drawingml/2006/main" xmlns:r="http://schemas.openxmlformats.org/officeDocument/2006/relationships" xmlns:p="http://schemas.openxmlformats.org/presentationml/2006/main">
+  <p:cSld>
+    <p:spTree>
+      <p:nvGrpSpPr>
+        <p:cNvPr id="1" name=""/>
+        <p:cNvGrpSpPr/>
+        <p:nvPr/>
+      </p:nvGrpSpPr>
+      <p:grpSpPr>
+        <a:xfrm>
+          <a:off x="0" y="0"/>
+          <a:ext cx="0" cy="0"/>
+          <a:chOff x="0" y="0"/>
+          <a:chExt cx="0" cy="0"/>
+        </a:xfrm>
+      </p:grpSpPr>
+      <p:sp>
+        <p:nvSpPr>
+          <p:cNvPr id="2" name="Espace réservé de l'image des diapositives 1"/>
+          <p:cNvSpPr>
+            <a:spLocks noGrp="1" noRot="1" noChangeAspect="1"/>
+          </p:cNvSpPr>
+          <p:nvPr>
+            <p:ph type="sldImg"/>
+          </p:nvPr>
+        </p:nvSpPr>
+        <p:spPr/>
+      </p:sp>
+      <p:sp>
+        <p:nvSpPr>
+          <p:cNvPr id="3" name="Espace réservé des commentaires 2"/>
+          <p:cNvSpPr>
+            <a:spLocks noGrp="1"/>
+          </p:cNvSpPr>
+          <p:nvPr>
+            <p:ph type="body" idx="1"/>
+          </p:nvPr>
+        </p:nvSpPr>
+        <p:spPr/>
+        <p:txBody>
+          <a:bodyPr/>
+          <a:lstStyle/>
+          <a:p>
+            <a:r>
+              <a:rPr lang="fr-FR" dirty="0" smtClean="0"/>
+              <a:t>Pendant</a:t>
+            </a:r>
+            <a:r>
+              <a:rPr lang="fr-FR" baseline="0" dirty="0" smtClean="0"/>
+              <a:t> le projet, nous avons eu différents problèmes plus ou moins gênant que nous avons du résoudre. Au début, nous avons commencés par étudier les outils que l’on nous avait fournit. On arrivait pas à faire fonctionner les exemples de tests fournis avec le système de </a:t>
+            </a:r>
+            <a:r>
+              <a:rPr lang="fr-FR" baseline="0" dirty="0" err="1" smtClean="0"/>
+              <a:t>gopiwan</a:t>
+            </a:r>
+            <a:r>
+              <a:rPr lang="fr-FR" baseline="0" dirty="0" smtClean="0"/>
+              <a:t>. Après plusieurs jours à chercher, on s’est finalement rendus compte qu’il ne s’agissait pas de la bonne bibliothèque et que celle qu’on utilisait était en fait développée pour des robots </a:t>
+            </a:r>
+            <a:r>
+              <a:rPr lang="fr-FR" baseline="0" dirty="0" err="1" smtClean="0"/>
+              <a:t>légo</a:t>
+            </a:r>
+            <a:r>
+              <a:rPr lang="fr-FR" baseline="0" dirty="0" smtClean="0"/>
+              <a:t> utilisant néanmoins des outils très similaires d’où notre difficulté à l’avoir détecté.</a:t>
+            </a:r>
+          </a:p>
+          <a:p>
+            <a:r>
+              <a:rPr lang="fr-FR" baseline="0" dirty="0" smtClean="0"/>
+              <a:t>Nous avons également eu un autre problème qui est survenu suite au précédent. En effet, quand nous avons pu utiliser la bonne bibliothèque de développement, nous nous sommes aperçut qu’il n’existait pas de version écrite en java mais uniquement une version Python et Scratch. </a:t>
+            </a:r>
+          </a:p>
+          <a:p>
+            <a:r>
+              <a:rPr lang="fr-FR" baseline="0" dirty="0" smtClean="0"/>
+              <a:t>Entre temps, une version java est sortie il y a quelques semaines de cela mais n’est pas encore complète.</a:t>
+            </a:r>
+          </a:p>
+          <a:p>
+            <a:r>
+              <a:rPr lang="fr-FR" baseline="0" dirty="0" smtClean="0"/>
+              <a:t>Nous avons eu également quelques problèmes de montages du robot pour qui il y avait par exemple la </a:t>
+            </a:r>
+            <a:r>
+              <a:rPr lang="fr-FR" baseline="0" dirty="0" err="1" smtClean="0"/>
+              <a:t>map</a:t>
+            </a:r>
+            <a:r>
+              <a:rPr lang="fr-FR" baseline="0" dirty="0" smtClean="0"/>
+              <a:t> de la caméra montée à l’envers et qui ne risquait donc pas de fonctionner.</a:t>
+            </a:r>
+          </a:p>
+          <a:p>
+            <a:r>
+              <a:rPr lang="fr-FR" baseline="0" dirty="0" smtClean="0"/>
+              <a:t>Un autre problème que l’on a pas tout à fait résolu, c’est une instabilité avec le </a:t>
+            </a:r>
+            <a:r>
+              <a:rPr lang="fr-FR" baseline="0" dirty="0" err="1" smtClean="0"/>
+              <a:t>dongle</a:t>
+            </a:r>
+            <a:r>
+              <a:rPr lang="fr-FR" baseline="0" dirty="0" smtClean="0"/>
+              <a:t> wifi qui a tendance à se déconnecter par moments.</a:t>
+            </a:r>
+            <a:endParaRPr lang="fr-FR" dirty="0"/>
+          </a:p>
+        </p:txBody>
+      </p:sp>
+      <p:sp>
+        <p:nvSpPr>
+          <p:cNvPr id="4" name="Espace réservé du numéro de diapositive 3"/>
+          <p:cNvSpPr>
+            <a:spLocks noGrp="1"/>
+          </p:cNvSpPr>
+          <p:nvPr>
+            <p:ph type="sldNum" sz="quarter" idx="10"/>
+          </p:nvPr>
+        </p:nvSpPr>
+        <p:spPr/>
+        <p:txBody>
+          <a:bodyPr/>
+          <a:lstStyle/>
+          <a:p>
+            <a:fld id="{250B77DF-6315-45C9-B503-67AC2F67F5E9}" type="slidenum">
+              <a:rPr lang="fr-FR" smtClean="0"/>
+              <a:t>7</a:t>
+            </a:fld>
+            <a:endParaRPr lang="fr-FR"/>
+          </a:p>
+        </p:txBody>
+      </p:sp>
+    </p:spTree>
+    <p:extLst>
+      <p:ext uri="{BB962C8B-B14F-4D97-AF65-F5344CB8AC3E}">
+        <p14:creationId xmlns:p14="http://schemas.microsoft.com/office/powerpoint/2010/main" val="3032762379"/>
+      </p:ext>
+    </p:extLst>
+  </p:cSld>
+  <p:clrMapOvr>
+    <a:masterClrMapping/>
+  </p:clrMapOvr>
+</p:notes>
+</file>
+
+<file path=ppt/notesSlides/notesSlide7.xml><?xml version="1.0" encoding="utf-8"?>
 <p:notes xmlns:a="http://schemas.openxmlformats.org/drawingml/2006/main" xmlns:r="http://schemas.openxmlformats.org/officeDocument/2006/relationships" xmlns:p="http://schemas.openxmlformats.org/presentationml/2006/main">
   <p:cSld>
     <p:spTree>
@@ -5258,7 +5490,7 @@
           <a:p>
             <a:fld id="{6D4C34AF-8B40-449D-B6D8-E89BDB7425C1}" type="datetime1">
               <a:rPr lang="en-US" smtClean="0"/>
-              <a:t>5/7/2015</a:t>
+              <a:t>5/9/2015</a:t>
             </a:fld>
             <a:endParaRPr lang="en-US" dirty="0"/>
           </a:p>
@@ -5520,7 +5752,7 @@
           <a:p>
             <a:fld id="{35FE612B-639F-466D-9D06-405B1955BB2D}" type="datetime1">
               <a:rPr lang="en-US" smtClean="0"/>
-              <a:t>5/7/2015</a:t>
+              <a:t>5/9/2015</a:t>
             </a:fld>
             <a:endParaRPr lang="en-US" dirty="0"/>
           </a:p>
@@ -5711,7 +5943,7 @@
           <a:p>
             <a:fld id="{3A5CEA6B-0855-4CA4-9D47-2BDDCC508169}" type="datetime1">
               <a:rPr lang="en-US" smtClean="0"/>
-              <a:t>5/7/2015</a:t>
+              <a:t>5/9/2015</a:t>
             </a:fld>
             <a:endParaRPr lang="en-US" dirty="0"/>
           </a:p>
@@ -5969,7 +6201,7 @@
           <a:p>
             <a:fld id="{33DB6AE9-4BCB-45ED-BC3B-6064B91BC127}" type="datetime1">
               <a:rPr lang="en-US" smtClean="0"/>
-              <a:t>5/7/2015</a:t>
+              <a:t>5/9/2015</a:t>
             </a:fld>
             <a:endParaRPr lang="en-US" dirty="0"/>
           </a:p>
@@ -6398,7 +6630,7 @@
           <a:p>
             <a:fld id="{518BB170-86D0-4059-9942-B29644B75E3E}" type="datetime1">
               <a:rPr lang="en-US" smtClean="0"/>
-              <a:t>5/7/2015</a:t>
+              <a:t>5/9/2015</a:t>
             </a:fld>
             <a:endParaRPr lang="en-US" dirty="0"/>
           </a:p>
@@ -6939,7 +7171,7 @@
           <a:p>
             <a:fld id="{0EE90A35-AAEA-439B-91BF-BB547B31E1B0}" type="datetime1">
               <a:rPr lang="en-US" smtClean="0"/>
-              <a:t>5/7/2015</a:t>
+              <a:t>5/9/2015</a:t>
             </a:fld>
             <a:endParaRPr lang="en-US" dirty="0"/>
           </a:p>
@@ -7654,7 +7886,7 @@
           <a:p>
             <a:fld id="{82C84819-2F57-4372-9542-DD2837546021}" type="datetime1">
               <a:rPr lang="en-US" smtClean="0"/>
-              <a:t>5/7/2015</a:t>
+              <a:t>5/9/2015</a:t>
             </a:fld>
             <a:endParaRPr lang="en-US" dirty="0"/>
           </a:p>
@@ -7819,7 +8051,7 @@
           <a:p>
             <a:fld id="{5B154E6C-7F32-46D5-A47A-27278982C20B}" type="datetime1">
               <a:rPr lang="en-US" smtClean="0"/>
-              <a:t>5/7/2015</a:t>
+              <a:t>5/9/2015</a:t>
             </a:fld>
             <a:endParaRPr lang="en-US" dirty="0"/>
           </a:p>
@@ -7994,7 +8226,7 @@
           <a:p>
             <a:fld id="{552BB747-5A63-42CE-B024-D2F39B07162E}" type="datetime1">
               <a:rPr lang="en-US" smtClean="0"/>
-              <a:t>5/7/2015</a:t>
+              <a:t>5/9/2015</a:t>
             </a:fld>
             <a:endParaRPr lang="en-US" dirty="0"/>
           </a:p>
@@ -8159,7 +8391,7 @@
           <a:p>
             <a:fld id="{AE4079F4-2BEA-4794-BD54-71F1F872D079}" type="datetime1">
               <a:rPr lang="en-US" smtClean="0"/>
-              <a:t>5/7/2015</a:t>
+              <a:t>5/9/2015</a:t>
             </a:fld>
             <a:endParaRPr lang="en-US" dirty="0"/>
           </a:p>
@@ -8404,7 +8636,7 @@
           <a:p>
             <a:fld id="{7863B0AC-0060-4FBC-A9C4-A7D9638CC704}" type="datetime1">
               <a:rPr lang="en-US" smtClean="0"/>
-              <a:t>5/7/2015</a:t>
+              <a:t>5/9/2015</a:t>
             </a:fld>
             <a:endParaRPr lang="en-US" dirty="0"/>
           </a:p>
@@ -8631,7 +8863,7 @@
           <a:p>
             <a:fld id="{293E1F8B-5232-4B17-A3F5-E6094C9EC9A2}" type="datetime1">
               <a:rPr lang="en-US" smtClean="0"/>
-              <a:t>5/7/2015</a:t>
+              <a:t>5/9/2015</a:t>
             </a:fld>
             <a:endParaRPr lang="en-US" dirty="0"/>
           </a:p>
@@ -9007,7 +9239,7 @@
           <a:p>
             <a:fld id="{048E5C3C-AA6E-4588-9506-F12EA8D61728}" type="datetime1">
               <a:rPr lang="en-US" smtClean="0"/>
-              <a:t>5/7/2015</a:t>
+              <a:t>5/9/2015</a:t>
             </a:fld>
             <a:endParaRPr lang="en-US" dirty="0"/>
           </a:p>
@@ -9120,7 +9352,7 @@
           <a:p>
             <a:fld id="{D3205C4F-4BB0-44FD-AE0E-07F23D2DF006}" type="datetime1">
               <a:rPr lang="en-US" smtClean="0"/>
-              <a:t>5/7/2015</a:t>
+              <a:t>5/9/2015</a:t>
             </a:fld>
             <a:endParaRPr lang="en-US" dirty="0"/>
           </a:p>
@@ -9210,7 +9442,7 @@
           <a:p>
             <a:fld id="{76A12A4D-2121-4238-A1B7-C22A5B5F326D}" type="datetime1">
               <a:rPr lang="en-US" smtClean="0"/>
-              <a:t>5/7/2015</a:t>
+              <a:t>5/9/2015</a:t>
             </a:fld>
             <a:endParaRPr lang="en-US" dirty="0"/>
           </a:p>
@@ -9454,7 +9686,7 @@
           <a:p>
             <a:fld id="{C1526EDA-0148-424B-AB64-452932D8E34E}" type="datetime1">
               <a:rPr lang="en-US" smtClean="0"/>
-              <a:t>5/7/2015</a:t>
+              <a:t>5/9/2015</a:t>
             </a:fld>
             <a:endParaRPr lang="en-US" dirty="0"/>
           </a:p>
@@ -9729,7 +9961,7 @@
           <a:p>
             <a:fld id="{4AC485A9-C4E9-4C78-93B1-C1614481F2AD}" type="datetime1">
               <a:rPr lang="en-US" smtClean="0"/>
-              <a:t>5/7/2015</a:t>
+              <a:t>5/9/2015</a:t>
             </a:fld>
             <a:endParaRPr lang="en-US" dirty="0"/>
           </a:p>
@@ -12791,7 +13023,7 @@
           <a:p>
             <a:fld id="{6A05E64A-4F99-43A0-91F2-7A20BD946D18}" type="datetime1">
               <a:rPr lang="en-US" smtClean="0"/>
-              <a:t>5/7/2015</a:t>
+              <a:t>5/9/2015</a:t>
             </a:fld>
             <a:endParaRPr lang="en-US" dirty="0"/>
           </a:p>
@@ -13434,7 +13666,6 @@
               <a:rPr lang="fr-FR" sz="2800" dirty="0" smtClean="0"/>
               <a:t>Répartition des tâches</a:t>
             </a:r>
-            <a:endParaRPr lang="fr-FR" sz="2800" dirty="0" smtClean="0"/>
           </a:p>
           <a:p>
             <a:r>
@@ -13603,6 +13834,66 @@
           </a:p>
         </p:txBody>
       </p:sp>
+      <p:pic>
+        <p:nvPicPr>
+          <p:cNvPr id="5" name="Image 4"/>
+          <p:cNvPicPr>
+            <a:picLocks noChangeAspect="1"/>
+          </p:cNvPicPr>
+          <p:nvPr/>
+        </p:nvPicPr>
+        <p:blipFill>
+          <a:blip r:embed="rId3">
+            <a:extLst>
+              <a:ext uri="{28A0092B-C50C-407E-A947-70E740481C1C}">
+                <a14:useLocalDpi xmlns:a14="http://schemas.microsoft.com/office/drawing/2010/main" val="0"/>
+              </a:ext>
+            </a:extLst>
+          </a:blip>
+          <a:stretch>
+            <a:fillRect/>
+          </a:stretch>
+        </p:blipFill>
+        <p:spPr>
+          <a:xfrm>
+            <a:off x="2783525" y="4304533"/>
+            <a:ext cx="2095500" cy="2095500"/>
+          </a:xfrm>
+          <a:prstGeom prst="rect">
+            <a:avLst/>
+          </a:prstGeom>
+        </p:spPr>
+      </p:pic>
+      <p:pic>
+        <p:nvPicPr>
+          <p:cNvPr id="7" name="Image 6"/>
+          <p:cNvPicPr>
+            <a:picLocks noChangeAspect="1"/>
+          </p:cNvPicPr>
+          <p:nvPr/>
+        </p:nvPicPr>
+        <p:blipFill>
+          <a:blip r:embed="rId4">
+            <a:extLst>
+              <a:ext uri="{28A0092B-C50C-407E-A947-70E740481C1C}">
+                <a14:useLocalDpi xmlns:a14="http://schemas.microsoft.com/office/drawing/2010/main" val="0"/>
+              </a:ext>
+            </a:extLst>
+          </a:blip>
+          <a:stretch>
+            <a:fillRect/>
+          </a:stretch>
+        </p:blipFill>
+        <p:spPr>
+          <a:xfrm>
+            <a:off x="7178190" y="2021350"/>
+            <a:ext cx="3692240" cy="2757035"/>
+          </a:xfrm>
+          <a:prstGeom prst="rect">
+            <a:avLst/>
+          </a:prstGeom>
+        </p:spPr>
+      </p:pic>
     </p:spTree>
     <p:extLst>
       <p:ext uri="{BB962C8B-B14F-4D97-AF65-F5344CB8AC3E}">
@@ -13685,11 +13976,7 @@
           <a:p>
             <a:r>
               <a:rPr lang="fr-FR" dirty="0" smtClean="0"/>
-              <a:t>Mouvements (avant, arrière, droite, </a:t>
-            </a:r>
-            <a:r>
-              <a:rPr lang="fr-FR" dirty="0" smtClean="0"/>
-              <a:t>gauche, rotation, …etc</a:t>
+              <a:t>Mouvements (avant, arrière, droite, gauche, rotation, …etc</a:t>
             </a:r>
             <a:r>
               <a:rPr lang="fr-FR" dirty="0"/>
@@ -13699,7 +13986,6 @@
               <a:rPr lang="fr-FR" dirty="0" smtClean="0"/>
               <a:t>)</a:t>
             </a:r>
-            <a:endParaRPr lang="fr-FR" dirty="0" smtClean="0"/>
           </a:p>
           <a:p>
             <a:r>
@@ -13922,7 +14208,7 @@
           </p:nvPr>
         </p:nvPicPr>
         <p:blipFill>
-          <a:blip r:embed="rId2">
+          <a:blip r:embed="rId3">
             <a:extLst>
               <a:ext uri="{28A0092B-C50C-407E-A947-70E740481C1C}">
                 <a14:useLocalDpi xmlns:a14="http://schemas.microsoft.com/office/drawing/2010/main" val="0"/>
@@ -14011,11 +14297,7 @@
             <a:pPr algn="ctr"/>
             <a:r>
               <a:rPr lang="fr-FR" dirty="0" smtClean="0"/>
-              <a:t>Problèmes </a:t>
-            </a:r>
-            <a:r>
-              <a:rPr lang="fr-FR" dirty="0" smtClean="0"/>
-              <a:t>rencontrés</a:t>
+              <a:t>Problèmes rencontrés</a:t>
             </a:r>
             <a:endParaRPr lang="fr-FR" dirty="0"/>
           </a:p>
@@ -14037,35 +14319,39 @@
           <a:lstStyle/>
           <a:p>
             <a:r>
+              <a:rPr lang="fr-FR" dirty="0"/>
+              <a:t>Bibliothèque non adaptée avec la carte </a:t>
+            </a:r>
+            <a:r>
               <a:rPr lang="fr-FR" dirty="0" smtClean="0"/>
-              <a:t>Pas de bibliothèque </a:t>
-            </a:r>
+              <a:t>fournie</a:t>
+            </a:r>
+            <a:endParaRPr lang="fr-FR" dirty="0" smtClean="0"/>
+          </a:p>
+          <a:p>
             <a:r>
               <a:rPr lang="fr-FR" dirty="0" smtClean="0"/>
-              <a:t>java (uniquement python)</a:t>
-            </a:r>
-            <a:endParaRPr lang="fr-FR" dirty="0" smtClean="0"/>
-          </a:p>
-          <a:p>
+              <a:t>Pas </a:t>
+            </a:r>
             <a:r>
               <a:rPr lang="fr-FR" dirty="0" smtClean="0"/>
-              <a:t>Problème </a:t>
-            </a:r>
+              <a:t>de bibliothèque java (uniquement python)</a:t>
+            </a:r>
+          </a:p>
+          <a:p>
             <a:r>
               <a:rPr lang="fr-FR" dirty="0" smtClean="0"/>
-              <a:t>de montage</a:t>
+              <a:t>Problème de montage</a:t>
             </a:r>
           </a:p>
           <a:p>
             <a:r>
               <a:rPr lang="fr-FR" dirty="0" smtClean="0"/>
-              <a:t>Bibliothèque non adaptée avec la carte fournie</a:t>
-            </a:r>
-          </a:p>
-          <a:p>
+              <a:t>Connexion </a:t>
+            </a:r>
             <a:r>
               <a:rPr lang="fr-FR" dirty="0" smtClean="0"/>
-              <a:t>Connexion wifi du robot instable</a:t>
+              <a:t>wifi du robot instable</a:t>
             </a:r>
           </a:p>
           <a:p>

</xml_diff>

<commit_message>
Suite des commentaires du diapo, ajout du logo ubs, ...etc
</commit_message>
<xml_diff>
--- a/Documents/diaporama_soutenance.pptx
+++ b/Documents/diaporama_soutenance.pptx
@@ -517,18 +517,6 @@
           <a:bodyPr/>
           <a:lstStyle/>
           <a:p>
-            <a:r>
-              <a:rPr lang="fr-FR" dirty="0" smtClean="0"/>
-              <a:t>[ajouter logo </a:t>
-            </a:r>
-            <a:r>
-              <a:rPr lang="fr-FR" dirty="0" err="1" smtClean="0"/>
-              <a:t>gopiwan</a:t>
-            </a:r>
-            <a:r>
-              <a:rPr lang="fr-FR" baseline="0" dirty="0" smtClean="0"/>
-              <a:t> et logo UBS]</a:t>
-            </a:r>
             <a:endParaRPr lang="fr-FR" dirty="0"/>
           </a:p>
         </p:txBody>
@@ -742,16 +730,6 @@
               <a:t>des piles pour son autonomie, une carte mémoire pour le système, une clé wifi, des capteurs au niveau des roues (non utilisées pour le projet) et une carte contrôleur pour le contrôle des moteurs des deux roues du robot.</a:t>
             </a:r>
           </a:p>
-          <a:p>
-            <a:endParaRPr lang="fr-FR" baseline="0" dirty="0" smtClean="0"/>
-          </a:p>
-          <a:p>
-            <a:r>
-              <a:rPr lang="fr-FR" baseline="0" dirty="0" smtClean="0"/>
-              <a:t>[Ajouter image robot/cartes]</a:t>
-            </a:r>
-            <a:endParaRPr lang="fr-FR" dirty="0"/>
-          </a:p>
         </p:txBody>
       </p:sp>
       <p:sp>
@@ -834,6 +812,35 @@
           <a:bodyPr/>
           <a:lstStyle/>
           <a:p>
+            <a:r>
+              <a:rPr lang="fr-FR" dirty="0" smtClean="0"/>
+              <a:t>Nous avons implémentés</a:t>
+            </a:r>
+            <a:r>
+              <a:rPr lang="fr-FR" baseline="0" dirty="0" smtClean="0"/>
+              <a:t> les différentes actions de bases que doit pouvoir faire le robot c’est-à-dire les mouvement avant, arrière droite et gauche ainsi que la gestion de la caméra.</a:t>
+            </a:r>
+          </a:p>
+          <a:p>
+            <a:endParaRPr lang="fr-FR" dirty="0" smtClean="0"/>
+          </a:p>
+          <a:p>
+            <a:r>
+              <a:rPr lang="fr-FR" dirty="0" smtClean="0"/>
+              <a:t>Concernant le client qui permet de piloter le robot,</a:t>
+            </a:r>
+            <a:r>
+              <a:rPr lang="fr-FR" baseline="0" dirty="0" smtClean="0"/>
+              <a:t> il s’agit d’une interface web. A la base, nous avions commencés une application </a:t>
+            </a:r>
+            <a:r>
+              <a:rPr lang="fr-FR" baseline="0" dirty="0" err="1" smtClean="0"/>
+              <a:t>android</a:t>
+            </a:r>
+            <a:r>
+              <a:rPr lang="fr-FR" baseline="0" dirty="0" smtClean="0"/>
+              <a:t> qui était quasi fonctionnelle car assez simple puisqu’il suffisait d’envoyer des requêtes GET ou POST au robot afin d’effectuer les actions que l’on souhaitait. Cette application a finalement été abandonnée pour faire une interface web à la place mais il ne serait pas difficile de la terminer si besoin. D’ailleurs de façon général, le fait qu’on dispose d’une architecture REST simplifie énormément le développement de divers client pour piloter le robot.</a:t>
+            </a:r>
             <a:endParaRPr lang="fr-FR" dirty="0"/>
           </a:p>
         </p:txBody>
@@ -855,7 +862,7 @@
           <a:p>
             <a:fld id="{250B77DF-6315-45C9-B503-67AC2F67F5E9}" type="slidenum">
               <a:rPr lang="fr-FR" smtClean="0"/>
-              <a:t>5</a:t>
+              <a:t>4</a:t>
             </a:fld>
             <a:endParaRPr lang="fr-FR"/>
           </a:p>
@@ -864,7 +871,7 @@
     </p:spTree>
     <p:extLst>
       <p:ext uri="{BB962C8B-B14F-4D97-AF65-F5344CB8AC3E}">
-        <p14:creationId xmlns:p14="http://schemas.microsoft.com/office/powerpoint/2010/main" val="4168324062"/>
+        <p14:creationId xmlns:p14="http://schemas.microsoft.com/office/powerpoint/2010/main" val="82982605"/>
       </p:ext>
     </p:extLst>
   </p:cSld>
@@ -939,7 +946,7 @@
           <a:p>
             <a:fld id="{250B77DF-6315-45C9-B503-67AC2F67F5E9}" type="slidenum">
               <a:rPr lang="fr-FR" smtClean="0"/>
-              <a:t>6</a:t>
+              <a:t>5</a:t>
             </a:fld>
             <a:endParaRPr lang="fr-FR"/>
           </a:p>
@@ -948,7 +955,7 @@
     </p:spTree>
     <p:extLst>
       <p:ext uri="{BB962C8B-B14F-4D97-AF65-F5344CB8AC3E}">
-        <p14:creationId xmlns:p14="http://schemas.microsoft.com/office/powerpoint/2010/main" val="203354392"/>
+        <p14:creationId xmlns:p14="http://schemas.microsoft.com/office/powerpoint/2010/main" val="4168324062"/>
       </p:ext>
     </p:extLst>
   </p:cSld>
@@ -1002,70 +1009,6 @@
           <a:bodyPr/>
           <a:lstStyle/>
           <a:p>
-            <a:r>
-              <a:rPr lang="fr-FR" dirty="0" smtClean="0"/>
-              <a:t>Pendant</a:t>
-            </a:r>
-            <a:r>
-              <a:rPr lang="fr-FR" baseline="0" dirty="0" smtClean="0"/>
-              <a:t> le projet, nous avons eu différents problèmes plus ou moins gênant que nous avons du résoudre. Au début, nous avons commencés par étudier les outils que l’on nous avait fournit. On arrivait pas à faire fonctionner les exemples de tests fournis avec le système de </a:t>
-            </a:r>
-            <a:r>
-              <a:rPr lang="fr-FR" baseline="0" dirty="0" err="1" smtClean="0"/>
-              <a:t>gopiwan</a:t>
-            </a:r>
-            <a:r>
-              <a:rPr lang="fr-FR" baseline="0" dirty="0" smtClean="0"/>
-              <a:t>. Après plusieurs jours à chercher, on s’est finalement rendus compte qu’il ne s’agissait pas de la bonne bibliothèque et que celle qu’on utilisait était en fait développée pour des robots </a:t>
-            </a:r>
-            <a:r>
-              <a:rPr lang="fr-FR" baseline="0" dirty="0" err="1" smtClean="0"/>
-              <a:t>légo</a:t>
-            </a:r>
-            <a:r>
-              <a:rPr lang="fr-FR" baseline="0" dirty="0" smtClean="0"/>
-              <a:t> utilisant néanmoins des outils très similaires d’où notre difficulté à l’avoir détecté.</a:t>
-            </a:r>
-          </a:p>
-          <a:p>
-            <a:r>
-              <a:rPr lang="fr-FR" baseline="0" dirty="0" smtClean="0"/>
-              <a:t>Nous avons également eu un autre problème qui est survenu suite au précédent. En effet, quand nous avons pu utiliser la bonne bibliothèque de développement, nous nous sommes aperçut qu’il n’existait pas de version écrite en java mais uniquement une version Python et Scratch. </a:t>
-            </a:r>
-          </a:p>
-          <a:p>
-            <a:r>
-              <a:rPr lang="fr-FR" baseline="0" dirty="0" smtClean="0"/>
-              <a:t>Entre temps, une version java est sortie il y a quelques semaines de cela mais n’est pas encore complète.</a:t>
-            </a:r>
-          </a:p>
-          <a:p>
-            <a:r>
-              <a:rPr lang="fr-FR" baseline="0" dirty="0" smtClean="0"/>
-              <a:t>Nous avons eu également quelques problèmes de montages du robot pour qui il y avait par exemple la </a:t>
-            </a:r>
-            <a:r>
-              <a:rPr lang="fr-FR" baseline="0" dirty="0" err="1" smtClean="0"/>
-              <a:t>map</a:t>
-            </a:r>
-            <a:r>
-              <a:rPr lang="fr-FR" baseline="0" dirty="0" smtClean="0"/>
-              <a:t> de la caméra montée à l’envers et qui ne risquait donc pas de fonctionner.</a:t>
-            </a:r>
-          </a:p>
-          <a:p>
-            <a:r>
-              <a:rPr lang="fr-FR" baseline="0" dirty="0" smtClean="0"/>
-              <a:t>Un autre problème que l’on a pas tout à fait résolu, c’est une instabilité avec le </a:t>
-            </a:r>
-            <a:r>
-              <a:rPr lang="fr-FR" baseline="0" dirty="0" err="1" smtClean="0"/>
-              <a:t>dongle</a:t>
-            </a:r>
-            <a:r>
-              <a:rPr lang="fr-FR" baseline="0" dirty="0" smtClean="0"/>
-              <a:t> wifi qui a tendance à se déconnecter par moments.</a:t>
-            </a:r>
             <a:endParaRPr lang="fr-FR" dirty="0"/>
           </a:p>
         </p:txBody>
@@ -1087,7 +1030,7 @@
           <a:p>
             <a:fld id="{250B77DF-6315-45C9-B503-67AC2F67F5E9}" type="slidenum">
               <a:rPr lang="fr-FR" smtClean="0"/>
-              <a:t>7</a:t>
+              <a:t>6</a:t>
             </a:fld>
             <a:endParaRPr lang="fr-FR"/>
           </a:p>
@@ -1096,7 +1039,7 @@
     </p:spTree>
     <p:extLst>
       <p:ext uri="{BB962C8B-B14F-4D97-AF65-F5344CB8AC3E}">
-        <p14:creationId xmlns:p14="http://schemas.microsoft.com/office/powerpoint/2010/main" val="3032762379"/>
+        <p14:creationId xmlns:p14="http://schemas.microsoft.com/office/powerpoint/2010/main" val="203354392"/>
       </p:ext>
     </p:extLst>
   </p:cSld>
@@ -1152,6 +1095,154 @@
           <a:p>
             <a:r>
               <a:rPr lang="fr-FR" dirty="0" smtClean="0"/>
+              <a:t>Pendant</a:t>
+            </a:r>
+            <a:r>
+              <a:rPr lang="fr-FR" baseline="0" dirty="0" smtClean="0"/>
+              <a:t> le projet, nous avons eu différents problèmes plus ou moins gênant que nous avons du résoudre. Au début, nous avons commencés par étudier les outils que l’on nous avait fournit. On arrivait pas à faire fonctionner les exemples de tests fournis avec le système de </a:t>
+            </a:r>
+            <a:r>
+              <a:rPr lang="fr-FR" baseline="0" dirty="0" err="1" smtClean="0"/>
+              <a:t>gopiwan</a:t>
+            </a:r>
+            <a:r>
+              <a:rPr lang="fr-FR" baseline="0" dirty="0" smtClean="0"/>
+              <a:t>. Après plusieurs jours à chercher, on s’est finalement rendus compte qu’il ne s’agissait pas de la bonne bibliothèque et que celle qu’on utilisait était en fait développée pour des robots </a:t>
+            </a:r>
+            <a:r>
+              <a:rPr lang="fr-FR" baseline="0" dirty="0" err="1" smtClean="0"/>
+              <a:t>légo</a:t>
+            </a:r>
+            <a:r>
+              <a:rPr lang="fr-FR" baseline="0" dirty="0" smtClean="0"/>
+              <a:t> utilisant néanmoins des outils très similaires d’où notre difficulté à l’avoir détecté.</a:t>
+            </a:r>
+          </a:p>
+          <a:p>
+            <a:r>
+              <a:rPr lang="fr-FR" baseline="0" dirty="0" smtClean="0"/>
+              <a:t>Nous avons également eu un autre problème qui est survenu suite au précédent. En effet, quand nous avons pu utiliser la bonne bibliothèque de développement, nous nous sommes aperçut qu’il n’existait pas de version écrite en java mais uniquement une version Python et Scratch. Nous avons donc résolu le problème en utilisant un daemon python pour pouvoir continuer le projet.</a:t>
+            </a:r>
+          </a:p>
+          <a:p>
+            <a:r>
+              <a:rPr lang="fr-FR" baseline="0" dirty="0" smtClean="0"/>
+              <a:t>Entre temps, une version java est sortie il y a quelques semaines de cela mais n’est pas encore complète.</a:t>
+            </a:r>
+          </a:p>
+          <a:p>
+            <a:r>
+              <a:rPr lang="fr-FR" baseline="0" dirty="0" smtClean="0"/>
+              <a:t>Nous avons eu également quelques problèmes de montages du robot pour qui il y avait par exemple la </a:t>
+            </a:r>
+            <a:r>
+              <a:rPr lang="fr-FR" baseline="0" dirty="0" err="1" smtClean="0"/>
+              <a:t>map</a:t>
+            </a:r>
+            <a:r>
+              <a:rPr lang="fr-FR" baseline="0" dirty="0" smtClean="0"/>
+              <a:t> de la caméra montée à l’envers et qui ne risquait donc pas de fonctionner.</a:t>
+            </a:r>
+          </a:p>
+          <a:p>
+            <a:r>
+              <a:rPr lang="fr-FR" baseline="0" dirty="0" smtClean="0"/>
+              <a:t>Un autre problème que l’on a pas tout à fait résolu, c’est une instabilité avec le </a:t>
+            </a:r>
+            <a:r>
+              <a:rPr lang="fr-FR" baseline="0" dirty="0" err="1" smtClean="0"/>
+              <a:t>dongle</a:t>
+            </a:r>
+            <a:r>
+              <a:rPr lang="fr-FR" baseline="0" dirty="0" smtClean="0"/>
+              <a:t> wifi qui a tendance à se déconnecter par moments.</a:t>
+            </a:r>
+            <a:endParaRPr lang="fr-FR" dirty="0"/>
+          </a:p>
+        </p:txBody>
+      </p:sp>
+      <p:sp>
+        <p:nvSpPr>
+          <p:cNvPr id="4" name="Espace réservé du numéro de diapositive 3"/>
+          <p:cNvSpPr>
+            <a:spLocks noGrp="1"/>
+          </p:cNvSpPr>
+          <p:nvPr>
+            <p:ph type="sldNum" sz="quarter" idx="10"/>
+          </p:nvPr>
+        </p:nvSpPr>
+        <p:spPr/>
+        <p:txBody>
+          <a:bodyPr/>
+          <a:lstStyle/>
+          <a:p>
+            <a:fld id="{250B77DF-6315-45C9-B503-67AC2F67F5E9}" type="slidenum">
+              <a:rPr lang="fr-FR" smtClean="0"/>
+              <a:t>7</a:t>
+            </a:fld>
+            <a:endParaRPr lang="fr-FR"/>
+          </a:p>
+        </p:txBody>
+      </p:sp>
+    </p:spTree>
+    <p:extLst>
+      <p:ext uri="{BB962C8B-B14F-4D97-AF65-F5344CB8AC3E}">
+        <p14:creationId xmlns:p14="http://schemas.microsoft.com/office/powerpoint/2010/main" val="3032762379"/>
+      </p:ext>
+    </p:extLst>
+  </p:cSld>
+  <p:clrMapOvr>
+    <a:masterClrMapping/>
+  </p:clrMapOvr>
+</p:notes>
+</file>
+
+<file path=ppt/notesSlides/notesSlide8.xml><?xml version="1.0" encoding="utf-8"?>
+<p:notes xmlns:a="http://schemas.openxmlformats.org/drawingml/2006/main" xmlns:r="http://schemas.openxmlformats.org/officeDocument/2006/relationships" xmlns:p="http://schemas.openxmlformats.org/presentationml/2006/main">
+  <p:cSld>
+    <p:spTree>
+      <p:nvGrpSpPr>
+        <p:cNvPr id="1" name=""/>
+        <p:cNvGrpSpPr/>
+        <p:nvPr/>
+      </p:nvGrpSpPr>
+      <p:grpSpPr>
+        <a:xfrm>
+          <a:off x="0" y="0"/>
+          <a:ext cx="0" cy="0"/>
+          <a:chOff x="0" y="0"/>
+          <a:chExt cx="0" cy="0"/>
+        </a:xfrm>
+      </p:grpSpPr>
+      <p:sp>
+        <p:nvSpPr>
+          <p:cNvPr id="2" name="Espace réservé de l'image des diapositives 1"/>
+          <p:cNvSpPr>
+            <a:spLocks noGrp="1" noRot="1" noChangeAspect="1"/>
+          </p:cNvSpPr>
+          <p:nvPr>
+            <p:ph type="sldImg"/>
+          </p:nvPr>
+        </p:nvSpPr>
+        <p:spPr/>
+      </p:sp>
+      <p:sp>
+        <p:nvSpPr>
+          <p:cNvPr id="3" name="Espace réservé des commentaires 2"/>
+          <p:cNvSpPr>
+            <a:spLocks noGrp="1"/>
+          </p:cNvSpPr>
+          <p:nvPr>
+            <p:ph type="body" idx="1"/>
+          </p:nvPr>
+        </p:nvSpPr>
+        <p:spPr/>
+        <p:txBody>
+          <a:bodyPr/>
+          <a:lstStyle/>
+          <a:p>
+            <a:r>
+              <a:rPr lang="fr-FR" dirty="0" smtClean="0"/>
               <a:t>Pour réaliser </a:t>
             </a:r>
             <a:r>
@@ -1160,13 +1251,18 @@
             </a:r>
             <a:r>
               <a:rPr lang="fr-FR" baseline="0" dirty="0" smtClean="0"/>
-              <a:t> qui consistait donc à commander à distance le robot, cela nous a prit une 100aine d’heure pour configurer le robot, réaliser l’API REST notamment avec les bibliothèque [indiquer les noms ici].</a:t>
-            </a:r>
+              <a:t> qui consistait donc à commander à distance le robot, cela nous a prit une 100 à 200 heures pour configurer le robot, réaliser l’API REST notamment avec Jersey qui est embarqué dans le serveur </a:t>
+            </a:r>
+            <a:r>
+              <a:rPr lang="fr-FR" baseline="0" dirty="0" err="1" smtClean="0"/>
+              <a:t>Jetty</a:t>
+            </a:r>
+            <a:endParaRPr lang="fr-FR" baseline="0" dirty="0" smtClean="0"/>
           </a:p>
           <a:p>
             <a:r>
               <a:rPr lang="fr-FR" baseline="0" dirty="0" smtClean="0"/>
-              <a:t>Nous avons grâce à ce projet eu l’occasion d’apprendre à utiliser différentes technologies que nous ne maitrisions pas forcément.</a:t>
+              <a:t>Nous avons donc, grâce à ce projet eu l’occasion d’apprendre à utiliser différentes technologies que nous ne maitrisions pas forcément mais qui pourront nous êtres très utiles dans un avenir relativement proche au vu du développement ces dernières années et dans les années qui vont venir des objets connectés.</a:t>
             </a:r>
             <a:endParaRPr lang="fr-FR" dirty="0"/>
           </a:p>
@@ -13476,7 +13572,7 @@
         </p:nvSpPr>
         <p:spPr>
           <a:xfrm>
-            <a:off x="1876425" y="3602038"/>
+            <a:off x="2422116" y="3583074"/>
             <a:ext cx="1362076" cy="1655762"/>
           </a:xfrm>
         </p:spPr>
@@ -13563,6 +13659,66 @@
             <a:r>
               <a:rPr lang="fr-FR" dirty="0" err="1" smtClean="0"/>
               <a:t>Loueslati</a:t>
+            </a:r>
+            <a:endParaRPr lang="fr-FR" dirty="0"/>
+          </a:p>
+        </p:txBody>
+      </p:sp>
+      <p:pic>
+        <p:nvPicPr>
+          <p:cNvPr id="5" name="Image 4"/>
+          <p:cNvPicPr>
+            <a:picLocks noChangeAspect="1"/>
+          </p:cNvPicPr>
+          <p:nvPr/>
+        </p:nvPicPr>
+        <p:blipFill>
+          <a:blip r:embed="rId3">
+            <a:extLst>
+              <a:ext uri="{28A0092B-C50C-407E-A947-70E740481C1C}">
+                <a14:useLocalDpi xmlns:a14="http://schemas.microsoft.com/office/drawing/2010/main" val="0"/>
+              </a:ext>
+            </a:extLst>
+          </a:blip>
+          <a:stretch>
+            <a:fillRect/>
+          </a:stretch>
+        </p:blipFill>
+        <p:spPr>
+          <a:xfrm>
+            <a:off x="2382262" y="4228571"/>
+            <a:ext cx="1441784" cy="2020529"/>
+          </a:xfrm>
+          <a:prstGeom prst="rect">
+            <a:avLst/>
+          </a:prstGeom>
+        </p:spPr>
+      </p:pic>
+      <p:sp>
+        <p:nvSpPr>
+          <p:cNvPr id="6" name="ZoneTexte 5"/>
+          <p:cNvSpPr txBox="1"/>
+          <p:nvPr/>
+        </p:nvSpPr>
+        <p:spPr>
+          <a:xfrm>
+            <a:off x="10397614" y="5879768"/>
+            <a:ext cx="1336740" cy="369332"/>
+          </a:xfrm>
+          <a:prstGeom prst="rect">
+            <a:avLst/>
+          </a:prstGeom>
+          <a:noFill/>
+        </p:spPr>
+        <p:txBody>
+          <a:bodyPr wrap="square" rtlCol="0">
+            <a:spAutoFit/>
+          </a:bodyPr>
+          <a:lstStyle/>
+          <a:p>
+            <a:r>
+              <a:rPr lang="fr-FR" dirty="0" smtClean="0"/>
+              <a:t>Année 2015</a:t>
             </a:r>
             <a:endParaRPr lang="fr-FR" dirty="0"/>
           </a:p>
@@ -13796,6 +13952,10 @@
             <a:r>
               <a:rPr lang="fr-FR" dirty="0" err="1" smtClean="0"/>
               <a:t>Raspberry</a:t>
+            </a:r>
+            <a:r>
+              <a:rPr lang="fr-FR" dirty="0" smtClean="0"/>
+              <a:t> pi</a:t>
             </a:r>
             <a:endParaRPr lang="fr-FR" dirty="0"/>
           </a:p>
@@ -13952,8 +14112,8 @@
               <a:t>Fonctionnalités </a:t>
             </a:r>
             <a:r>
-              <a:rPr lang="fr-FR" dirty="0" err="1" smtClean="0"/>
-              <a:t>implémantées</a:t>
+              <a:rPr lang="fr-FR" dirty="0" smtClean="0"/>
+              <a:t>implémentées</a:t>
             </a:r>
             <a:endParaRPr lang="fr-FR" dirty="0"/>
           </a:p>
@@ -14002,8 +14162,21 @@
           <a:p>
             <a:r>
               <a:rPr lang="fr-FR" dirty="0" smtClean="0"/>
-              <a:t>Interface web REST</a:t>
-            </a:r>
+              <a:t>Interface </a:t>
+            </a:r>
+            <a:r>
+              <a:rPr lang="fr-FR" dirty="0" smtClean="0"/>
+              <a:t>web pour piloter </a:t>
+            </a:r>
+            <a:r>
+              <a:rPr lang="fr-FR" dirty="0" err="1"/>
+              <a:t>G</a:t>
+            </a:r>
+            <a:r>
+              <a:rPr lang="fr-FR" dirty="0" err="1" smtClean="0"/>
+              <a:t>opiwan</a:t>
+            </a:r>
+            <a:endParaRPr lang="fr-FR" dirty="0" smtClean="0"/>
           </a:p>
         </p:txBody>
       </p:sp>
@@ -14326,16 +14499,11 @@
               <a:rPr lang="fr-FR" dirty="0" smtClean="0"/>
               <a:t>fournie</a:t>
             </a:r>
-            <a:endParaRPr lang="fr-FR" dirty="0" smtClean="0"/>
           </a:p>
           <a:p>
             <a:r>
               <a:rPr lang="fr-FR" dirty="0" smtClean="0"/>
-              <a:t>Pas </a:t>
-            </a:r>
-            <a:r>
-              <a:rPr lang="fr-FR" dirty="0" smtClean="0"/>
-              <a:t>de bibliothèque java (uniquement python)</a:t>
+              <a:t>Pas de bibliothèque java (uniquement python)</a:t>
             </a:r>
           </a:p>
           <a:p>
@@ -14347,11 +14515,7 @@
           <a:p>
             <a:r>
               <a:rPr lang="fr-FR" dirty="0" smtClean="0"/>
-              <a:t>Connexion </a:t>
-            </a:r>
-            <a:r>
-              <a:rPr lang="fr-FR" dirty="0" smtClean="0"/>
-              <a:t>wifi du robot instable</a:t>
+              <a:t>Connexion wifi du robot instable</a:t>
             </a:r>
           </a:p>
           <a:p>
@@ -14521,7 +14685,12 @@
             <p:ph type="title"/>
           </p:nvPr>
         </p:nvSpPr>
-        <p:spPr/>
+        <p:spPr>
+          <a:xfrm>
+            <a:off x="1141412" y="678844"/>
+            <a:ext cx="9905998" cy="1478570"/>
+          </a:xfrm>
+        </p:spPr>
         <p:txBody>
           <a:bodyPr/>
           <a:lstStyle/>
@@ -14555,16 +14724,42 @@
             </a:pPr>
             <a:r>
               <a:rPr lang="fr-FR" dirty="0" smtClean="0"/>
-              <a:t>API REST</a:t>
-            </a:r>
+              <a:t>Serveur </a:t>
+            </a:r>
+            <a:r>
+              <a:rPr lang="fr-FR" dirty="0" err="1" smtClean="0"/>
+              <a:t>Jetty</a:t>
+            </a:r>
+            <a:endParaRPr lang="fr-FR" dirty="0" smtClean="0"/>
           </a:p>
           <a:p>
             <a:pPr marL="0" indent="0">
               <a:buNone/>
             </a:pPr>
             <a:r>
+              <a:rPr lang="fr-FR" dirty="0"/>
+              <a:t>API </a:t>
+            </a:r>
+            <a:r>
               <a:rPr lang="fr-FR" dirty="0" smtClean="0"/>
-              <a:t>Nouvelles technologies</a:t>
+              <a:t>REST</a:t>
+            </a:r>
+            <a:r>
+              <a:rPr lang="fr-FR" dirty="0"/>
+              <a:t> </a:t>
+            </a:r>
+            <a:r>
+              <a:rPr lang="fr-FR" dirty="0" smtClean="0"/>
+              <a:t>(avec Jersey)</a:t>
+            </a:r>
+          </a:p>
+          <a:p>
+            <a:pPr marL="0" indent="0">
+              <a:buNone/>
+            </a:pPr>
+            <a:r>
+              <a:rPr lang="fr-FR" dirty="0" smtClean="0"/>
+              <a:t>Python</a:t>
             </a:r>
           </a:p>
         </p:txBody>

</xml_diff>

<commit_message>
Quelques modifications dans le diapo
</commit_message>
<xml_diff>
--- a/Documents/diaporama_soutenance.pptx
+++ b/Documents/diaporama_soutenance.pptx
@@ -11,10 +11,10 @@
     <p:sldId id="256" r:id="rId2"/>
     <p:sldId id="257" r:id="rId3"/>
     <p:sldId id="258" r:id="rId4"/>
-    <p:sldId id="259" r:id="rId5"/>
-    <p:sldId id="260" r:id="rId6"/>
-    <p:sldId id="264" r:id="rId7"/>
-    <p:sldId id="261" r:id="rId8"/>
+    <p:sldId id="264" r:id="rId5"/>
+    <p:sldId id="259" r:id="rId6"/>
+    <p:sldId id="261" r:id="rId7"/>
+    <p:sldId id="260" r:id="rId8"/>
     <p:sldId id="262" r:id="rId9"/>
     <p:sldId id="263" r:id="rId10"/>
   </p:sldIdLst>
@@ -812,35 +812,6 @@
           <a:bodyPr/>
           <a:lstStyle/>
           <a:p>
-            <a:r>
-              <a:rPr lang="fr-FR" dirty="0" smtClean="0"/>
-              <a:t>Nous avons implémentés</a:t>
-            </a:r>
-            <a:r>
-              <a:rPr lang="fr-FR" baseline="0" dirty="0" smtClean="0"/>
-              <a:t> les différentes actions de bases que doit pouvoir faire le robot c’est-à-dire les mouvement avant, arrière droite et gauche ainsi que la gestion de la caméra.</a:t>
-            </a:r>
-          </a:p>
-          <a:p>
-            <a:endParaRPr lang="fr-FR" dirty="0" smtClean="0"/>
-          </a:p>
-          <a:p>
-            <a:r>
-              <a:rPr lang="fr-FR" dirty="0" smtClean="0"/>
-              <a:t>Concernant le client qui permet de piloter le robot,</a:t>
-            </a:r>
-            <a:r>
-              <a:rPr lang="fr-FR" baseline="0" dirty="0" smtClean="0"/>
-              <a:t> il s’agit d’une interface web. A la base, nous avions commencés une application </a:t>
-            </a:r>
-            <a:r>
-              <a:rPr lang="fr-FR" baseline="0" dirty="0" err="1" smtClean="0"/>
-              <a:t>android</a:t>
-            </a:r>
-            <a:r>
-              <a:rPr lang="fr-FR" baseline="0" dirty="0" smtClean="0"/>
-              <a:t> qui était quasi fonctionnelle car assez simple puisqu’il suffisait d’envoyer des requêtes GET ou POST au robot afin d’effectuer les actions que l’on souhaitait. Cette application a finalement été abandonnée pour faire une interface web à la place mais il ne serait pas difficile de la terminer si besoin. D’ailleurs de façon général, le fait qu’on dispose d’une architecture REST simplifie énormément le développement de divers client pour piloter le robot.</a:t>
-            </a:r>
             <a:endParaRPr lang="fr-FR" dirty="0"/>
           </a:p>
         </p:txBody>
@@ -871,7 +842,7 @@
     </p:spTree>
     <p:extLst>
       <p:ext uri="{BB962C8B-B14F-4D97-AF65-F5344CB8AC3E}">
-        <p14:creationId xmlns:p14="http://schemas.microsoft.com/office/powerpoint/2010/main" val="82982605"/>
+        <p14:creationId xmlns:p14="http://schemas.microsoft.com/office/powerpoint/2010/main" val="203354392"/>
       </p:ext>
     </p:extLst>
   </p:cSld>
@@ -925,6 +896,35 @@
           <a:bodyPr/>
           <a:lstStyle/>
           <a:p>
+            <a:r>
+              <a:rPr lang="fr-FR" dirty="0" smtClean="0"/>
+              <a:t>Nous avons implémentés</a:t>
+            </a:r>
+            <a:r>
+              <a:rPr lang="fr-FR" baseline="0" dirty="0" smtClean="0"/>
+              <a:t> les différentes actions de bases que doit pouvoir faire le robot c’est-à-dire les mouvement avant, arrière droite et gauche ainsi que la gestion de la caméra.</a:t>
+            </a:r>
+          </a:p>
+          <a:p>
+            <a:endParaRPr lang="fr-FR" dirty="0" smtClean="0"/>
+          </a:p>
+          <a:p>
+            <a:r>
+              <a:rPr lang="fr-FR" dirty="0" smtClean="0"/>
+              <a:t>Concernant le client qui permet de piloter le robot,</a:t>
+            </a:r>
+            <a:r>
+              <a:rPr lang="fr-FR" baseline="0" dirty="0" smtClean="0"/>
+              <a:t> il s’agit d’une interface web. A la base, nous avions commencés une application </a:t>
+            </a:r>
+            <a:r>
+              <a:rPr lang="fr-FR" baseline="0" dirty="0" err="1" smtClean="0"/>
+              <a:t>android</a:t>
+            </a:r>
+            <a:r>
+              <a:rPr lang="fr-FR" baseline="0" dirty="0" smtClean="0"/>
+              <a:t> qui était quasi fonctionnelle car assez simple puisqu’il suffisait d’envoyer des requêtes GET ou POST au robot afin d’effectuer les actions que l’on souhaitait. Cette application a finalement été abandonnée pour faire une interface web à la place mais il ne serait pas difficile de la terminer si besoin. D’ailleurs de façon général, le fait qu’on dispose d’une architecture REST simplifie énormément le développement de divers client pour piloter le robot.</a:t>
+            </a:r>
             <a:endParaRPr lang="fr-FR" dirty="0"/>
           </a:p>
         </p:txBody>
@@ -955,7 +955,7 @@
     </p:spTree>
     <p:extLst>
       <p:ext uri="{BB962C8B-B14F-4D97-AF65-F5344CB8AC3E}">
-        <p14:creationId xmlns:p14="http://schemas.microsoft.com/office/powerpoint/2010/main" val="4168324062"/>
+        <p14:creationId xmlns:p14="http://schemas.microsoft.com/office/powerpoint/2010/main" val="82982605"/>
       </p:ext>
     </p:extLst>
   </p:cSld>
@@ -1009,6 +1009,70 @@
           <a:bodyPr/>
           <a:lstStyle/>
           <a:p>
+            <a:r>
+              <a:rPr lang="fr-FR" dirty="0" smtClean="0"/>
+              <a:t>Pendant</a:t>
+            </a:r>
+            <a:r>
+              <a:rPr lang="fr-FR" baseline="0" dirty="0" smtClean="0"/>
+              <a:t> le projet, nous avons eu différents problèmes plus ou moins gênant que nous avons du résoudre. Au début, nous avons commencés par étudier les outils que l’on nous avait fournit. On arrivait pas à faire fonctionner les exemples de tests fournis avec le système de </a:t>
+            </a:r>
+            <a:r>
+              <a:rPr lang="fr-FR" baseline="0" dirty="0" err="1" smtClean="0"/>
+              <a:t>gopiwan</a:t>
+            </a:r>
+            <a:r>
+              <a:rPr lang="fr-FR" baseline="0" dirty="0" smtClean="0"/>
+              <a:t>. Après plusieurs jours à chercher, on s’est finalement rendus compte qu’il ne s’agissait pas de la bonne bibliothèque et que celle qu’on utilisait était en fait développée pour des robots </a:t>
+            </a:r>
+            <a:r>
+              <a:rPr lang="fr-FR" baseline="0" dirty="0" err="1" smtClean="0"/>
+              <a:t>légo</a:t>
+            </a:r>
+            <a:r>
+              <a:rPr lang="fr-FR" baseline="0" dirty="0" smtClean="0"/>
+              <a:t> utilisant néanmoins des outils très similaires d’où notre difficulté à l’avoir détecté.</a:t>
+            </a:r>
+          </a:p>
+          <a:p>
+            <a:r>
+              <a:rPr lang="fr-FR" baseline="0" dirty="0" smtClean="0"/>
+              <a:t>Nous avons également eu un autre problème qui est survenu suite au précédent. En effet, quand nous avons pu utiliser la bonne bibliothèque de développement, nous nous sommes aperçut qu’il n’existait pas de version écrite en java mais uniquement une version Python et Scratch. Nous avons donc résolu le problème en utilisant un daemon python pour pouvoir continuer le projet.</a:t>
+            </a:r>
+          </a:p>
+          <a:p>
+            <a:r>
+              <a:rPr lang="fr-FR" baseline="0" dirty="0" smtClean="0"/>
+              <a:t>Entre temps, une version java est sortie il y a quelques semaines de cela mais n’est pas encore complète.</a:t>
+            </a:r>
+          </a:p>
+          <a:p>
+            <a:r>
+              <a:rPr lang="fr-FR" baseline="0" dirty="0" smtClean="0"/>
+              <a:t>Nous avons eu également quelques problèmes de montages du robot pour qui il y avait par exemple la </a:t>
+            </a:r>
+            <a:r>
+              <a:rPr lang="fr-FR" baseline="0" dirty="0" err="1" smtClean="0"/>
+              <a:t>map</a:t>
+            </a:r>
+            <a:r>
+              <a:rPr lang="fr-FR" baseline="0" dirty="0" smtClean="0"/>
+              <a:t> de la caméra montée à l’envers et qui ne risquait donc pas de fonctionner.</a:t>
+            </a:r>
+          </a:p>
+          <a:p>
+            <a:r>
+              <a:rPr lang="fr-FR" baseline="0" dirty="0" smtClean="0"/>
+              <a:t>Un autre problème que l’on a pas tout à fait résolu, c’est une instabilité avec le </a:t>
+            </a:r>
+            <a:r>
+              <a:rPr lang="fr-FR" baseline="0" dirty="0" err="1" smtClean="0"/>
+              <a:t>dongle</a:t>
+            </a:r>
+            <a:r>
+              <a:rPr lang="fr-FR" baseline="0" dirty="0" smtClean="0"/>
+              <a:t> wifi qui a tendance à se déconnecter par moments.</a:t>
+            </a:r>
             <a:endParaRPr lang="fr-FR" dirty="0"/>
           </a:p>
         </p:txBody>
@@ -1039,7 +1103,7 @@
     </p:spTree>
     <p:extLst>
       <p:ext uri="{BB962C8B-B14F-4D97-AF65-F5344CB8AC3E}">
-        <p14:creationId xmlns:p14="http://schemas.microsoft.com/office/powerpoint/2010/main" val="203354392"/>
+        <p14:creationId xmlns:p14="http://schemas.microsoft.com/office/powerpoint/2010/main" val="3032762379"/>
       </p:ext>
     </p:extLst>
   </p:cSld>
@@ -1093,70 +1157,6 @@
           <a:bodyPr/>
           <a:lstStyle/>
           <a:p>
-            <a:r>
-              <a:rPr lang="fr-FR" dirty="0" smtClean="0"/>
-              <a:t>Pendant</a:t>
-            </a:r>
-            <a:r>
-              <a:rPr lang="fr-FR" baseline="0" dirty="0" smtClean="0"/>
-              <a:t> le projet, nous avons eu différents problèmes plus ou moins gênant que nous avons du résoudre. Au début, nous avons commencés par étudier les outils que l’on nous avait fournit. On arrivait pas à faire fonctionner les exemples de tests fournis avec le système de </a:t>
-            </a:r>
-            <a:r>
-              <a:rPr lang="fr-FR" baseline="0" dirty="0" err="1" smtClean="0"/>
-              <a:t>gopiwan</a:t>
-            </a:r>
-            <a:r>
-              <a:rPr lang="fr-FR" baseline="0" dirty="0" smtClean="0"/>
-              <a:t>. Après plusieurs jours à chercher, on s’est finalement rendus compte qu’il ne s’agissait pas de la bonne bibliothèque et que celle qu’on utilisait était en fait développée pour des robots </a:t>
-            </a:r>
-            <a:r>
-              <a:rPr lang="fr-FR" baseline="0" dirty="0" err="1" smtClean="0"/>
-              <a:t>légo</a:t>
-            </a:r>
-            <a:r>
-              <a:rPr lang="fr-FR" baseline="0" dirty="0" smtClean="0"/>
-              <a:t> utilisant néanmoins des outils très similaires d’où notre difficulté à l’avoir détecté.</a:t>
-            </a:r>
-          </a:p>
-          <a:p>
-            <a:r>
-              <a:rPr lang="fr-FR" baseline="0" dirty="0" smtClean="0"/>
-              <a:t>Nous avons également eu un autre problème qui est survenu suite au précédent. En effet, quand nous avons pu utiliser la bonne bibliothèque de développement, nous nous sommes aperçut qu’il n’existait pas de version écrite en java mais uniquement une version Python et Scratch. Nous avons donc résolu le problème en utilisant un daemon python pour pouvoir continuer le projet.</a:t>
-            </a:r>
-          </a:p>
-          <a:p>
-            <a:r>
-              <a:rPr lang="fr-FR" baseline="0" dirty="0" smtClean="0"/>
-              <a:t>Entre temps, une version java est sortie il y a quelques semaines de cela mais n’est pas encore complète.</a:t>
-            </a:r>
-          </a:p>
-          <a:p>
-            <a:r>
-              <a:rPr lang="fr-FR" baseline="0" dirty="0" smtClean="0"/>
-              <a:t>Nous avons eu également quelques problèmes de montages du robot pour qui il y avait par exemple la </a:t>
-            </a:r>
-            <a:r>
-              <a:rPr lang="fr-FR" baseline="0" dirty="0" err="1" smtClean="0"/>
-              <a:t>map</a:t>
-            </a:r>
-            <a:r>
-              <a:rPr lang="fr-FR" baseline="0" dirty="0" smtClean="0"/>
-              <a:t> de la caméra montée à l’envers et qui ne risquait donc pas de fonctionner.</a:t>
-            </a:r>
-          </a:p>
-          <a:p>
-            <a:r>
-              <a:rPr lang="fr-FR" baseline="0" dirty="0" smtClean="0"/>
-              <a:t>Un autre problème que l’on a pas tout à fait résolu, c’est une instabilité avec le </a:t>
-            </a:r>
-            <a:r>
-              <a:rPr lang="fr-FR" baseline="0" dirty="0" err="1" smtClean="0"/>
-              <a:t>dongle</a:t>
-            </a:r>
-            <a:r>
-              <a:rPr lang="fr-FR" baseline="0" dirty="0" smtClean="0"/>
-              <a:t> wifi qui a tendance à se déconnecter par moments.</a:t>
-            </a:r>
             <a:endParaRPr lang="fr-FR" dirty="0"/>
           </a:p>
         </p:txBody>
@@ -1187,7 +1187,7 @@
     </p:spTree>
     <p:extLst>
       <p:ext uri="{BB962C8B-B14F-4D97-AF65-F5344CB8AC3E}">
-        <p14:creationId xmlns:p14="http://schemas.microsoft.com/office/powerpoint/2010/main" val="3032762379"/>
+        <p14:creationId xmlns:p14="http://schemas.microsoft.com/office/powerpoint/2010/main" val="4168324062"/>
       </p:ext>
     </p:extLst>
   </p:cSld>
@@ -1361,7 +1361,7 @@
           <a:noFill/>
           <a:extLst>
             <a:ext uri="{909E8E84-426E-40dd-AFC4-6F175D3DCCD1}">
-              <a14:hiddenFill xmlns:a14="http://schemas.microsoft.com/office/drawing/2010/main" xmlns="">
+              <a14:hiddenFill xmlns="" xmlns:a14="http://schemas.microsoft.com/office/drawing/2010/main">
                 <a:solidFill>
                   <a:srgbClr val="FFFFFF"/>
                 </a:solidFill>
@@ -1420,7 +1420,7 @@
             </a:ln>
             <a:extLst>
               <a:ext uri="{91240B29-F687-4f45-9708-019B960494DF}">
-                <a14:hiddenLine xmlns:a14="http://schemas.microsoft.com/office/drawing/2010/main" xmlns="" w="9525">
+                <a14:hiddenLine xmlns="" xmlns:a14="http://schemas.microsoft.com/office/drawing/2010/main" w="9525">
                   <a:solidFill>
                     <a:srgbClr val="000000"/>
                   </a:solidFill>
@@ -1510,7 +1510,7 @@
             </a:ln>
             <a:extLst>
               <a:ext uri="{91240B29-F687-4f45-9708-019B960494DF}">
-                <a14:hiddenLine xmlns:a14="http://schemas.microsoft.com/office/drawing/2010/main" xmlns="" w="9525">
+                <a14:hiddenLine xmlns="" xmlns:a14="http://schemas.microsoft.com/office/drawing/2010/main" w="9525">
                   <a:solidFill>
                     <a:srgbClr val="000000"/>
                   </a:solidFill>
@@ -1600,7 +1600,7 @@
             </a:ln>
             <a:extLst>
               <a:ext uri="{91240B29-F687-4f45-9708-019B960494DF}">
-                <a14:hiddenLine xmlns:a14="http://schemas.microsoft.com/office/drawing/2010/main" xmlns="" w="9525">
+                <a14:hiddenLine xmlns="" xmlns:a14="http://schemas.microsoft.com/office/drawing/2010/main" w="9525">
                   <a:solidFill>
                     <a:srgbClr val="000000"/>
                   </a:solidFill>
@@ -1634,7 +1634,7 @@
             </a:ln>
             <a:extLst>
               <a:ext uri="{91240B29-F687-4f45-9708-019B960494DF}">
-                <a14:hiddenLine xmlns:a14="http://schemas.microsoft.com/office/drawing/2010/main" xmlns="" w="9525">
+                <a14:hiddenLine xmlns="" xmlns:a14="http://schemas.microsoft.com/office/drawing/2010/main" w="9525">
                   <a:solidFill>
                     <a:srgbClr val="000000"/>
                   </a:solidFill>
@@ -1724,7 +1724,7 @@
             </a:ln>
             <a:extLst>
               <a:ext uri="{91240B29-F687-4f45-9708-019B960494DF}">
-                <a14:hiddenLine xmlns:a14="http://schemas.microsoft.com/office/drawing/2010/main" xmlns="" w="9525">
+                <a14:hiddenLine xmlns="" xmlns:a14="http://schemas.microsoft.com/office/drawing/2010/main" w="9525">
                   <a:solidFill>
                     <a:srgbClr val="000000"/>
                   </a:solidFill>
@@ -1786,7 +1786,7 @@
             </a:ln>
             <a:extLst>
               <a:ext uri="{91240B29-F687-4f45-9708-019B960494DF}">
-                <a14:hiddenLine xmlns:a14="http://schemas.microsoft.com/office/drawing/2010/main" xmlns="" w="9525">
+                <a14:hiddenLine xmlns="" xmlns:a14="http://schemas.microsoft.com/office/drawing/2010/main" w="9525">
                   <a:solidFill>
                     <a:srgbClr val="000000"/>
                   </a:solidFill>
@@ -1848,7 +1848,7 @@
             </a:ln>
             <a:extLst>
               <a:ext uri="{91240B29-F687-4f45-9708-019B960494DF}">
-                <a14:hiddenLine xmlns:a14="http://schemas.microsoft.com/office/drawing/2010/main" xmlns="" w="9525">
+                <a14:hiddenLine xmlns="" xmlns:a14="http://schemas.microsoft.com/office/drawing/2010/main" w="9525">
                   <a:solidFill>
                     <a:srgbClr val="000000"/>
                   </a:solidFill>
@@ -1938,7 +1938,7 @@
             </a:ln>
             <a:extLst>
               <a:ext uri="{91240B29-F687-4f45-9708-019B960494DF}">
-                <a14:hiddenLine xmlns:a14="http://schemas.microsoft.com/office/drawing/2010/main" xmlns="" w="9525">
+                <a14:hiddenLine xmlns="" xmlns:a14="http://schemas.microsoft.com/office/drawing/2010/main" w="9525">
                   <a:solidFill>
                     <a:srgbClr val="000000"/>
                   </a:solidFill>
@@ -2000,7 +2000,7 @@
             </a:ln>
             <a:extLst>
               <a:ext uri="{91240B29-F687-4f45-9708-019B960494DF}">
-                <a14:hiddenLine xmlns:a14="http://schemas.microsoft.com/office/drawing/2010/main" xmlns="" w="9525">
+                <a14:hiddenLine xmlns="" xmlns:a14="http://schemas.microsoft.com/office/drawing/2010/main" w="9525">
                   <a:solidFill>
                     <a:srgbClr val="000000"/>
                   </a:solidFill>
@@ -2062,7 +2062,7 @@
             </a:ln>
             <a:extLst>
               <a:ext uri="{91240B29-F687-4f45-9708-019B960494DF}">
-                <a14:hiddenLine xmlns:a14="http://schemas.microsoft.com/office/drawing/2010/main" xmlns="" w="9525">
+                <a14:hiddenLine xmlns="" xmlns:a14="http://schemas.microsoft.com/office/drawing/2010/main" w="9525">
                   <a:solidFill>
                     <a:srgbClr val="000000"/>
                   </a:solidFill>
@@ -2152,7 +2152,7 @@
             </a:ln>
             <a:extLst>
               <a:ext uri="{91240B29-F687-4f45-9708-019B960494DF}">
-                <a14:hiddenLine xmlns:a14="http://schemas.microsoft.com/office/drawing/2010/main" xmlns="" w="9525">
+                <a14:hiddenLine xmlns="" xmlns:a14="http://schemas.microsoft.com/office/drawing/2010/main" w="9525">
                   <a:solidFill>
                     <a:srgbClr val="000000"/>
                   </a:solidFill>
@@ -2242,7 +2242,7 @@
             </a:ln>
             <a:extLst>
               <a:ext uri="{91240B29-F687-4f45-9708-019B960494DF}">
-                <a14:hiddenLine xmlns:a14="http://schemas.microsoft.com/office/drawing/2010/main" xmlns="" w="9525">
+                <a14:hiddenLine xmlns="" xmlns:a14="http://schemas.microsoft.com/office/drawing/2010/main" w="9525">
                   <a:solidFill>
                     <a:srgbClr val="000000"/>
                   </a:solidFill>
@@ -2304,7 +2304,7 @@
             </a:ln>
             <a:extLst>
               <a:ext uri="{91240B29-F687-4f45-9708-019B960494DF}">
-                <a14:hiddenLine xmlns:a14="http://schemas.microsoft.com/office/drawing/2010/main" xmlns="" w="9525">
+                <a14:hiddenLine xmlns="" xmlns:a14="http://schemas.microsoft.com/office/drawing/2010/main" w="9525">
                   <a:solidFill>
                     <a:srgbClr val="000000"/>
                   </a:solidFill>
@@ -2414,7 +2414,7 @@
             </a:ln>
             <a:extLst>
               <a:ext uri="{91240B29-F687-4f45-9708-019B960494DF}">
-                <a14:hiddenLine xmlns:a14="http://schemas.microsoft.com/office/drawing/2010/main" xmlns="" w="9525">
+                <a14:hiddenLine xmlns="" xmlns:a14="http://schemas.microsoft.com/office/drawing/2010/main" w="9525">
                   <a:solidFill>
                     <a:srgbClr val="000000"/>
                   </a:solidFill>
@@ -2476,7 +2476,7 @@
             </a:ln>
             <a:extLst>
               <a:ext uri="{91240B29-F687-4f45-9708-019B960494DF}">
-                <a14:hiddenLine xmlns:a14="http://schemas.microsoft.com/office/drawing/2010/main" xmlns="" w="9525">
+                <a14:hiddenLine xmlns="" xmlns:a14="http://schemas.microsoft.com/office/drawing/2010/main" w="9525">
                   <a:solidFill>
                     <a:srgbClr val="000000"/>
                   </a:solidFill>
@@ -2566,7 +2566,7 @@
             </a:ln>
             <a:extLst>
               <a:ext uri="{91240B29-F687-4f45-9708-019B960494DF}">
-                <a14:hiddenLine xmlns:a14="http://schemas.microsoft.com/office/drawing/2010/main" xmlns="" w="9525">
+                <a14:hiddenLine xmlns="" xmlns:a14="http://schemas.microsoft.com/office/drawing/2010/main" w="9525">
                   <a:solidFill>
                     <a:srgbClr val="000000"/>
                   </a:solidFill>
@@ -2656,7 +2656,7 @@
             </a:ln>
             <a:extLst>
               <a:ext uri="{91240B29-F687-4f45-9708-019B960494DF}">
-                <a14:hiddenLine xmlns:a14="http://schemas.microsoft.com/office/drawing/2010/main" xmlns="" w="9525">
+                <a14:hiddenLine xmlns="" xmlns:a14="http://schemas.microsoft.com/office/drawing/2010/main" w="9525">
                   <a:solidFill>
                     <a:srgbClr val="000000"/>
                   </a:solidFill>
@@ -2718,7 +2718,7 @@
             </a:ln>
             <a:extLst>
               <a:ext uri="{91240B29-F687-4f45-9708-019B960494DF}">
-                <a14:hiddenLine xmlns:a14="http://schemas.microsoft.com/office/drawing/2010/main" xmlns="" w="9525">
+                <a14:hiddenLine xmlns="" xmlns:a14="http://schemas.microsoft.com/office/drawing/2010/main" w="9525">
                   <a:solidFill>
                     <a:srgbClr val="000000"/>
                   </a:solidFill>
@@ -2808,7 +2808,7 @@
             </a:ln>
             <a:extLst>
               <a:ext uri="{91240B29-F687-4f45-9708-019B960494DF}">
-                <a14:hiddenLine xmlns:a14="http://schemas.microsoft.com/office/drawing/2010/main" xmlns="" w="9525">
+                <a14:hiddenLine xmlns="" xmlns:a14="http://schemas.microsoft.com/office/drawing/2010/main" w="9525">
                   <a:solidFill>
                     <a:srgbClr val="000000"/>
                   </a:solidFill>
@@ -2898,7 +2898,7 @@
             </a:ln>
             <a:extLst>
               <a:ext uri="{91240B29-F687-4f45-9708-019B960494DF}">
-                <a14:hiddenLine xmlns:a14="http://schemas.microsoft.com/office/drawing/2010/main" xmlns="" w="9525">
+                <a14:hiddenLine xmlns="" xmlns:a14="http://schemas.microsoft.com/office/drawing/2010/main" w="9525">
                   <a:solidFill>
                     <a:srgbClr val="000000"/>
                   </a:solidFill>
@@ -2954,7 +2954,7 @@
             </a:ln>
             <a:extLst>
               <a:ext uri="{91240B29-F687-4f45-9708-019B960494DF}">
-                <a14:hiddenLine xmlns:a14="http://schemas.microsoft.com/office/drawing/2010/main" xmlns="" w="9525">
+                <a14:hiddenLine xmlns="" xmlns:a14="http://schemas.microsoft.com/office/drawing/2010/main" w="9525">
                   <a:solidFill>
                     <a:srgbClr val="000000"/>
                   </a:solidFill>
@@ -3044,7 +3044,7 @@
             </a:ln>
             <a:extLst>
               <a:ext uri="{91240B29-F687-4f45-9708-019B960494DF}">
-                <a14:hiddenLine xmlns:a14="http://schemas.microsoft.com/office/drawing/2010/main" xmlns="" w="9525">
+                <a14:hiddenLine xmlns="" xmlns:a14="http://schemas.microsoft.com/office/drawing/2010/main" w="9525">
                   <a:solidFill>
                     <a:srgbClr val="000000"/>
                   </a:solidFill>
@@ -3100,7 +3100,7 @@
             </a:ln>
             <a:extLst>
               <a:ext uri="{91240B29-F687-4f45-9708-019B960494DF}">
-                <a14:hiddenLine xmlns:a14="http://schemas.microsoft.com/office/drawing/2010/main" xmlns="" w="9525">
+                <a14:hiddenLine xmlns="" xmlns:a14="http://schemas.microsoft.com/office/drawing/2010/main" w="9525">
                   <a:solidFill>
                     <a:srgbClr val="000000"/>
                   </a:solidFill>
@@ -3190,7 +3190,7 @@
             </a:ln>
             <a:extLst>
               <a:ext uri="{91240B29-F687-4f45-9708-019B960494DF}">
-                <a14:hiddenLine xmlns:a14="http://schemas.microsoft.com/office/drawing/2010/main" xmlns="" w="9525">
+                <a14:hiddenLine xmlns="" xmlns:a14="http://schemas.microsoft.com/office/drawing/2010/main" w="9525">
                   <a:solidFill>
                     <a:srgbClr val="000000"/>
                   </a:solidFill>
@@ -3258,7 +3258,7 @@
             </a:ln>
             <a:extLst>
               <a:ext uri="{91240B29-F687-4f45-9708-019B960494DF}">
-                <a14:hiddenLine xmlns:a14="http://schemas.microsoft.com/office/drawing/2010/main" xmlns="" w="9525">
+                <a14:hiddenLine xmlns="" xmlns:a14="http://schemas.microsoft.com/office/drawing/2010/main" w="9525">
                   <a:solidFill>
                     <a:srgbClr val="000000"/>
                   </a:solidFill>
@@ -3348,7 +3348,7 @@
             </a:ln>
             <a:extLst>
               <a:ext uri="{91240B29-F687-4f45-9708-019B960494DF}">
-                <a14:hiddenLine xmlns:a14="http://schemas.microsoft.com/office/drawing/2010/main" xmlns="" w="9525">
+                <a14:hiddenLine xmlns="" xmlns:a14="http://schemas.microsoft.com/office/drawing/2010/main" w="9525">
                   <a:solidFill>
                     <a:srgbClr val="000000"/>
                   </a:solidFill>
@@ -3416,7 +3416,7 @@
             </a:ln>
             <a:extLst>
               <a:ext uri="{91240B29-F687-4f45-9708-019B960494DF}">
-                <a14:hiddenLine xmlns:a14="http://schemas.microsoft.com/office/drawing/2010/main" xmlns="" w="9525">
+                <a14:hiddenLine xmlns="" xmlns:a14="http://schemas.microsoft.com/office/drawing/2010/main" w="9525">
                   <a:solidFill>
                     <a:srgbClr val="000000"/>
                   </a:solidFill>
@@ -3506,7 +3506,7 @@
             </a:ln>
             <a:extLst>
               <a:ext uri="{91240B29-F687-4f45-9708-019B960494DF}">
-                <a14:hiddenLine xmlns:a14="http://schemas.microsoft.com/office/drawing/2010/main" xmlns="" w="9525">
+                <a14:hiddenLine xmlns="" xmlns:a14="http://schemas.microsoft.com/office/drawing/2010/main" w="9525">
                   <a:solidFill>
                     <a:srgbClr val="000000"/>
                   </a:solidFill>
@@ -3540,7 +3540,7 @@
             </a:ln>
             <a:extLst>
               <a:ext uri="{91240B29-F687-4f45-9708-019B960494DF}">
-                <a14:hiddenLine xmlns:a14="http://schemas.microsoft.com/office/drawing/2010/main" xmlns="" w="9525">
+                <a14:hiddenLine xmlns="" xmlns:a14="http://schemas.microsoft.com/office/drawing/2010/main" w="9525">
                   <a:solidFill>
                     <a:srgbClr val="000000"/>
                   </a:solidFill>
@@ -3630,7 +3630,7 @@
             </a:ln>
             <a:extLst>
               <a:ext uri="{91240B29-F687-4f45-9708-019B960494DF}">
-                <a14:hiddenLine xmlns:a14="http://schemas.microsoft.com/office/drawing/2010/main" xmlns="" w="9525">
+                <a14:hiddenLine xmlns="" xmlns:a14="http://schemas.microsoft.com/office/drawing/2010/main" w="9525">
                   <a:solidFill>
                     <a:srgbClr val="000000"/>
                   </a:solidFill>
@@ -3692,7 +3692,7 @@
             </a:ln>
             <a:extLst>
               <a:ext uri="{91240B29-F687-4f45-9708-019B960494DF}">
-                <a14:hiddenLine xmlns:a14="http://schemas.microsoft.com/office/drawing/2010/main" xmlns="" w="9525">
+                <a14:hiddenLine xmlns="" xmlns:a14="http://schemas.microsoft.com/office/drawing/2010/main" w="9525">
                   <a:solidFill>
                     <a:srgbClr val="000000"/>
                   </a:solidFill>
@@ -3754,7 +3754,7 @@
             </a:ln>
             <a:extLst>
               <a:ext uri="{91240B29-F687-4f45-9708-019B960494DF}">
-                <a14:hiddenLine xmlns:a14="http://schemas.microsoft.com/office/drawing/2010/main" xmlns="" w="9525">
+                <a14:hiddenLine xmlns="" xmlns:a14="http://schemas.microsoft.com/office/drawing/2010/main" w="9525">
                   <a:solidFill>
                     <a:srgbClr val="000000"/>
                   </a:solidFill>
@@ -3844,7 +3844,7 @@
             </a:ln>
             <a:extLst>
               <a:ext uri="{91240B29-F687-4f45-9708-019B960494DF}">
-                <a14:hiddenLine xmlns:a14="http://schemas.microsoft.com/office/drawing/2010/main" xmlns="" w="9525">
+                <a14:hiddenLine xmlns="" xmlns:a14="http://schemas.microsoft.com/office/drawing/2010/main" w="9525">
                   <a:solidFill>
                     <a:srgbClr val="000000"/>
                   </a:solidFill>
@@ -3912,7 +3912,7 @@
             </a:ln>
             <a:extLst>
               <a:ext uri="{91240B29-F687-4f45-9708-019B960494DF}">
-                <a14:hiddenLine xmlns:a14="http://schemas.microsoft.com/office/drawing/2010/main" xmlns="" w="9525">
+                <a14:hiddenLine xmlns="" xmlns:a14="http://schemas.microsoft.com/office/drawing/2010/main" w="9525">
                   <a:solidFill>
                     <a:srgbClr val="000000"/>
                   </a:solidFill>
@@ -3974,7 +3974,7 @@
             </a:ln>
             <a:extLst>
               <a:ext uri="{91240B29-F687-4f45-9708-019B960494DF}">
-                <a14:hiddenLine xmlns:a14="http://schemas.microsoft.com/office/drawing/2010/main" xmlns="" w="9525">
+                <a14:hiddenLine xmlns="" xmlns:a14="http://schemas.microsoft.com/office/drawing/2010/main" w="9525">
                   <a:solidFill>
                     <a:srgbClr val="000000"/>
                   </a:solidFill>
@@ -4064,7 +4064,7 @@
             </a:ln>
             <a:extLst>
               <a:ext uri="{91240B29-F687-4f45-9708-019B960494DF}">
-                <a14:hiddenLine xmlns:a14="http://schemas.microsoft.com/office/drawing/2010/main" xmlns="" w="9525">
+                <a14:hiddenLine xmlns="" xmlns:a14="http://schemas.microsoft.com/office/drawing/2010/main" w="9525">
                   <a:solidFill>
                     <a:srgbClr val="000000"/>
                   </a:solidFill>
@@ -4126,7 +4126,7 @@
             </a:ln>
             <a:extLst>
               <a:ext uri="{91240B29-F687-4f45-9708-019B960494DF}">
-                <a14:hiddenLine xmlns:a14="http://schemas.microsoft.com/office/drawing/2010/main" xmlns="" w="9525">
+                <a14:hiddenLine xmlns="" xmlns:a14="http://schemas.microsoft.com/office/drawing/2010/main" w="9525">
                   <a:solidFill>
                     <a:srgbClr val="000000"/>
                   </a:solidFill>
@@ -4216,7 +4216,7 @@
             </a:ln>
             <a:extLst>
               <a:ext uri="{91240B29-F687-4f45-9708-019B960494DF}">
-                <a14:hiddenLine xmlns:a14="http://schemas.microsoft.com/office/drawing/2010/main" xmlns="" w="9525">
+                <a14:hiddenLine xmlns="" xmlns:a14="http://schemas.microsoft.com/office/drawing/2010/main" w="9525">
                   <a:solidFill>
                     <a:srgbClr val="000000"/>
                   </a:solidFill>
@@ -4278,7 +4278,7 @@
             </a:ln>
             <a:extLst>
               <a:ext uri="{91240B29-F687-4f45-9708-019B960494DF}">
-                <a14:hiddenLine xmlns:a14="http://schemas.microsoft.com/office/drawing/2010/main" xmlns="" w="9525">
+                <a14:hiddenLine xmlns="" xmlns:a14="http://schemas.microsoft.com/office/drawing/2010/main" w="9525">
                   <a:solidFill>
                     <a:srgbClr val="000000"/>
                   </a:solidFill>
@@ -4368,7 +4368,7 @@
             </a:ln>
             <a:extLst>
               <a:ext uri="{91240B29-F687-4f45-9708-019B960494DF}">
-                <a14:hiddenLine xmlns:a14="http://schemas.microsoft.com/office/drawing/2010/main" xmlns="" w="9525">
+                <a14:hiddenLine xmlns="" xmlns:a14="http://schemas.microsoft.com/office/drawing/2010/main" w="9525">
                   <a:solidFill>
                     <a:srgbClr val="000000"/>
                   </a:solidFill>
@@ -4402,7 +4402,7 @@
             </a:ln>
             <a:extLst>
               <a:ext uri="{91240B29-F687-4f45-9708-019B960494DF}">
-                <a14:hiddenLine xmlns:a14="http://schemas.microsoft.com/office/drawing/2010/main" xmlns="" w="9525">
+                <a14:hiddenLine xmlns="" xmlns:a14="http://schemas.microsoft.com/office/drawing/2010/main" w="9525">
                   <a:solidFill>
                     <a:srgbClr val="000000"/>
                   </a:solidFill>
@@ -4467,7 +4467,7 @@
             </a:ln>
             <a:extLst>
               <a:ext uri="{91240B29-F687-4f45-9708-019B960494DF}">
-                <a14:hiddenLine xmlns:a14="http://schemas.microsoft.com/office/drawing/2010/main" xmlns="" w="9525">
+                <a14:hiddenLine xmlns="" xmlns:a14="http://schemas.microsoft.com/office/drawing/2010/main" w="9525">
                   <a:solidFill>
                     <a:srgbClr val="000000"/>
                   </a:solidFill>
@@ -4557,7 +4557,7 @@
             </a:ln>
             <a:extLst>
               <a:ext uri="{91240B29-F687-4f45-9708-019B960494DF}">
-                <a14:hiddenLine xmlns:a14="http://schemas.microsoft.com/office/drawing/2010/main" xmlns="" w="9525">
+                <a14:hiddenLine xmlns="" xmlns:a14="http://schemas.microsoft.com/office/drawing/2010/main" w="9525">
                   <a:solidFill>
                     <a:srgbClr val="000000"/>
                   </a:solidFill>
@@ -4619,7 +4619,7 @@
             </a:ln>
             <a:extLst>
               <a:ext uri="{91240B29-F687-4f45-9708-019B960494DF}">
-                <a14:hiddenLine xmlns:a14="http://schemas.microsoft.com/office/drawing/2010/main" xmlns="" w="9525">
+                <a14:hiddenLine xmlns="" xmlns:a14="http://schemas.microsoft.com/office/drawing/2010/main" w="9525">
                   <a:solidFill>
                     <a:srgbClr val="000000"/>
                   </a:solidFill>
@@ -4709,7 +4709,7 @@
             </a:ln>
             <a:extLst>
               <a:ext uri="{91240B29-F687-4f45-9708-019B960494DF}">
-                <a14:hiddenLine xmlns:a14="http://schemas.microsoft.com/office/drawing/2010/main" xmlns="" w="9525">
+                <a14:hiddenLine xmlns="" xmlns:a14="http://schemas.microsoft.com/office/drawing/2010/main" w="9525">
                   <a:solidFill>
                     <a:srgbClr val="000000"/>
                   </a:solidFill>
@@ -4799,7 +4799,7 @@
             </a:ln>
             <a:extLst>
               <a:ext uri="{91240B29-F687-4f45-9708-019B960494DF}">
-                <a14:hiddenLine xmlns:a14="http://schemas.microsoft.com/office/drawing/2010/main" xmlns="" w="9525">
+                <a14:hiddenLine xmlns="" xmlns:a14="http://schemas.microsoft.com/office/drawing/2010/main" w="9525">
                   <a:solidFill>
                     <a:srgbClr val="000000"/>
                   </a:solidFill>
@@ -4864,7 +4864,7 @@
             </a:ln>
             <a:extLst>
               <a:ext uri="{91240B29-F687-4f45-9708-019B960494DF}">
-                <a14:hiddenLine xmlns:a14="http://schemas.microsoft.com/office/drawing/2010/main" xmlns="" w="9525">
+                <a14:hiddenLine xmlns="" xmlns:a14="http://schemas.microsoft.com/office/drawing/2010/main" w="9525">
                   <a:solidFill>
                     <a:srgbClr val="000000"/>
                   </a:solidFill>
@@ -4926,7 +4926,7 @@
             </a:ln>
             <a:extLst>
               <a:ext uri="{91240B29-F687-4f45-9708-019B960494DF}">
-                <a14:hiddenLine xmlns:a14="http://schemas.microsoft.com/office/drawing/2010/main" xmlns="" w="9525">
+                <a14:hiddenLine xmlns="" xmlns:a14="http://schemas.microsoft.com/office/drawing/2010/main" w="9525">
                   <a:solidFill>
                     <a:srgbClr val="000000"/>
                   </a:solidFill>
@@ -5016,7 +5016,7 @@
             </a:ln>
             <a:extLst>
               <a:ext uri="{91240B29-F687-4f45-9708-019B960494DF}">
-                <a14:hiddenLine xmlns:a14="http://schemas.microsoft.com/office/drawing/2010/main" xmlns="" w="9525">
+                <a14:hiddenLine xmlns="" xmlns:a14="http://schemas.microsoft.com/office/drawing/2010/main" w="9525">
                   <a:solidFill>
                     <a:srgbClr val="000000"/>
                   </a:solidFill>
@@ -5106,7 +5106,7 @@
             </a:ln>
             <a:extLst>
               <a:ext uri="{91240B29-F687-4f45-9708-019B960494DF}">
-                <a14:hiddenLine xmlns:a14="http://schemas.microsoft.com/office/drawing/2010/main" xmlns="" w="9525">
+                <a14:hiddenLine xmlns="" xmlns:a14="http://schemas.microsoft.com/office/drawing/2010/main" w="9525">
                   <a:solidFill>
                     <a:srgbClr val="000000"/>
                   </a:solidFill>
@@ -5168,7 +5168,7 @@
             </a:ln>
             <a:extLst>
               <a:ext uri="{91240B29-F687-4f45-9708-019B960494DF}">
-                <a14:hiddenLine xmlns:a14="http://schemas.microsoft.com/office/drawing/2010/main" xmlns="" w="9525">
+                <a14:hiddenLine xmlns="" xmlns:a14="http://schemas.microsoft.com/office/drawing/2010/main" w="9525">
                   <a:solidFill>
                     <a:srgbClr val="000000"/>
                   </a:solidFill>
@@ -5288,7 +5288,7 @@
             </a:ln>
             <a:extLst>
               <a:ext uri="{91240B29-F687-4f45-9708-019B960494DF}">
-                <a14:hiddenLine xmlns:a14="http://schemas.microsoft.com/office/drawing/2010/main" xmlns="" w="9525">
+                <a14:hiddenLine xmlns="" xmlns:a14="http://schemas.microsoft.com/office/drawing/2010/main" w="9525">
                   <a:solidFill>
                     <a:srgbClr val="000000"/>
                   </a:solidFill>
@@ -5356,7 +5356,7 @@
             </a:ln>
             <a:extLst>
               <a:ext uri="{91240B29-F687-4f45-9708-019B960494DF}">
-                <a14:hiddenLine xmlns:a14="http://schemas.microsoft.com/office/drawing/2010/main" xmlns="" w="9525">
+                <a14:hiddenLine xmlns="" xmlns:a14="http://schemas.microsoft.com/office/drawing/2010/main" w="9525">
                   <a:solidFill>
                     <a:srgbClr val="000000"/>
                   </a:solidFill>
@@ -5446,7 +5446,7 @@
             </a:ln>
             <a:extLst>
               <a:ext uri="{91240B29-F687-4f45-9708-019B960494DF}">
-                <a14:hiddenLine xmlns:a14="http://schemas.microsoft.com/office/drawing/2010/main" xmlns="" w="9525">
+                <a14:hiddenLine xmlns="" xmlns:a14="http://schemas.microsoft.com/office/drawing/2010/main" w="9525">
                   <a:solidFill>
                     <a:srgbClr val="000000"/>
                   </a:solidFill>
@@ -10175,7 +10175,7 @@
           <a:noFill/>
           <a:extLst>
             <a:ext uri="{909E8E84-426E-40dd-AFC4-6F175D3DCCD1}">
-              <a14:hiddenFill xmlns:a14="http://schemas.microsoft.com/office/drawing/2010/main" xmlns="">
+              <a14:hiddenFill xmlns="" xmlns:a14="http://schemas.microsoft.com/office/drawing/2010/main">
                 <a:solidFill>
                   <a:srgbClr val="FFFFFF"/>
                 </a:solidFill>
@@ -10249,7 +10249,7 @@
               </a:ln>
               <a:extLst>
                 <a:ext uri="{91240B29-F687-4f45-9708-019B960494DF}">
-                  <a14:hiddenLine xmlns:a14="http://schemas.microsoft.com/office/drawing/2010/main" xmlns="" w="9525">
+                  <a14:hiddenLine xmlns="" xmlns:a14="http://schemas.microsoft.com/office/drawing/2010/main" w="9525">
                     <a:solidFill>
                       <a:srgbClr val="000000"/>
                     </a:solidFill>
@@ -10339,7 +10339,7 @@
               </a:ln>
               <a:extLst>
                 <a:ext uri="{91240B29-F687-4f45-9708-019B960494DF}">
-                  <a14:hiddenLine xmlns:a14="http://schemas.microsoft.com/office/drawing/2010/main" xmlns="" w="9525">
+                  <a14:hiddenLine xmlns="" xmlns:a14="http://schemas.microsoft.com/office/drawing/2010/main" w="9525">
                     <a:solidFill>
                       <a:srgbClr val="000000"/>
                     </a:solidFill>
@@ -10429,7 +10429,7 @@
               </a:ln>
               <a:extLst>
                 <a:ext uri="{91240B29-F687-4f45-9708-019B960494DF}">
-                  <a14:hiddenLine xmlns:a14="http://schemas.microsoft.com/office/drawing/2010/main" xmlns="" w="9525">
+                  <a14:hiddenLine xmlns="" xmlns:a14="http://schemas.microsoft.com/office/drawing/2010/main" w="9525">
                     <a:solidFill>
                       <a:srgbClr val="000000"/>
                     </a:solidFill>
@@ -10491,7 +10491,7 @@
               </a:ln>
               <a:extLst>
                 <a:ext uri="{91240B29-F687-4f45-9708-019B960494DF}">
-                  <a14:hiddenLine xmlns:a14="http://schemas.microsoft.com/office/drawing/2010/main" xmlns="" w="9525">
+                  <a14:hiddenLine xmlns="" xmlns:a14="http://schemas.microsoft.com/office/drawing/2010/main" w="9525">
                     <a:solidFill>
                       <a:srgbClr val="000000"/>
                     </a:solidFill>
@@ -10581,7 +10581,7 @@
               </a:ln>
               <a:extLst>
                 <a:ext uri="{91240B29-F687-4f45-9708-019B960494DF}">
-                  <a14:hiddenLine xmlns:a14="http://schemas.microsoft.com/office/drawing/2010/main" xmlns="" w="9525">
+                  <a14:hiddenLine xmlns="" xmlns:a14="http://schemas.microsoft.com/office/drawing/2010/main" w="9525">
                     <a:solidFill>
                       <a:srgbClr val="000000"/>
                     </a:solidFill>
@@ -10643,7 +10643,7 @@
               </a:ln>
               <a:extLst>
                 <a:ext uri="{91240B29-F687-4f45-9708-019B960494DF}">
-                  <a14:hiddenLine xmlns:a14="http://schemas.microsoft.com/office/drawing/2010/main" xmlns="" w="9525">
+                  <a14:hiddenLine xmlns="" xmlns:a14="http://schemas.microsoft.com/office/drawing/2010/main" w="9525">
                     <a:solidFill>
                       <a:srgbClr val="000000"/>
                     </a:solidFill>
@@ -10705,7 +10705,7 @@
               </a:ln>
               <a:extLst>
                 <a:ext uri="{91240B29-F687-4f45-9708-019B960494DF}">
-                  <a14:hiddenLine xmlns:a14="http://schemas.microsoft.com/office/drawing/2010/main" xmlns="" w="9525">
+                  <a14:hiddenLine xmlns="" xmlns:a14="http://schemas.microsoft.com/office/drawing/2010/main" w="9525">
                     <a:solidFill>
                       <a:srgbClr val="000000"/>
                     </a:solidFill>
@@ -10795,7 +10795,7 @@
               </a:ln>
               <a:extLst>
                 <a:ext uri="{91240B29-F687-4f45-9708-019B960494DF}">
-                  <a14:hiddenLine xmlns:a14="http://schemas.microsoft.com/office/drawing/2010/main" xmlns="" w="9525">
+                  <a14:hiddenLine xmlns="" xmlns:a14="http://schemas.microsoft.com/office/drawing/2010/main" w="9525">
                     <a:solidFill>
                       <a:srgbClr val="000000"/>
                     </a:solidFill>
@@ -10885,7 +10885,7 @@
               </a:ln>
               <a:extLst>
                 <a:ext uri="{91240B29-F687-4f45-9708-019B960494DF}">
-                  <a14:hiddenLine xmlns:a14="http://schemas.microsoft.com/office/drawing/2010/main" xmlns="" w="9525">
+                  <a14:hiddenLine xmlns="" xmlns:a14="http://schemas.microsoft.com/office/drawing/2010/main" w="9525">
                     <a:solidFill>
                       <a:srgbClr val="000000"/>
                     </a:solidFill>
@@ -10947,7 +10947,7 @@
               </a:ln>
               <a:extLst>
                 <a:ext uri="{91240B29-F687-4f45-9708-019B960494DF}">
-                  <a14:hiddenLine xmlns:a14="http://schemas.microsoft.com/office/drawing/2010/main" xmlns="" w="9525">
+                  <a14:hiddenLine xmlns="" xmlns:a14="http://schemas.microsoft.com/office/drawing/2010/main" w="9525">
                     <a:solidFill>
                       <a:srgbClr val="000000"/>
                     </a:solidFill>
@@ -11057,7 +11057,7 @@
               </a:ln>
               <a:extLst>
                 <a:ext uri="{91240B29-F687-4f45-9708-019B960494DF}">
-                  <a14:hiddenLine xmlns:a14="http://schemas.microsoft.com/office/drawing/2010/main" xmlns="" w="9525">
+                  <a14:hiddenLine xmlns="" xmlns:a14="http://schemas.microsoft.com/office/drawing/2010/main" w="9525">
                     <a:solidFill>
                       <a:srgbClr val="000000"/>
                     </a:solidFill>
@@ -11141,7 +11141,7 @@
               </a:ln>
               <a:extLst>
                 <a:ext uri="{91240B29-F687-4f45-9708-019B960494DF}">
-                  <a14:hiddenLine xmlns:a14="http://schemas.microsoft.com/office/drawing/2010/main" xmlns="" w="9525">
+                  <a14:hiddenLine xmlns="" xmlns:a14="http://schemas.microsoft.com/office/drawing/2010/main" w="9525">
                     <a:solidFill>
                       <a:srgbClr val="000000"/>
                     </a:solidFill>
@@ -11203,7 +11203,7 @@
               </a:ln>
               <a:extLst>
                 <a:ext uri="{91240B29-F687-4f45-9708-019B960494DF}">
-                  <a14:hiddenLine xmlns:a14="http://schemas.microsoft.com/office/drawing/2010/main" xmlns="" w="9525">
+                  <a14:hiddenLine xmlns="" xmlns:a14="http://schemas.microsoft.com/office/drawing/2010/main" w="9525">
                     <a:solidFill>
                       <a:srgbClr val="000000"/>
                     </a:solidFill>
@@ -11265,7 +11265,7 @@
               </a:ln>
               <a:extLst>
                 <a:ext uri="{91240B29-F687-4f45-9708-019B960494DF}">
-                  <a14:hiddenLine xmlns:a14="http://schemas.microsoft.com/office/drawing/2010/main" xmlns="" w="9525">
+                  <a14:hiddenLine xmlns="" xmlns:a14="http://schemas.microsoft.com/office/drawing/2010/main" w="9525">
                     <a:solidFill>
                       <a:srgbClr val="000000"/>
                     </a:solidFill>
@@ -11355,7 +11355,7 @@
               </a:ln>
               <a:extLst>
                 <a:ext uri="{91240B29-F687-4f45-9708-019B960494DF}">
-                  <a14:hiddenLine xmlns:a14="http://schemas.microsoft.com/office/drawing/2010/main" xmlns="" w="9525">
+                  <a14:hiddenLine xmlns="" xmlns:a14="http://schemas.microsoft.com/office/drawing/2010/main" w="9525">
                     <a:solidFill>
                       <a:srgbClr val="000000"/>
                     </a:solidFill>
@@ -11389,7 +11389,7 @@
               </a:ln>
               <a:extLst>
                 <a:ext uri="{91240B29-F687-4f45-9708-019B960494DF}">
-                  <a14:hiddenLine xmlns:a14="http://schemas.microsoft.com/office/drawing/2010/main" xmlns="" w="9525">
+                  <a14:hiddenLine xmlns="" xmlns:a14="http://schemas.microsoft.com/office/drawing/2010/main" w="9525">
                     <a:solidFill>
                       <a:srgbClr val="000000"/>
                     </a:solidFill>
@@ -11454,7 +11454,7 @@
               </a:ln>
               <a:extLst>
                 <a:ext uri="{91240B29-F687-4f45-9708-019B960494DF}">
-                  <a14:hiddenLine xmlns:a14="http://schemas.microsoft.com/office/drawing/2010/main" xmlns="" w="9525">
+                  <a14:hiddenLine xmlns="" xmlns:a14="http://schemas.microsoft.com/office/drawing/2010/main" w="9525">
                     <a:solidFill>
                       <a:srgbClr val="000000"/>
                     </a:solidFill>
@@ -11544,7 +11544,7 @@
               </a:ln>
               <a:extLst>
                 <a:ext uri="{91240B29-F687-4f45-9708-019B960494DF}">
-                  <a14:hiddenLine xmlns:a14="http://schemas.microsoft.com/office/drawing/2010/main" xmlns="" w="9525">
+                  <a14:hiddenLine xmlns="" xmlns:a14="http://schemas.microsoft.com/office/drawing/2010/main" w="9525">
                     <a:solidFill>
                       <a:srgbClr val="000000"/>
                     </a:solidFill>
@@ -11606,7 +11606,7 @@
               </a:ln>
               <a:extLst>
                 <a:ext uri="{91240B29-F687-4f45-9708-019B960494DF}">
-                  <a14:hiddenLine xmlns:a14="http://schemas.microsoft.com/office/drawing/2010/main" xmlns="" w="9525">
+                  <a14:hiddenLine xmlns="" xmlns:a14="http://schemas.microsoft.com/office/drawing/2010/main" w="9525">
                     <a:solidFill>
                       <a:srgbClr val="000000"/>
                     </a:solidFill>
@@ -11696,7 +11696,7 @@
               </a:ln>
               <a:extLst>
                 <a:ext uri="{91240B29-F687-4f45-9708-019B960494DF}">
-                  <a14:hiddenLine xmlns:a14="http://schemas.microsoft.com/office/drawing/2010/main" xmlns="" w="9525">
+                  <a14:hiddenLine xmlns="" xmlns:a14="http://schemas.microsoft.com/office/drawing/2010/main" w="9525">
                     <a:solidFill>
                       <a:srgbClr val="000000"/>
                     </a:solidFill>
@@ -11761,7 +11761,7 @@
               </a:ln>
               <a:extLst>
                 <a:ext uri="{91240B29-F687-4f45-9708-019B960494DF}">
-                  <a14:hiddenLine xmlns:a14="http://schemas.microsoft.com/office/drawing/2010/main" xmlns="" w="9525">
+                  <a14:hiddenLine xmlns="" xmlns:a14="http://schemas.microsoft.com/office/drawing/2010/main" w="9525">
                     <a:solidFill>
                       <a:srgbClr val="000000"/>
                     </a:solidFill>
@@ -11823,7 +11823,7 @@
               </a:ln>
               <a:extLst>
                 <a:ext uri="{91240B29-F687-4f45-9708-019B960494DF}">
-                  <a14:hiddenLine xmlns:a14="http://schemas.microsoft.com/office/drawing/2010/main" xmlns="" w="9525">
+                  <a14:hiddenLine xmlns="" xmlns:a14="http://schemas.microsoft.com/office/drawing/2010/main" w="9525">
                     <a:solidFill>
                       <a:srgbClr val="000000"/>
                     </a:solidFill>
@@ -11913,7 +11913,7 @@
               </a:ln>
               <a:extLst>
                 <a:ext uri="{91240B29-F687-4f45-9708-019B960494DF}">
-                  <a14:hiddenLine xmlns:a14="http://schemas.microsoft.com/office/drawing/2010/main" xmlns="" w="9525">
+                  <a14:hiddenLine xmlns="" xmlns:a14="http://schemas.microsoft.com/office/drawing/2010/main" w="9525">
                     <a:solidFill>
                       <a:srgbClr val="000000"/>
                     </a:solidFill>
@@ -12003,7 +12003,7 @@
               </a:ln>
               <a:extLst>
                 <a:ext uri="{91240B29-F687-4f45-9708-019B960494DF}">
-                  <a14:hiddenLine xmlns:a14="http://schemas.microsoft.com/office/drawing/2010/main" xmlns="" w="9525">
+                  <a14:hiddenLine xmlns="" xmlns:a14="http://schemas.microsoft.com/office/drawing/2010/main" w="9525">
                     <a:solidFill>
                       <a:srgbClr val="000000"/>
                     </a:solidFill>
@@ -12068,7 +12068,7 @@
               </a:ln>
               <a:extLst>
                 <a:ext uri="{91240B29-F687-4f45-9708-019B960494DF}">
-                  <a14:hiddenLine xmlns:a14="http://schemas.microsoft.com/office/drawing/2010/main" xmlns="" w="9525">
+                  <a14:hiddenLine xmlns="" xmlns:a14="http://schemas.microsoft.com/office/drawing/2010/main" w="9525">
                     <a:solidFill>
                       <a:srgbClr val="000000"/>
                     </a:solidFill>
@@ -12188,7 +12188,7 @@
               </a:ln>
               <a:extLst>
                 <a:ext uri="{91240B29-F687-4f45-9708-019B960494DF}">
-                  <a14:hiddenLine xmlns:a14="http://schemas.microsoft.com/office/drawing/2010/main" xmlns="" w="9525">
+                  <a14:hiddenLine xmlns="" xmlns:a14="http://schemas.microsoft.com/office/drawing/2010/main" w="9525">
                     <a:solidFill>
                       <a:srgbClr val="000000"/>
                     </a:solidFill>
@@ -12269,7 +12269,7 @@
               </a:ln>
               <a:extLst>
                 <a:ext uri="{91240B29-F687-4f45-9708-019B960494DF}">
-                  <a14:hiddenLine xmlns:a14="http://schemas.microsoft.com/office/drawing/2010/main" xmlns="" w="9525">
+                  <a14:hiddenLine xmlns="" xmlns:a14="http://schemas.microsoft.com/office/drawing/2010/main" w="9525">
                     <a:solidFill>
                       <a:srgbClr val="000000"/>
                     </a:solidFill>
@@ -12384,7 +12384,7 @@
               </a:ln>
               <a:extLst>
                 <a:ext uri="{91240B29-F687-4f45-9708-019B960494DF}">
-                  <a14:hiddenLine xmlns:a14="http://schemas.microsoft.com/office/drawing/2010/main" xmlns="" w="9525">
+                  <a14:hiddenLine xmlns="" xmlns:a14="http://schemas.microsoft.com/office/drawing/2010/main" w="9525">
                     <a:solidFill>
                       <a:srgbClr val="000000"/>
                     </a:solidFill>
@@ -12474,7 +12474,7 @@
               </a:ln>
               <a:extLst>
                 <a:ext uri="{91240B29-F687-4f45-9708-019B960494DF}">
-                  <a14:hiddenLine xmlns:a14="http://schemas.microsoft.com/office/drawing/2010/main" xmlns="" w="9525">
+                  <a14:hiddenLine xmlns="" xmlns:a14="http://schemas.microsoft.com/office/drawing/2010/main" w="9525">
                     <a:solidFill>
                       <a:srgbClr val="000000"/>
                     </a:solidFill>
@@ -12539,7 +12539,7 @@
               </a:ln>
               <a:extLst>
                 <a:ext uri="{91240B29-F687-4f45-9708-019B960494DF}">
-                  <a14:hiddenLine xmlns:a14="http://schemas.microsoft.com/office/drawing/2010/main" xmlns="" w="9525">
+                  <a14:hiddenLine xmlns="" xmlns:a14="http://schemas.microsoft.com/office/drawing/2010/main" w="9525">
                     <a:solidFill>
                       <a:srgbClr val="000000"/>
                     </a:solidFill>
@@ -12629,7 +12629,7 @@
               </a:ln>
               <a:extLst>
                 <a:ext uri="{91240B29-F687-4f45-9708-019B960494DF}">
-                  <a14:hiddenLine xmlns:a14="http://schemas.microsoft.com/office/drawing/2010/main" xmlns="" w="9525">
+                  <a14:hiddenLine xmlns="" xmlns:a14="http://schemas.microsoft.com/office/drawing/2010/main" w="9525">
                     <a:solidFill>
                       <a:srgbClr val="000000"/>
                     </a:solidFill>
@@ -12697,7 +12697,7 @@
               </a:ln>
               <a:extLst>
                 <a:ext uri="{91240B29-F687-4f45-9708-019B960494DF}">
-                  <a14:hiddenLine xmlns:a14="http://schemas.microsoft.com/office/drawing/2010/main" xmlns="" w="9525">
+                  <a14:hiddenLine xmlns="" xmlns:a14="http://schemas.microsoft.com/office/drawing/2010/main" w="9525">
                     <a:solidFill>
                       <a:srgbClr val="000000"/>
                     </a:solidFill>
@@ -12787,7 +12787,7 @@
               </a:ln>
               <a:extLst>
                 <a:ext uri="{91240B29-F687-4f45-9708-019B960494DF}">
-                  <a14:hiddenLine xmlns:a14="http://schemas.microsoft.com/office/drawing/2010/main" xmlns="" w="9525">
+                  <a14:hiddenLine xmlns="" xmlns:a14="http://schemas.microsoft.com/office/drawing/2010/main" w="9525">
                     <a:solidFill>
                       <a:srgbClr val="000000"/>
                     </a:solidFill>
@@ -12855,7 +12855,7 @@
               </a:ln>
               <a:extLst>
                 <a:ext uri="{91240B29-F687-4f45-9708-019B960494DF}">
-                  <a14:hiddenLine xmlns:a14="http://schemas.microsoft.com/office/drawing/2010/main" xmlns="" w="9525">
+                  <a14:hiddenLine xmlns="" xmlns:a14="http://schemas.microsoft.com/office/drawing/2010/main" w="9525">
                     <a:solidFill>
                       <a:srgbClr val="000000"/>
                     </a:solidFill>
@@ -12945,7 +12945,7 @@
               </a:ln>
               <a:extLst>
                 <a:ext uri="{91240B29-F687-4f45-9708-019B960494DF}">
-                  <a14:hiddenLine xmlns:a14="http://schemas.microsoft.com/office/drawing/2010/main" xmlns="" w="9525">
+                  <a14:hiddenLine xmlns="" xmlns:a14="http://schemas.microsoft.com/office/drawing/2010/main" w="9525">
                     <a:solidFill>
                       <a:srgbClr val="000000"/>
                     </a:solidFill>
@@ -12979,7 +12979,7 @@
               </a:ln>
               <a:extLst>
                 <a:ext uri="{91240B29-F687-4f45-9708-019B960494DF}">
-                  <a14:hiddenLine xmlns:a14="http://schemas.microsoft.com/office/drawing/2010/main" xmlns="" w="9525">
+                  <a14:hiddenLine xmlns="" xmlns:a14="http://schemas.microsoft.com/office/drawing/2010/main" w="9525">
                     <a:solidFill>
                       <a:srgbClr val="000000"/>
                     </a:solidFill>
@@ -13597,7 +13597,7 @@
         <p:spPr>
           <a:xfrm>
             <a:off x="7159336" y="3761509"/>
-            <a:ext cx="4353791" cy="1477328"/>
+            <a:ext cx="4353791" cy="1200329"/>
           </a:xfrm>
           <a:prstGeom prst="rect">
             <a:avLst/>
@@ -13644,21 +13644,6 @@
             <a:r>
               <a:rPr lang="fr-FR" dirty="0" err="1" smtClean="0"/>
               <a:t>Bogrova</a:t>
-            </a:r>
-            <a:endParaRPr lang="fr-FR" dirty="0" smtClean="0"/>
-          </a:p>
-          <a:p>
-            <a:r>
-              <a:rPr lang="fr-FR" dirty="0" err="1" smtClean="0"/>
-              <a:t>Taoufik</a:t>
-            </a:r>
-            <a:r>
-              <a:rPr lang="fr-FR" dirty="0" smtClean="0"/>
-              <a:t> </a:t>
-            </a:r>
-            <a:r>
-              <a:rPr lang="fr-FR" dirty="0" err="1" smtClean="0"/>
-              <a:t>Loueslati</a:t>
             </a:r>
             <a:endParaRPr lang="fr-FR" dirty="0"/>
           </a:p>
@@ -13808,7 +13793,23 @@
           <a:p>
             <a:r>
               <a:rPr lang="fr-FR" sz="2800" dirty="0" smtClean="0"/>
-              <a:t>Fonctionnalités implantées</a:t>
+              <a:t>Répartition des tâches</a:t>
+            </a:r>
+          </a:p>
+          <a:p>
+            <a:r>
+              <a:rPr lang="fr-FR" sz="2800" dirty="0" smtClean="0"/>
+              <a:t>Fonctionnalités </a:t>
+            </a:r>
+            <a:r>
+              <a:rPr lang="fr-FR" sz="2800" dirty="0" smtClean="0"/>
+              <a:t>implantées</a:t>
+            </a:r>
+          </a:p>
+          <a:p>
+            <a:r>
+              <a:rPr lang="fr-FR" sz="2800" dirty="0" smtClean="0"/>
+              <a:t>Problèmes rencontrés</a:t>
             </a:r>
           </a:p>
           <a:p>
@@ -13816,24 +13817,14 @@
               <a:rPr lang="fr-FR" sz="2800" dirty="0" smtClean="0"/>
               <a:t>Architecture</a:t>
             </a:r>
-          </a:p>
-          <a:p>
-            <a:r>
-              <a:rPr lang="fr-FR" sz="2800" dirty="0" smtClean="0"/>
-              <a:t>Répartition des tâches</a:t>
-            </a:r>
-          </a:p>
-          <a:p>
-            <a:r>
-              <a:rPr lang="fr-FR" sz="2800" dirty="0" smtClean="0"/>
-              <a:t>Problèmes rencontrés</a:t>
-            </a:r>
+            <a:endParaRPr lang="fr-FR" sz="2800" dirty="0" smtClean="0"/>
           </a:p>
           <a:p>
             <a:r>
               <a:rPr lang="fr-FR" sz="2800" dirty="0" smtClean="0"/>
               <a:t>Démonstration</a:t>
             </a:r>
+            <a:endParaRPr lang="fr-FR" sz="2800" dirty="0" smtClean="0"/>
           </a:p>
           <a:p>
             <a:r>
@@ -14109,80 +14100,44 @@
             <a:pPr algn="ctr"/>
             <a:r>
               <a:rPr lang="fr-FR" dirty="0" smtClean="0"/>
-              <a:t>Fonctionnalités </a:t>
-            </a:r>
-            <a:r>
-              <a:rPr lang="fr-FR" dirty="0" smtClean="0"/>
-              <a:t>implémentées</a:t>
+              <a:t>Répartition des tâches</a:t>
             </a:r>
             <a:endParaRPr lang="fr-FR" dirty="0"/>
           </a:p>
         </p:txBody>
       </p:sp>
-      <p:sp>
-        <p:nvSpPr>
-          <p:cNvPr id="3" name="Espace réservé du contenu 2"/>
-          <p:cNvSpPr>
-            <a:spLocks noGrp="1"/>
-          </p:cNvSpPr>
+      <p:pic>
+        <p:nvPicPr>
+          <p:cNvPr id="4" name="Espace réservé du contenu 3"/>
+          <p:cNvPicPr>
+            <a:picLocks noGrp="1" noChangeAspect="1"/>
+          </p:cNvPicPr>
           <p:nvPr>
             <p:ph idx="1"/>
           </p:nvPr>
-        </p:nvSpPr>
-        <p:spPr/>
-        <p:txBody>
-          <a:bodyPr/>
-          <a:lstStyle/>
-          <a:p>
-            <a:r>
-              <a:rPr lang="fr-FR" dirty="0" smtClean="0"/>
-              <a:t>Mouvements (avant, arrière, droite, gauche, rotation, …etc</a:t>
-            </a:r>
-            <a:r>
-              <a:rPr lang="fr-FR" dirty="0"/>
-              <a:t>.</a:t>
-            </a:r>
-            <a:r>
-              <a:rPr lang="fr-FR" dirty="0" smtClean="0"/>
-              <a:t>)</a:t>
-            </a:r>
-          </a:p>
-          <a:p>
-            <a:r>
-              <a:rPr lang="fr-FR" dirty="0" smtClean="0"/>
-              <a:t>Caméra</a:t>
-            </a:r>
-          </a:p>
-          <a:p>
-            <a:r>
-              <a:rPr lang="fr-FR" dirty="0" smtClean="0"/>
-              <a:t>Reconnaissance vocale</a:t>
-            </a:r>
-          </a:p>
-          <a:p>
-            <a:r>
-              <a:rPr lang="fr-FR" dirty="0" smtClean="0"/>
-              <a:t>Interface </a:t>
-            </a:r>
-            <a:r>
-              <a:rPr lang="fr-FR" dirty="0" smtClean="0"/>
-              <a:t>web pour piloter </a:t>
-            </a:r>
-            <a:r>
-              <a:rPr lang="fr-FR" dirty="0" err="1"/>
-              <a:t>G</a:t>
-            </a:r>
-            <a:r>
-              <a:rPr lang="fr-FR" dirty="0" err="1" smtClean="0"/>
-              <a:t>opiwan</a:t>
-            </a:r>
-            <a:endParaRPr lang="fr-FR" dirty="0" smtClean="0"/>
-          </a:p>
-        </p:txBody>
-      </p:sp>
-      <p:sp>
-        <p:nvSpPr>
-          <p:cNvPr id="4" name="Espace réservé du numéro de diapositive 3"/>
+        </p:nvPicPr>
+        <p:blipFill>
+          <a:blip r:embed="rId3">
+            <a:extLst>
+              <a:ext uri="{28A0092B-C50C-407E-A947-70E740481C1C}">
+                <a14:useLocalDpi xmlns:a14="http://schemas.microsoft.com/office/drawing/2010/main" val="0"/>
+              </a:ext>
+            </a:extLst>
+          </a:blip>
+          <a:stretch>
+            <a:fillRect/>
+          </a:stretch>
+        </p:blipFill>
+        <p:spPr>
+          <a:xfrm>
+            <a:off x="213902" y="2097088"/>
+            <a:ext cx="11761020" cy="3925707"/>
+          </a:xfrm>
+        </p:spPr>
+      </p:pic>
+      <p:sp>
+        <p:nvSpPr>
+          <p:cNvPr id="5" name="Espace réservé du numéro de diapositive 4"/>
           <p:cNvSpPr>
             <a:spLocks noGrp="1"/>
           </p:cNvSpPr>
@@ -14206,20 +14161,13 @@
     </p:spTree>
     <p:extLst>
       <p:ext uri="{BB962C8B-B14F-4D97-AF65-F5344CB8AC3E}">
-        <p14:creationId xmlns:p14="http://schemas.microsoft.com/office/powerpoint/2010/main" val="1563773936"/>
+        <p14:creationId xmlns:p14="http://schemas.microsoft.com/office/powerpoint/2010/main" val="1175870462"/>
       </p:ext>
     </p:extLst>
   </p:cSld>
   <p:clrMapOvr>
     <a:masterClrMapping/>
   </p:clrMapOvr>
-  <p:timing>
-    <p:tnLst>
-      <p:par>
-        <p:cTn id="1" dur="indefinite" restart="never" nodeType="tmRoot"/>
-      </p:par>
-    </p:tnLst>
-  </p:timing>
 </p:sld>
 </file>
 
@@ -14258,7 +14206,7 @@
             <a:pPr algn="ctr"/>
             <a:r>
               <a:rPr lang="fr-FR" dirty="0" smtClean="0"/>
-              <a:t>Architecture</a:t>
+              <a:t>Fonctionnalités implémentées</a:t>
             </a:r>
             <a:endParaRPr lang="fr-FR" dirty="0"/>
           </a:p>
@@ -14281,8 +14229,43 @@
           <a:p>
             <a:r>
               <a:rPr lang="fr-FR" dirty="0" smtClean="0"/>
-              <a:t>REST</a:t>
-            </a:r>
+              <a:t>Mouvements (avant, arrière, droite, gauche, rotation, …etc</a:t>
+            </a:r>
+            <a:r>
+              <a:rPr lang="fr-FR" dirty="0"/>
+              <a:t>.</a:t>
+            </a:r>
+            <a:r>
+              <a:rPr lang="fr-FR" dirty="0" smtClean="0"/>
+              <a:t>)</a:t>
+            </a:r>
+          </a:p>
+          <a:p>
+            <a:r>
+              <a:rPr lang="fr-FR" dirty="0" smtClean="0"/>
+              <a:t>Caméra</a:t>
+            </a:r>
+          </a:p>
+          <a:p>
+            <a:r>
+              <a:rPr lang="fr-FR" dirty="0" smtClean="0"/>
+              <a:t>Reconnaissance vocale</a:t>
+            </a:r>
+          </a:p>
+          <a:p>
+            <a:r>
+              <a:rPr lang="fr-FR" dirty="0" smtClean="0"/>
+              <a:t>Interface web pour piloter </a:t>
+            </a:r>
+            <a:r>
+              <a:rPr lang="fr-FR" dirty="0" err="1"/>
+              <a:t>G</a:t>
+            </a:r>
+            <a:r>
+              <a:rPr lang="fr-FR" dirty="0" err="1" smtClean="0"/>
+              <a:t>opiwan</a:t>
+            </a:r>
+            <a:endParaRPr lang="fr-FR" dirty="0" smtClean="0"/>
           </a:p>
         </p:txBody>
       </p:sp>
@@ -14312,7 +14295,7 @@
     </p:spTree>
     <p:extLst>
       <p:ext uri="{BB962C8B-B14F-4D97-AF65-F5344CB8AC3E}">
-        <p14:creationId xmlns:p14="http://schemas.microsoft.com/office/powerpoint/2010/main" val="716142171"/>
+        <p14:creationId xmlns:p14="http://schemas.microsoft.com/office/powerpoint/2010/main" val="1563773936"/>
       </p:ext>
     </p:extLst>
   </p:cSld>
@@ -14364,44 +14347,65 @@
             <a:pPr algn="ctr"/>
             <a:r>
               <a:rPr lang="fr-FR" dirty="0" smtClean="0"/>
-              <a:t>Répartition des tâches</a:t>
+              <a:t>Problèmes rencontrés</a:t>
             </a:r>
             <a:endParaRPr lang="fr-FR" dirty="0"/>
           </a:p>
         </p:txBody>
       </p:sp>
-      <p:pic>
-        <p:nvPicPr>
-          <p:cNvPr id="4" name="Espace réservé du contenu 3"/>
-          <p:cNvPicPr>
-            <a:picLocks noGrp="1" noChangeAspect="1"/>
-          </p:cNvPicPr>
+      <p:sp>
+        <p:nvSpPr>
+          <p:cNvPr id="3" name="Espace réservé du contenu 2"/>
+          <p:cNvSpPr>
+            <a:spLocks noGrp="1"/>
+          </p:cNvSpPr>
           <p:nvPr>
             <p:ph idx="1"/>
           </p:nvPr>
-        </p:nvPicPr>
-        <p:blipFill>
-          <a:blip r:embed="rId3">
-            <a:extLst>
-              <a:ext uri="{28A0092B-C50C-407E-A947-70E740481C1C}">
-                <a14:useLocalDpi xmlns:a14="http://schemas.microsoft.com/office/drawing/2010/main" val="0"/>
-              </a:ext>
-            </a:extLst>
-          </a:blip>
-          <a:stretch>
-            <a:fillRect/>
-          </a:stretch>
-        </p:blipFill>
-        <p:spPr>
-          <a:xfrm>
-            <a:off x="213902" y="2097088"/>
-            <a:ext cx="11761020" cy="3925707"/>
-          </a:xfrm>
-        </p:spPr>
-      </p:pic>
-      <p:sp>
-        <p:nvSpPr>
-          <p:cNvPr id="5" name="Espace réservé du numéro de diapositive 4"/>
+        </p:nvSpPr>
+        <p:spPr/>
+        <p:txBody>
+          <a:bodyPr/>
+          <a:lstStyle/>
+          <a:p>
+            <a:r>
+              <a:rPr lang="fr-FR" dirty="0"/>
+              <a:t>Bibliothèque non adaptée avec la carte </a:t>
+            </a:r>
+            <a:r>
+              <a:rPr lang="fr-FR" dirty="0" smtClean="0"/>
+              <a:t>fournie</a:t>
+            </a:r>
+          </a:p>
+          <a:p>
+            <a:r>
+              <a:rPr lang="fr-FR" dirty="0" smtClean="0"/>
+              <a:t>Pas de bibliothèque java (uniquement python)</a:t>
+            </a:r>
+          </a:p>
+          <a:p>
+            <a:r>
+              <a:rPr lang="fr-FR" dirty="0" smtClean="0"/>
+              <a:t>Problème de montage</a:t>
+            </a:r>
+          </a:p>
+          <a:p>
+            <a:r>
+              <a:rPr lang="fr-FR" dirty="0" smtClean="0"/>
+              <a:t>Connexion wifi du robot instable</a:t>
+            </a:r>
+          </a:p>
+          <a:p>
+            <a:pPr marL="0" indent="0">
+              <a:buNone/>
+            </a:pPr>
+            <a:endParaRPr lang="fr-FR" dirty="0"/>
+          </a:p>
+        </p:txBody>
+      </p:sp>
+      <p:sp>
+        <p:nvSpPr>
+          <p:cNvPr id="4" name="Espace réservé du numéro de diapositive 3"/>
           <p:cNvSpPr>
             <a:spLocks noGrp="1"/>
           </p:cNvSpPr>
@@ -14425,13 +14429,20 @@
     </p:spTree>
     <p:extLst>
       <p:ext uri="{BB962C8B-B14F-4D97-AF65-F5344CB8AC3E}">
-        <p14:creationId xmlns:p14="http://schemas.microsoft.com/office/powerpoint/2010/main" val="1175870462"/>
+        <p14:creationId xmlns:p14="http://schemas.microsoft.com/office/powerpoint/2010/main" val="3084996207"/>
       </p:ext>
     </p:extLst>
   </p:cSld>
   <p:clrMapOvr>
     <a:masterClrMapping/>
   </p:clrMapOvr>
+  <p:timing>
+    <p:tnLst>
+      <p:par>
+        <p:cTn id="1" dur="indefinite" restart="never" nodeType="tmRoot"/>
+      </p:par>
+    </p:tnLst>
+  </p:timing>
 </p:sld>
 </file>
 
@@ -14470,7 +14481,7 @@
             <a:pPr algn="ctr"/>
             <a:r>
               <a:rPr lang="fr-FR" dirty="0" smtClean="0"/>
-              <a:t>Problèmes rencontrés</a:t>
+              <a:t>Architecture</a:t>
             </a:r>
             <a:endParaRPr lang="fr-FR" dirty="0"/>
           </a:p>
@@ -14492,37 +14503,9 @@
           <a:lstStyle/>
           <a:p>
             <a:r>
-              <a:rPr lang="fr-FR" dirty="0"/>
-              <a:t>Bibliothèque non adaptée avec la carte </a:t>
-            </a:r>
-            <a:r>
               <a:rPr lang="fr-FR" dirty="0" smtClean="0"/>
-              <a:t>fournie</a:t>
-            </a:r>
-          </a:p>
-          <a:p>
-            <a:r>
-              <a:rPr lang="fr-FR" dirty="0" smtClean="0"/>
-              <a:t>Pas de bibliothèque java (uniquement python)</a:t>
-            </a:r>
-          </a:p>
-          <a:p>
-            <a:r>
-              <a:rPr lang="fr-FR" dirty="0" smtClean="0"/>
-              <a:t>Problème de montage</a:t>
-            </a:r>
-          </a:p>
-          <a:p>
-            <a:r>
-              <a:rPr lang="fr-FR" dirty="0" smtClean="0"/>
-              <a:t>Connexion wifi du robot instable</a:t>
-            </a:r>
-          </a:p>
-          <a:p>
-            <a:pPr marL="0" indent="0">
-              <a:buNone/>
-            </a:pPr>
-            <a:endParaRPr lang="fr-FR" dirty="0"/>
+              <a:t>REST</a:t>
+            </a:r>
           </a:p>
         </p:txBody>
       </p:sp>
@@ -14552,7 +14535,7 @@
     </p:spTree>
     <p:extLst>
       <p:ext uri="{BB962C8B-B14F-4D97-AF65-F5344CB8AC3E}">
-        <p14:creationId xmlns:p14="http://schemas.microsoft.com/office/powerpoint/2010/main" val="3084996207"/>
+        <p14:creationId xmlns:p14="http://schemas.microsoft.com/office/powerpoint/2010/main" val="716142171"/>
       </p:ext>
     </p:extLst>
   </p:cSld>

</xml_diff>

<commit_message>
Changement de la conclusion du diaporama de soutenance
</commit_message>
<xml_diff>
--- a/Documents/diaporama_soutenance.pptx
+++ b/Documents/diaporama_soutenance.pptx
@@ -205,7 +205,7 @@
           <a:p>
             <a:fld id="{67F2E138-F33C-4BBE-8258-725ED9228797}" type="datetimeFigureOut">
               <a:rPr lang="fr-FR" smtClean="0"/>
-              <a:t>09/05/2015</a:t>
+              <a:t>10/05/2015</a:t>
             </a:fld>
             <a:endParaRPr lang="fr-FR"/>
           </a:p>
@@ -1242,27 +1242,30 @@
           <a:lstStyle/>
           <a:p>
             <a:r>
-              <a:rPr lang="fr-FR" dirty="0" smtClean="0"/>
-              <a:t>Pour réaliser </a:t>
-            </a:r>
-            <a:r>
-              <a:rPr lang="fr-FR" dirty="0" err="1" smtClean="0"/>
-              <a:t>Gopiwan</a:t>
-            </a:r>
-            <a:r>
               <a:rPr lang="fr-FR" baseline="0" dirty="0" smtClean="0"/>
-              <a:t> qui consistait donc à commander à distance le robot, cela nous a prit une 100 à 200 heures pour configurer le robot, réaliser l’API REST notamment avec Jersey qui est embarqué dans le serveur </a:t>
-            </a:r>
-            <a:r>
-              <a:rPr lang="fr-FR" baseline="0" dirty="0" err="1" smtClean="0"/>
-              <a:t>Jetty</a:t>
-            </a:r>
-            <a:endParaRPr lang="fr-FR" baseline="0" dirty="0" smtClean="0"/>
-          </a:p>
-          <a:p>
+              <a:t>Nous avons donc réussi à terminer le projet comme vous avez pu le constater avec la démonstration. Nous </a:t>
+            </a:r>
             <a:r>
               <a:rPr lang="fr-FR" baseline="0" dirty="0" smtClean="0"/>
-              <a:t>Nous avons donc, grâce à ce projet eu l’occasion d’apprendre à utiliser différentes technologies que nous ne maitrisions pas forcément mais qui pourront nous êtres très utiles dans un avenir relativement proche au vu du développement ces dernières années et dans les années qui vont venir des objets connectés.</a:t>
+              <a:t>avons </a:t>
+            </a:r>
+            <a:r>
+              <a:rPr lang="fr-FR" baseline="0" dirty="0" smtClean="0"/>
+              <a:t>grâce </a:t>
+            </a:r>
+            <a:r>
+              <a:rPr lang="fr-FR" baseline="0" dirty="0" smtClean="0"/>
+              <a:t>à ce projet eu l’occasion d’apprendre à utiliser différentes technologies que nous ne maitrisions pas forcément mais qui pourront nous êtres très utiles dans un avenir relativement proche au vu du développement ces dernières années et dans les années qui vont venir des objets connectés</a:t>
+            </a:r>
+            <a:r>
+              <a:rPr lang="fr-FR" baseline="0" dirty="0" smtClean="0"/>
+              <a:t>.</a:t>
+            </a:r>
+          </a:p>
+          <a:p>
+            <a:r>
+              <a:rPr lang="fr-FR" baseline="0" dirty="0" smtClean="0"/>
+              <a:t>Concernant les choses que l’on pourraient améliorer dans nos projet futur, il y a la répartition des tâches car c’est toujours compliqué de déterminer à l’avance combien de temps va nous prendre une tâche, en particulier quand il s’agit de technologies qu’on ne connait pas encore.</a:t>
             </a:r>
             <a:endParaRPr lang="fr-FR" dirty="0"/>
           </a:p>
@@ -1361,7 +1364,7 @@
           <a:noFill/>
           <a:extLst>
             <a:ext uri="{909E8E84-426E-40dd-AFC4-6F175D3DCCD1}">
-              <a14:hiddenFill xmlns="" xmlns:a14="http://schemas.microsoft.com/office/drawing/2010/main">
+              <a14:hiddenFill xmlns:a14="http://schemas.microsoft.com/office/drawing/2010/main" xmlns="">
                 <a:solidFill>
                   <a:srgbClr val="FFFFFF"/>
                 </a:solidFill>
@@ -1420,7 +1423,7 @@
             </a:ln>
             <a:extLst>
               <a:ext uri="{91240B29-F687-4f45-9708-019B960494DF}">
-                <a14:hiddenLine xmlns="" xmlns:a14="http://schemas.microsoft.com/office/drawing/2010/main" w="9525">
+                <a14:hiddenLine xmlns:a14="http://schemas.microsoft.com/office/drawing/2010/main" xmlns="" w="9525">
                   <a:solidFill>
                     <a:srgbClr val="000000"/>
                   </a:solidFill>
@@ -1510,7 +1513,7 @@
             </a:ln>
             <a:extLst>
               <a:ext uri="{91240B29-F687-4f45-9708-019B960494DF}">
-                <a14:hiddenLine xmlns="" xmlns:a14="http://schemas.microsoft.com/office/drawing/2010/main" w="9525">
+                <a14:hiddenLine xmlns:a14="http://schemas.microsoft.com/office/drawing/2010/main" xmlns="" w="9525">
                   <a:solidFill>
                     <a:srgbClr val="000000"/>
                   </a:solidFill>
@@ -1600,7 +1603,7 @@
             </a:ln>
             <a:extLst>
               <a:ext uri="{91240B29-F687-4f45-9708-019B960494DF}">
-                <a14:hiddenLine xmlns="" xmlns:a14="http://schemas.microsoft.com/office/drawing/2010/main" w="9525">
+                <a14:hiddenLine xmlns:a14="http://schemas.microsoft.com/office/drawing/2010/main" xmlns="" w="9525">
                   <a:solidFill>
                     <a:srgbClr val="000000"/>
                   </a:solidFill>
@@ -1634,7 +1637,7 @@
             </a:ln>
             <a:extLst>
               <a:ext uri="{91240B29-F687-4f45-9708-019B960494DF}">
-                <a14:hiddenLine xmlns="" xmlns:a14="http://schemas.microsoft.com/office/drawing/2010/main" w="9525">
+                <a14:hiddenLine xmlns:a14="http://schemas.microsoft.com/office/drawing/2010/main" xmlns="" w="9525">
                   <a:solidFill>
                     <a:srgbClr val="000000"/>
                   </a:solidFill>
@@ -1724,7 +1727,7 @@
             </a:ln>
             <a:extLst>
               <a:ext uri="{91240B29-F687-4f45-9708-019B960494DF}">
-                <a14:hiddenLine xmlns="" xmlns:a14="http://schemas.microsoft.com/office/drawing/2010/main" w="9525">
+                <a14:hiddenLine xmlns:a14="http://schemas.microsoft.com/office/drawing/2010/main" xmlns="" w="9525">
                   <a:solidFill>
                     <a:srgbClr val="000000"/>
                   </a:solidFill>
@@ -1786,7 +1789,7 @@
             </a:ln>
             <a:extLst>
               <a:ext uri="{91240B29-F687-4f45-9708-019B960494DF}">
-                <a14:hiddenLine xmlns="" xmlns:a14="http://schemas.microsoft.com/office/drawing/2010/main" w="9525">
+                <a14:hiddenLine xmlns:a14="http://schemas.microsoft.com/office/drawing/2010/main" xmlns="" w="9525">
                   <a:solidFill>
                     <a:srgbClr val="000000"/>
                   </a:solidFill>
@@ -1848,7 +1851,7 @@
             </a:ln>
             <a:extLst>
               <a:ext uri="{91240B29-F687-4f45-9708-019B960494DF}">
-                <a14:hiddenLine xmlns="" xmlns:a14="http://schemas.microsoft.com/office/drawing/2010/main" w="9525">
+                <a14:hiddenLine xmlns:a14="http://schemas.microsoft.com/office/drawing/2010/main" xmlns="" w="9525">
                   <a:solidFill>
                     <a:srgbClr val="000000"/>
                   </a:solidFill>
@@ -1938,7 +1941,7 @@
             </a:ln>
             <a:extLst>
               <a:ext uri="{91240B29-F687-4f45-9708-019B960494DF}">
-                <a14:hiddenLine xmlns="" xmlns:a14="http://schemas.microsoft.com/office/drawing/2010/main" w="9525">
+                <a14:hiddenLine xmlns:a14="http://schemas.microsoft.com/office/drawing/2010/main" xmlns="" w="9525">
                   <a:solidFill>
                     <a:srgbClr val="000000"/>
                   </a:solidFill>
@@ -2000,7 +2003,7 @@
             </a:ln>
             <a:extLst>
               <a:ext uri="{91240B29-F687-4f45-9708-019B960494DF}">
-                <a14:hiddenLine xmlns="" xmlns:a14="http://schemas.microsoft.com/office/drawing/2010/main" w="9525">
+                <a14:hiddenLine xmlns:a14="http://schemas.microsoft.com/office/drawing/2010/main" xmlns="" w="9525">
                   <a:solidFill>
                     <a:srgbClr val="000000"/>
                   </a:solidFill>
@@ -2062,7 +2065,7 @@
             </a:ln>
             <a:extLst>
               <a:ext uri="{91240B29-F687-4f45-9708-019B960494DF}">
-                <a14:hiddenLine xmlns="" xmlns:a14="http://schemas.microsoft.com/office/drawing/2010/main" w="9525">
+                <a14:hiddenLine xmlns:a14="http://schemas.microsoft.com/office/drawing/2010/main" xmlns="" w="9525">
                   <a:solidFill>
                     <a:srgbClr val="000000"/>
                   </a:solidFill>
@@ -2152,7 +2155,7 @@
             </a:ln>
             <a:extLst>
               <a:ext uri="{91240B29-F687-4f45-9708-019B960494DF}">
-                <a14:hiddenLine xmlns="" xmlns:a14="http://schemas.microsoft.com/office/drawing/2010/main" w="9525">
+                <a14:hiddenLine xmlns:a14="http://schemas.microsoft.com/office/drawing/2010/main" xmlns="" w="9525">
                   <a:solidFill>
                     <a:srgbClr val="000000"/>
                   </a:solidFill>
@@ -2242,7 +2245,7 @@
             </a:ln>
             <a:extLst>
               <a:ext uri="{91240B29-F687-4f45-9708-019B960494DF}">
-                <a14:hiddenLine xmlns="" xmlns:a14="http://schemas.microsoft.com/office/drawing/2010/main" w="9525">
+                <a14:hiddenLine xmlns:a14="http://schemas.microsoft.com/office/drawing/2010/main" xmlns="" w="9525">
                   <a:solidFill>
                     <a:srgbClr val="000000"/>
                   </a:solidFill>
@@ -2304,7 +2307,7 @@
             </a:ln>
             <a:extLst>
               <a:ext uri="{91240B29-F687-4f45-9708-019B960494DF}">
-                <a14:hiddenLine xmlns="" xmlns:a14="http://schemas.microsoft.com/office/drawing/2010/main" w="9525">
+                <a14:hiddenLine xmlns:a14="http://schemas.microsoft.com/office/drawing/2010/main" xmlns="" w="9525">
                   <a:solidFill>
                     <a:srgbClr val="000000"/>
                   </a:solidFill>
@@ -2414,7 +2417,7 @@
             </a:ln>
             <a:extLst>
               <a:ext uri="{91240B29-F687-4f45-9708-019B960494DF}">
-                <a14:hiddenLine xmlns="" xmlns:a14="http://schemas.microsoft.com/office/drawing/2010/main" w="9525">
+                <a14:hiddenLine xmlns:a14="http://schemas.microsoft.com/office/drawing/2010/main" xmlns="" w="9525">
                   <a:solidFill>
                     <a:srgbClr val="000000"/>
                   </a:solidFill>
@@ -2476,7 +2479,7 @@
             </a:ln>
             <a:extLst>
               <a:ext uri="{91240B29-F687-4f45-9708-019B960494DF}">
-                <a14:hiddenLine xmlns="" xmlns:a14="http://schemas.microsoft.com/office/drawing/2010/main" w="9525">
+                <a14:hiddenLine xmlns:a14="http://schemas.microsoft.com/office/drawing/2010/main" xmlns="" w="9525">
                   <a:solidFill>
                     <a:srgbClr val="000000"/>
                   </a:solidFill>
@@ -2566,7 +2569,7 @@
             </a:ln>
             <a:extLst>
               <a:ext uri="{91240B29-F687-4f45-9708-019B960494DF}">
-                <a14:hiddenLine xmlns="" xmlns:a14="http://schemas.microsoft.com/office/drawing/2010/main" w="9525">
+                <a14:hiddenLine xmlns:a14="http://schemas.microsoft.com/office/drawing/2010/main" xmlns="" w="9525">
                   <a:solidFill>
                     <a:srgbClr val="000000"/>
                   </a:solidFill>
@@ -2656,7 +2659,7 @@
             </a:ln>
             <a:extLst>
               <a:ext uri="{91240B29-F687-4f45-9708-019B960494DF}">
-                <a14:hiddenLine xmlns="" xmlns:a14="http://schemas.microsoft.com/office/drawing/2010/main" w="9525">
+                <a14:hiddenLine xmlns:a14="http://schemas.microsoft.com/office/drawing/2010/main" xmlns="" w="9525">
                   <a:solidFill>
                     <a:srgbClr val="000000"/>
                   </a:solidFill>
@@ -2718,7 +2721,7 @@
             </a:ln>
             <a:extLst>
               <a:ext uri="{91240B29-F687-4f45-9708-019B960494DF}">
-                <a14:hiddenLine xmlns="" xmlns:a14="http://schemas.microsoft.com/office/drawing/2010/main" w="9525">
+                <a14:hiddenLine xmlns:a14="http://schemas.microsoft.com/office/drawing/2010/main" xmlns="" w="9525">
                   <a:solidFill>
                     <a:srgbClr val="000000"/>
                   </a:solidFill>
@@ -2808,7 +2811,7 @@
             </a:ln>
             <a:extLst>
               <a:ext uri="{91240B29-F687-4f45-9708-019B960494DF}">
-                <a14:hiddenLine xmlns="" xmlns:a14="http://schemas.microsoft.com/office/drawing/2010/main" w="9525">
+                <a14:hiddenLine xmlns:a14="http://schemas.microsoft.com/office/drawing/2010/main" xmlns="" w="9525">
                   <a:solidFill>
                     <a:srgbClr val="000000"/>
                   </a:solidFill>
@@ -2898,7 +2901,7 @@
             </a:ln>
             <a:extLst>
               <a:ext uri="{91240B29-F687-4f45-9708-019B960494DF}">
-                <a14:hiddenLine xmlns="" xmlns:a14="http://schemas.microsoft.com/office/drawing/2010/main" w="9525">
+                <a14:hiddenLine xmlns:a14="http://schemas.microsoft.com/office/drawing/2010/main" xmlns="" w="9525">
                   <a:solidFill>
                     <a:srgbClr val="000000"/>
                   </a:solidFill>
@@ -2954,7 +2957,7 @@
             </a:ln>
             <a:extLst>
               <a:ext uri="{91240B29-F687-4f45-9708-019B960494DF}">
-                <a14:hiddenLine xmlns="" xmlns:a14="http://schemas.microsoft.com/office/drawing/2010/main" w="9525">
+                <a14:hiddenLine xmlns:a14="http://schemas.microsoft.com/office/drawing/2010/main" xmlns="" w="9525">
                   <a:solidFill>
                     <a:srgbClr val="000000"/>
                   </a:solidFill>
@@ -3044,7 +3047,7 @@
             </a:ln>
             <a:extLst>
               <a:ext uri="{91240B29-F687-4f45-9708-019B960494DF}">
-                <a14:hiddenLine xmlns="" xmlns:a14="http://schemas.microsoft.com/office/drawing/2010/main" w="9525">
+                <a14:hiddenLine xmlns:a14="http://schemas.microsoft.com/office/drawing/2010/main" xmlns="" w="9525">
                   <a:solidFill>
                     <a:srgbClr val="000000"/>
                   </a:solidFill>
@@ -3100,7 +3103,7 @@
             </a:ln>
             <a:extLst>
               <a:ext uri="{91240B29-F687-4f45-9708-019B960494DF}">
-                <a14:hiddenLine xmlns="" xmlns:a14="http://schemas.microsoft.com/office/drawing/2010/main" w="9525">
+                <a14:hiddenLine xmlns:a14="http://schemas.microsoft.com/office/drawing/2010/main" xmlns="" w="9525">
                   <a:solidFill>
                     <a:srgbClr val="000000"/>
                   </a:solidFill>
@@ -3190,7 +3193,7 @@
             </a:ln>
             <a:extLst>
               <a:ext uri="{91240B29-F687-4f45-9708-019B960494DF}">
-                <a14:hiddenLine xmlns="" xmlns:a14="http://schemas.microsoft.com/office/drawing/2010/main" w="9525">
+                <a14:hiddenLine xmlns:a14="http://schemas.microsoft.com/office/drawing/2010/main" xmlns="" w="9525">
                   <a:solidFill>
                     <a:srgbClr val="000000"/>
                   </a:solidFill>
@@ -3258,7 +3261,7 @@
             </a:ln>
             <a:extLst>
               <a:ext uri="{91240B29-F687-4f45-9708-019B960494DF}">
-                <a14:hiddenLine xmlns="" xmlns:a14="http://schemas.microsoft.com/office/drawing/2010/main" w="9525">
+                <a14:hiddenLine xmlns:a14="http://schemas.microsoft.com/office/drawing/2010/main" xmlns="" w="9525">
                   <a:solidFill>
                     <a:srgbClr val="000000"/>
                   </a:solidFill>
@@ -3348,7 +3351,7 @@
             </a:ln>
             <a:extLst>
               <a:ext uri="{91240B29-F687-4f45-9708-019B960494DF}">
-                <a14:hiddenLine xmlns="" xmlns:a14="http://schemas.microsoft.com/office/drawing/2010/main" w="9525">
+                <a14:hiddenLine xmlns:a14="http://schemas.microsoft.com/office/drawing/2010/main" xmlns="" w="9525">
                   <a:solidFill>
                     <a:srgbClr val="000000"/>
                   </a:solidFill>
@@ -3416,7 +3419,7 @@
             </a:ln>
             <a:extLst>
               <a:ext uri="{91240B29-F687-4f45-9708-019B960494DF}">
-                <a14:hiddenLine xmlns="" xmlns:a14="http://schemas.microsoft.com/office/drawing/2010/main" w="9525">
+                <a14:hiddenLine xmlns:a14="http://schemas.microsoft.com/office/drawing/2010/main" xmlns="" w="9525">
                   <a:solidFill>
                     <a:srgbClr val="000000"/>
                   </a:solidFill>
@@ -3506,7 +3509,7 @@
             </a:ln>
             <a:extLst>
               <a:ext uri="{91240B29-F687-4f45-9708-019B960494DF}">
-                <a14:hiddenLine xmlns="" xmlns:a14="http://schemas.microsoft.com/office/drawing/2010/main" w="9525">
+                <a14:hiddenLine xmlns:a14="http://schemas.microsoft.com/office/drawing/2010/main" xmlns="" w="9525">
                   <a:solidFill>
                     <a:srgbClr val="000000"/>
                   </a:solidFill>
@@ -3540,7 +3543,7 @@
             </a:ln>
             <a:extLst>
               <a:ext uri="{91240B29-F687-4f45-9708-019B960494DF}">
-                <a14:hiddenLine xmlns="" xmlns:a14="http://schemas.microsoft.com/office/drawing/2010/main" w="9525">
+                <a14:hiddenLine xmlns:a14="http://schemas.microsoft.com/office/drawing/2010/main" xmlns="" w="9525">
                   <a:solidFill>
                     <a:srgbClr val="000000"/>
                   </a:solidFill>
@@ -3630,7 +3633,7 @@
             </a:ln>
             <a:extLst>
               <a:ext uri="{91240B29-F687-4f45-9708-019B960494DF}">
-                <a14:hiddenLine xmlns="" xmlns:a14="http://schemas.microsoft.com/office/drawing/2010/main" w="9525">
+                <a14:hiddenLine xmlns:a14="http://schemas.microsoft.com/office/drawing/2010/main" xmlns="" w="9525">
                   <a:solidFill>
                     <a:srgbClr val="000000"/>
                   </a:solidFill>
@@ -3692,7 +3695,7 @@
             </a:ln>
             <a:extLst>
               <a:ext uri="{91240B29-F687-4f45-9708-019B960494DF}">
-                <a14:hiddenLine xmlns="" xmlns:a14="http://schemas.microsoft.com/office/drawing/2010/main" w="9525">
+                <a14:hiddenLine xmlns:a14="http://schemas.microsoft.com/office/drawing/2010/main" xmlns="" w="9525">
                   <a:solidFill>
                     <a:srgbClr val="000000"/>
                   </a:solidFill>
@@ -3754,7 +3757,7 @@
             </a:ln>
             <a:extLst>
               <a:ext uri="{91240B29-F687-4f45-9708-019B960494DF}">
-                <a14:hiddenLine xmlns="" xmlns:a14="http://schemas.microsoft.com/office/drawing/2010/main" w="9525">
+                <a14:hiddenLine xmlns:a14="http://schemas.microsoft.com/office/drawing/2010/main" xmlns="" w="9525">
                   <a:solidFill>
                     <a:srgbClr val="000000"/>
                   </a:solidFill>
@@ -3844,7 +3847,7 @@
             </a:ln>
             <a:extLst>
               <a:ext uri="{91240B29-F687-4f45-9708-019B960494DF}">
-                <a14:hiddenLine xmlns="" xmlns:a14="http://schemas.microsoft.com/office/drawing/2010/main" w="9525">
+                <a14:hiddenLine xmlns:a14="http://schemas.microsoft.com/office/drawing/2010/main" xmlns="" w="9525">
                   <a:solidFill>
                     <a:srgbClr val="000000"/>
                   </a:solidFill>
@@ -3912,7 +3915,7 @@
             </a:ln>
             <a:extLst>
               <a:ext uri="{91240B29-F687-4f45-9708-019B960494DF}">
-                <a14:hiddenLine xmlns="" xmlns:a14="http://schemas.microsoft.com/office/drawing/2010/main" w="9525">
+                <a14:hiddenLine xmlns:a14="http://schemas.microsoft.com/office/drawing/2010/main" xmlns="" w="9525">
                   <a:solidFill>
                     <a:srgbClr val="000000"/>
                   </a:solidFill>
@@ -3974,7 +3977,7 @@
             </a:ln>
             <a:extLst>
               <a:ext uri="{91240B29-F687-4f45-9708-019B960494DF}">
-                <a14:hiddenLine xmlns="" xmlns:a14="http://schemas.microsoft.com/office/drawing/2010/main" w="9525">
+                <a14:hiddenLine xmlns:a14="http://schemas.microsoft.com/office/drawing/2010/main" xmlns="" w="9525">
                   <a:solidFill>
                     <a:srgbClr val="000000"/>
                   </a:solidFill>
@@ -4064,7 +4067,7 @@
             </a:ln>
             <a:extLst>
               <a:ext uri="{91240B29-F687-4f45-9708-019B960494DF}">
-                <a14:hiddenLine xmlns="" xmlns:a14="http://schemas.microsoft.com/office/drawing/2010/main" w="9525">
+                <a14:hiddenLine xmlns:a14="http://schemas.microsoft.com/office/drawing/2010/main" xmlns="" w="9525">
                   <a:solidFill>
                     <a:srgbClr val="000000"/>
                   </a:solidFill>
@@ -4126,7 +4129,7 @@
             </a:ln>
             <a:extLst>
               <a:ext uri="{91240B29-F687-4f45-9708-019B960494DF}">
-                <a14:hiddenLine xmlns="" xmlns:a14="http://schemas.microsoft.com/office/drawing/2010/main" w="9525">
+                <a14:hiddenLine xmlns:a14="http://schemas.microsoft.com/office/drawing/2010/main" xmlns="" w="9525">
                   <a:solidFill>
                     <a:srgbClr val="000000"/>
                   </a:solidFill>
@@ -4216,7 +4219,7 @@
             </a:ln>
             <a:extLst>
               <a:ext uri="{91240B29-F687-4f45-9708-019B960494DF}">
-                <a14:hiddenLine xmlns="" xmlns:a14="http://schemas.microsoft.com/office/drawing/2010/main" w="9525">
+                <a14:hiddenLine xmlns:a14="http://schemas.microsoft.com/office/drawing/2010/main" xmlns="" w="9525">
                   <a:solidFill>
                     <a:srgbClr val="000000"/>
                   </a:solidFill>
@@ -4278,7 +4281,7 @@
             </a:ln>
             <a:extLst>
               <a:ext uri="{91240B29-F687-4f45-9708-019B960494DF}">
-                <a14:hiddenLine xmlns="" xmlns:a14="http://schemas.microsoft.com/office/drawing/2010/main" w="9525">
+                <a14:hiddenLine xmlns:a14="http://schemas.microsoft.com/office/drawing/2010/main" xmlns="" w="9525">
                   <a:solidFill>
                     <a:srgbClr val="000000"/>
                   </a:solidFill>
@@ -4368,7 +4371,7 @@
             </a:ln>
             <a:extLst>
               <a:ext uri="{91240B29-F687-4f45-9708-019B960494DF}">
-                <a14:hiddenLine xmlns="" xmlns:a14="http://schemas.microsoft.com/office/drawing/2010/main" w="9525">
+                <a14:hiddenLine xmlns:a14="http://schemas.microsoft.com/office/drawing/2010/main" xmlns="" w="9525">
                   <a:solidFill>
                     <a:srgbClr val="000000"/>
                   </a:solidFill>
@@ -4402,7 +4405,7 @@
             </a:ln>
             <a:extLst>
               <a:ext uri="{91240B29-F687-4f45-9708-019B960494DF}">
-                <a14:hiddenLine xmlns="" xmlns:a14="http://schemas.microsoft.com/office/drawing/2010/main" w="9525">
+                <a14:hiddenLine xmlns:a14="http://schemas.microsoft.com/office/drawing/2010/main" xmlns="" w="9525">
                   <a:solidFill>
                     <a:srgbClr val="000000"/>
                   </a:solidFill>
@@ -4467,7 +4470,7 @@
             </a:ln>
             <a:extLst>
               <a:ext uri="{91240B29-F687-4f45-9708-019B960494DF}">
-                <a14:hiddenLine xmlns="" xmlns:a14="http://schemas.microsoft.com/office/drawing/2010/main" w="9525">
+                <a14:hiddenLine xmlns:a14="http://schemas.microsoft.com/office/drawing/2010/main" xmlns="" w="9525">
                   <a:solidFill>
                     <a:srgbClr val="000000"/>
                   </a:solidFill>
@@ -4557,7 +4560,7 @@
             </a:ln>
             <a:extLst>
               <a:ext uri="{91240B29-F687-4f45-9708-019B960494DF}">
-                <a14:hiddenLine xmlns="" xmlns:a14="http://schemas.microsoft.com/office/drawing/2010/main" w="9525">
+                <a14:hiddenLine xmlns:a14="http://schemas.microsoft.com/office/drawing/2010/main" xmlns="" w="9525">
                   <a:solidFill>
                     <a:srgbClr val="000000"/>
                   </a:solidFill>
@@ -4619,7 +4622,7 @@
             </a:ln>
             <a:extLst>
               <a:ext uri="{91240B29-F687-4f45-9708-019B960494DF}">
-                <a14:hiddenLine xmlns="" xmlns:a14="http://schemas.microsoft.com/office/drawing/2010/main" w="9525">
+                <a14:hiddenLine xmlns:a14="http://schemas.microsoft.com/office/drawing/2010/main" xmlns="" w="9525">
                   <a:solidFill>
                     <a:srgbClr val="000000"/>
                   </a:solidFill>
@@ -4709,7 +4712,7 @@
             </a:ln>
             <a:extLst>
               <a:ext uri="{91240B29-F687-4f45-9708-019B960494DF}">
-                <a14:hiddenLine xmlns="" xmlns:a14="http://schemas.microsoft.com/office/drawing/2010/main" w="9525">
+                <a14:hiddenLine xmlns:a14="http://schemas.microsoft.com/office/drawing/2010/main" xmlns="" w="9525">
                   <a:solidFill>
                     <a:srgbClr val="000000"/>
                   </a:solidFill>
@@ -4799,7 +4802,7 @@
             </a:ln>
             <a:extLst>
               <a:ext uri="{91240B29-F687-4f45-9708-019B960494DF}">
-                <a14:hiddenLine xmlns="" xmlns:a14="http://schemas.microsoft.com/office/drawing/2010/main" w="9525">
+                <a14:hiddenLine xmlns:a14="http://schemas.microsoft.com/office/drawing/2010/main" xmlns="" w="9525">
                   <a:solidFill>
                     <a:srgbClr val="000000"/>
                   </a:solidFill>
@@ -4864,7 +4867,7 @@
             </a:ln>
             <a:extLst>
               <a:ext uri="{91240B29-F687-4f45-9708-019B960494DF}">
-                <a14:hiddenLine xmlns="" xmlns:a14="http://schemas.microsoft.com/office/drawing/2010/main" w="9525">
+                <a14:hiddenLine xmlns:a14="http://schemas.microsoft.com/office/drawing/2010/main" xmlns="" w="9525">
                   <a:solidFill>
                     <a:srgbClr val="000000"/>
                   </a:solidFill>
@@ -4926,7 +4929,7 @@
             </a:ln>
             <a:extLst>
               <a:ext uri="{91240B29-F687-4f45-9708-019B960494DF}">
-                <a14:hiddenLine xmlns="" xmlns:a14="http://schemas.microsoft.com/office/drawing/2010/main" w="9525">
+                <a14:hiddenLine xmlns:a14="http://schemas.microsoft.com/office/drawing/2010/main" xmlns="" w="9525">
                   <a:solidFill>
                     <a:srgbClr val="000000"/>
                   </a:solidFill>
@@ -5016,7 +5019,7 @@
             </a:ln>
             <a:extLst>
               <a:ext uri="{91240B29-F687-4f45-9708-019B960494DF}">
-                <a14:hiddenLine xmlns="" xmlns:a14="http://schemas.microsoft.com/office/drawing/2010/main" w="9525">
+                <a14:hiddenLine xmlns:a14="http://schemas.microsoft.com/office/drawing/2010/main" xmlns="" w="9525">
                   <a:solidFill>
                     <a:srgbClr val="000000"/>
                   </a:solidFill>
@@ -5106,7 +5109,7 @@
             </a:ln>
             <a:extLst>
               <a:ext uri="{91240B29-F687-4f45-9708-019B960494DF}">
-                <a14:hiddenLine xmlns="" xmlns:a14="http://schemas.microsoft.com/office/drawing/2010/main" w="9525">
+                <a14:hiddenLine xmlns:a14="http://schemas.microsoft.com/office/drawing/2010/main" xmlns="" w="9525">
                   <a:solidFill>
                     <a:srgbClr val="000000"/>
                   </a:solidFill>
@@ -5168,7 +5171,7 @@
             </a:ln>
             <a:extLst>
               <a:ext uri="{91240B29-F687-4f45-9708-019B960494DF}">
-                <a14:hiddenLine xmlns="" xmlns:a14="http://schemas.microsoft.com/office/drawing/2010/main" w="9525">
+                <a14:hiddenLine xmlns:a14="http://schemas.microsoft.com/office/drawing/2010/main" xmlns="" w="9525">
                   <a:solidFill>
                     <a:srgbClr val="000000"/>
                   </a:solidFill>
@@ -5288,7 +5291,7 @@
             </a:ln>
             <a:extLst>
               <a:ext uri="{91240B29-F687-4f45-9708-019B960494DF}">
-                <a14:hiddenLine xmlns="" xmlns:a14="http://schemas.microsoft.com/office/drawing/2010/main" w="9525">
+                <a14:hiddenLine xmlns:a14="http://schemas.microsoft.com/office/drawing/2010/main" xmlns="" w="9525">
                   <a:solidFill>
                     <a:srgbClr val="000000"/>
                   </a:solidFill>
@@ -5356,7 +5359,7 @@
             </a:ln>
             <a:extLst>
               <a:ext uri="{91240B29-F687-4f45-9708-019B960494DF}">
-                <a14:hiddenLine xmlns="" xmlns:a14="http://schemas.microsoft.com/office/drawing/2010/main" w="9525">
+                <a14:hiddenLine xmlns:a14="http://schemas.microsoft.com/office/drawing/2010/main" xmlns="" w="9525">
                   <a:solidFill>
                     <a:srgbClr val="000000"/>
                   </a:solidFill>
@@ -5446,7 +5449,7 @@
             </a:ln>
             <a:extLst>
               <a:ext uri="{91240B29-F687-4f45-9708-019B960494DF}">
-                <a14:hiddenLine xmlns="" xmlns:a14="http://schemas.microsoft.com/office/drawing/2010/main" w="9525">
+                <a14:hiddenLine xmlns:a14="http://schemas.microsoft.com/office/drawing/2010/main" xmlns="" w="9525">
                   <a:solidFill>
                     <a:srgbClr val="000000"/>
                   </a:solidFill>
@@ -5586,7 +5589,7 @@
           <a:p>
             <a:fld id="{6D4C34AF-8B40-449D-B6D8-E89BDB7425C1}" type="datetime1">
               <a:rPr lang="en-US" smtClean="0"/>
-              <a:t>5/9/2015</a:t>
+              <a:t>5/10/2015</a:t>
             </a:fld>
             <a:endParaRPr lang="en-US" dirty="0"/>
           </a:p>
@@ -5848,7 +5851,7 @@
           <a:p>
             <a:fld id="{35FE612B-639F-466D-9D06-405B1955BB2D}" type="datetime1">
               <a:rPr lang="en-US" smtClean="0"/>
-              <a:t>5/9/2015</a:t>
+              <a:t>5/10/2015</a:t>
             </a:fld>
             <a:endParaRPr lang="en-US" dirty="0"/>
           </a:p>
@@ -6039,7 +6042,7 @@
           <a:p>
             <a:fld id="{3A5CEA6B-0855-4CA4-9D47-2BDDCC508169}" type="datetime1">
               <a:rPr lang="en-US" smtClean="0"/>
-              <a:t>5/9/2015</a:t>
+              <a:t>5/10/2015</a:t>
             </a:fld>
             <a:endParaRPr lang="en-US" dirty="0"/>
           </a:p>
@@ -6297,7 +6300,7 @@
           <a:p>
             <a:fld id="{33DB6AE9-4BCB-45ED-BC3B-6064B91BC127}" type="datetime1">
               <a:rPr lang="en-US" smtClean="0"/>
-              <a:t>5/9/2015</a:t>
+              <a:t>5/10/2015</a:t>
             </a:fld>
             <a:endParaRPr lang="en-US" dirty="0"/>
           </a:p>
@@ -6726,7 +6729,7 @@
           <a:p>
             <a:fld id="{518BB170-86D0-4059-9942-B29644B75E3E}" type="datetime1">
               <a:rPr lang="en-US" smtClean="0"/>
-              <a:t>5/9/2015</a:t>
+              <a:t>5/10/2015</a:t>
             </a:fld>
             <a:endParaRPr lang="en-US" dirty="0"/>
           </a:p>
@@ -7267,7 +7270,7 @@
           <a:p>
             <a:fld id="{0EE90A35-AAEA-439B-91BF-BB547B31E1B0}" type="datetime1">
               <a:rPr lang="en-US" smtClean="0"/>
-              <a:t>5/9/2015</a:t>
+              <a:t>5/10/2015</a:t>
             </a:fld>
             <a:endParaRPr lang="en-US" dirty="0"/>
           </a:p>
@@ -7982,7 +7985,7 @@
           <a:p>
             <a:fld id="{82C84819-2F57-4372-9542-DD2837546021}" type="datetime1">
               <a:rPr lang="en-US" smtClean="0"/>
-              <a:t>5/9/2015</a:t>
+              <a:t>5/10/2015</a:t>
             </a:fld>
             <a:endParaRPr lang="en-US" dirty="0"/>
           </a:p>
@@ -8147,7 +8150,7 @@
           <a:p>
             <a:fld id="{5B154E6C-7F32-46D5-A47A-27278982C20B}" type="datetime1">
               <a:rPr lang="en-US" smtClean="0"/>
-              <a:t>5/9/2015</a:t>
+              <a:t>5/10/2015</a:t>
             </a:fld>
             <a:endParaRPr lang="en-US" dirty="0"/>
           </a:p>
@@ -8322,7 +8325,7 @@
           <a:p>
             <a:fld id="{552BB747-5A63-42CE-B024-D2F39B07162E}" type="datetime1">
               <a:rPr lang="en-US" smtClean="0"/>
-              <a:t>5/9/2015</a:t>
+              <a:t>5/10/2015</a:t>
             </a:fld>
             <a:endParaRPr lang="en-US" dirty="0"/>
           </a:p>
@@ -8487,7 +8490,7 @@
           <a:p>
             <a:fld id="{AE4079F4-2BEA-4794-BD54-71F1F872D079}" type="datetime1">
               <a:rPr lang="en-US" smtClean="0"/>
-              <a:t>5/9/2015</a:t>
+              <a:t>5/10/2015</a:t>
             </a:fld>
             <a:endParaRPr lang="en-US" dirty="0"/>
           </a:p>
@@ -8732,7 +8735,7 @@
           <a:p>
             <a:fld id="{7863B0AC-0060-4FBC-A9C4-A7D9638CC704}" type="datetime1">
               <a:rPr lang="en-US" smtClean="0"/>
-              <a:t>5/9/2015</a:t>
+              <a:t>5/10/2015</a:t>
             </a:fld>
             <a:endParaRPr lang="en-US" dirty="0"/>
           </a:p>
@@ -8959,7 +8962,7 @@
           <a:p>
             <a:fld id="{293E1F8B-5232-4B17-A3F5-E6094C9EC9A2}" type="datetime1">
               <a:rPr lang="en-US" smtClean="0"/>
-              <a:t>5/9/2015</a:t>
+              <a:t>5/10/2015</a:t>
             </a:fld>
             <a:endParaRPr lang="en-US" dirty="0"/>
           </a:p>
@@ -9335,7 +9338,7 @@
           <a:p>
             <a:fld id="{048E5C3C-AA6E-4588-9506-F12EA8D61728}" type="datetime1">
               <a:rPr lang="en-US" smtClean="0"/>
-              <a:t>5/9/2015</a:t>
+              <a:t>5/10/2015</a:t>
             </a:fld>
             <a:endParaRPr lang="en-US" dirty="0"/>
           </a:p>
@@ -9448,7 +9451,7 @@
           <a:p>
             <a:fld id="{D3205C4F-4BB0-44FD-AE0E-07F23D2DF006}" type="datetime1">
               <a:rPr lang="en-US" smtClean="0"/>
-              <a:t>5/9/2015</a:t>
+              <a:t>5/10/2015</a:t>
             </a:fld>
             <a:endParaRPr lang="en-US" dirty="0"/>
           </a:p>
@@ -9538,7 +9541,7 @@
           <a:p>
             <a:fld id="{76A12A4D-2121-4238-A1B7-C22A5B5F326D}" type="datetime1">
               <a:rPr lang="en-US" smtClean="0"/>
-              <a:t>5/9/2015</a:t>
+              <a:t>5/10/2015</a:t>
             </a:fld>
             <a:endParaRPr lang="en-US" dirty="0"/>
           </a:p>
@@ -9782,7 +9785,7 @@
           <a:p>
             <a:fld id="{C1526EDA-0148-424B-AB64-452932D8E34E}" type="datetime1">
               <a:rPr lang="en-US" smtClean="0"/>
-              <a:t>5/9/2015</a:t>
+              <a:t>5/10/2015</a:t>
             </a:fld>
             <a:endParaRPr lang="en-US" dirty="0"/>
           </a:p>
@@ -10057,7 +10060,7 @@
           <a:p>
             <a:fld id="{4AC485A9-C4E9-4C78-93B1-C1614481F2AD}" type="datetime1">
               <a:rPr lang="en-US" smtClean="0"/>
-              <a:t>5/9/2015</a:t>
+              <a:t>5/10/2015</a:t>
             </a:fld>
             <a:endParaRPr lang="en-US" dirty="0"/>
           </a:p>
@@ -10175,7 +10178,7 @@
           <a:noFill/>
           <a:extLst>
             <a:ext uri="{909E8E84-426E-40dd-AFC4-6F175D3DCCD1}">
-              <a14:hiddenFill xmlns="" xmlns:a14="http://schemas.microsoft.com/office/drawing/2010/main">
+              <a14:hiddenFill xmlns:a14="http://schemas.microsoft.com/office/drawing/2010/main" xmlns="">
                 <a:solidFill>
                   <a:srgbClr val="FFFFFF"/>
                 </a:solidFill>
@@ -10249,7 +10252,7 @@
               </a:ln>
               <a:extLst>
                 <a:ext uri="{91240B29-F687-4f45-9708-019B960494DF}">
-                  <a14:hiddenLine xmlns="" xmlns:a14="http://schemas.microsoft.com/office/drawing/2010/main" w="9525">
+                  <a14:hiddenLine xmlns:a14="http://schemas.microsoft.com/office/drawing/2010/main" xmlns="" w="9525">
                     <a:solidFill>
                       <a:srgbClr val="000000"/>
                     </a:solidFill>
@@ -10339,7 +10342,7 @@
               </a:ln>
               <a:extLst>
                 <a:ext uri="{91240B29-F687-4f45-9708-019B960494DF}">
-                  <a14:hiddenLine xmlns="" xmlns:a14="http://schemas.microsoft.com/office/drawing/2010/main" w="9525">
+                  <a14:hiddenLine xmlns:a14="http://schemas.microsoft.com/office/drawing/2010/main" xmlns="" w="9525">
                     <a:solidFill>
                       <a:srgbClr val="000000"/>
                     </a:solidFill>
@@ -10429,7 +10432,7 @@
               </a:ln>
               <a:extLst>
                 <a:ext uri="{91240B29-F687-4f45-9708-019B960494DF}">
-                  <a14:hiddenLine xmlns="" xmlns:a14="http://schemas.microsoft.com/office/drawing/2010/main" w="9525">
+                  <a14:hiddenLine xmlns:a14="http://schemas.microsoft.com/office/drawing/2010/main" xmlns="" w="9525">
                     <a:solidFill>
                       <a:srgbClr val="000000"/>
                     </a:solidFill>
@@ -10491,7 +10494,7 @@
               </a:ln>
               <a:extLst>
                 <a:ext uri="{91240B29-F687-4f45-9708-019B960494DF}">
-                  <a14:hiddenLine xmlns="" xmlns:a14="http://schemas.microsoft.com/office/drawing/2010/main" w="9525">
+                  <a14:hiddenLine xmlns:a14="http://schemas.microsoft.com/office/drawing/2010/main" xmlns="" w="9525">
                     <a:solidFill>
                       <a:srgbClr val="000000"/>
                     </a:solidFill>
@@ -10581,7 +10584,7 @@
               </a:ln>
               <a:extLst>
                 <a:ext uri="{91240B29-F687-4f45-9708-019B960494DF}">
-                  <a14:hiddenLine xmlns="" xmlns:a14="http://schemas.microsoft.com/office/drawing/2010/main" w="9525">
+                  <a14:hiddenLine xmlns:a14="http://schemas.microsoft.com/office/drawing/2010/main" xmlns="" w="9525">
                     <a:solidFill>
                       <a:srgbClr val="000000"/>
                     </a:solidFill>
@@ -10643,7 +10646,7 @@
               </a:ln>
               <a:extLst>
                 <a:ext uri="{91240B29-F687-4f45-9708-019B960494DF}">
-                  <a14:hiddenLine xmlns="" xmlns:a14="http://schemas.microsoft.com/office/drawing/2010/main" w="9525">
+                  <a14:hiddenLine xmlns:a14="http://schemas.microsoft.com/office/drawing/2010/main" xmlns="" w="9525">
                     <a:solidFill>
                       <a:srgbClr val="000000"/>
                     </a:solidFill>
@@ -10705,7 +10708,7 @@
               </a:ln>
               <a:extLst>
                 <a:ext uri="{91240B29-F687-4f45-9708-019B960494DF}">
-                  <a14:hiddenLine xmlns="" xmlns:a14="http://schemas.microsoft.com/office/drawing/2010/main" w="9525">
+                  <a14:hiddenLine xmlns:a14="http://schemas.microsoft.com/office/drawing/2010/main" xmlns="" w="9525">
                     <a:solidFill>
                       <a:srgbClr val="000000"/>
                     </a:solidFill>
@@ -10795,7 +10798,7 @@
               </a:ln>
               <a:extLst>
                 <a:ext uri="{91240B29-F687-4f45-9708-019B960494DF}">
-                  <a14:hiddenLine xmlns="" xmlns:a14="http://schemas.microsoft.com/office/drawing/2010/main" w="9525">
+                  <a14:hiddenLine xmlns:a14="http://schemas.microsoft.com/office/drawing/2010/main" xmlns="" w="9525">
                     <a:solidFill>
                       <a:srgbClr val="000000"/>
                     </a:solidFill>
@@ -10885,7 +10888,7 @@
               </a:ln>
               <a:extLst>
                 <a:ext uri="{91240B29-F687-4f45-9708-019B960494DF}">
-                  <a14:hiddenLine xmlns="" xmlns:a14="http://schemas.microsoft.com/office/drawing/2010/main" w="9525">
+                  <a14:hiddenLine xmlns:a14="http://schemas.microsoft.com/office/drawing/2010/main" xmlns="" w="9525">
                     <a:solidFill>
                       <a:srgbClr val="000000"/>
                     </a:solidFill>
@@ -10947,7 +10950,7 @@
               </a:ln>
               <a:extLst>
                 <a:ext uri="{91240B29-F687-4f45-9708-019B960494DF}">
-                  <a14:hiddenLine xmlns="" xmlns:a14="http://schemas.microsoft.com/office/drawing/2010/main" w="9525">
+                  <a14:hiddenLine xmlns:a14="http://schemas.microsoft.com/office/drawing/2010/main" xmlns="" w="9525">
                     <a:solidFill>
                       <a:srgbClr val="000000"/>
                     </a:solidFill>
@@ -11057,7 +11060,7 @@
               </a:ln>
               <a:extLst>
                 <a:ext uri="{91240B29-F687-4f45-9708-019B960494DF}">
-                  <a14:hiddenLine xmlns="" xmlns:a14="http://schemas.microsoft.com/office/drawing/2010/main" w="9525">
+                  <a14:hiddenLine xmlns:a14="http://schemas.microsoft.com/office/drawing/2010/main" xmlns="" w="9525">
                     <a:solidFill>
                       <a:srgbClr val="000000"/>
                     </a:solidFill>
@@ -11141,7 +11144,7 @@
               </a:ln>
               <a:extLst>
                 <a:ext uri="{91240B29-F687-4f45-9708-019B960494DF}">
-                  <a14:hiddenLine xmlns="" xmlns:a14="http://schemas.microsoft.com/office/drawing/2010/main" w="9525">
+                  <a14:hiddenLine xmlns:a14="http://schemas.microsoft.com/office/drawing/2010/main" xmlns="" w="9525">
                     <a:solidFill>
                       <a:srgbClr val="000000"/>
                     </a:solidFill>
@@ -11203,7 +11206,7 @@
               </a:ln>
               <a:extLst>
                 <a:ext uri="{91240B29-F687-4f45-9708-019B960494DF}">
-                  <a14:hiddenLine xmlns="" xmlns:a14="http://schemas.microsoft.com/office/drawing/2010/main" w="9525">
+                  <a14:hiddenLine xmlns:a14="http://schemas.microsoft.com/office/drawing/2010/main" xmlns="" w="9525">
                     <a:solidFill>
                       <a:srgbClr val="000000"/>
                     </a:solidFill>
@@ -11265,7 +11268,7 @@
               </a:ln>
               <a:extLst>
                 <a:ext uri="{91240B29-F687-4f45-9708-019B960494DF}">
-                  <a14:hiddenLine xmlns="" xmlns:a14="http://schemas.microsoft.com/office/drawing/2010/main" w="9525">
+                  <a14:hiddenLine xmlns:a14="http://schemas.microsoft.com/office/drawing/2010/main" xmlns="" w="9525">
                     <a:solidFill>
                       <a:srgbClr val="000000"/>
                     </a:solidFill>
@@ -11355,7 +11358,7 @@
               </a:ln>
               <a:extLst>
                 <a:ext uri="{91240B29-F687-4f45-9708-019B960494DF}">
-                  <a14:hiddenLine xmlns="" xmlns:a14="http://schemas.microsoft.com/office/drawing/2010/main" w="9525">
+                  <a14:hiddenLine xmlns:a14="http://schemas.microsoft.com/office/drawing/2010/main" xmlns="" w="9525">
                     <a:solidFill>
                       <a:srgbClr val="000000"/>
                     </a:solidFill>
@@ -11389,7 +11392,7 @@
               </a:ln>
               <a:extLst>
                 <a:ext uri="{91240B29-F687-4f45-9708-019B960494DF}">
-                  <a14:hiddenLine xmlns="" xmlns:a14="http://schemas.microsoft.com/office/drawing/2010/main" w="9525">
+                  <a14:hiddenLine xmlns:a14="http://schemas.microsoft.com/office/drawing/2010/main" xmlns="" w="9525">
                     <a:solidFill>
                       <a:srgbClr val="000000"/>
                     </a:solidFill>
@@ -11454,7 +11457,7 @@
               </a:ln>
               <a:extLst>
                 <a:ext uri="{91240B29-F687-4f45-9708-019B960494DF}">
-                  <a14:hiddenLine xmlns="" xmlns:a14="http://schemas.microsoft.com/office/drawing/2010/main" w="9525">
+                  <a14:hiddenLine xmlns:a14="http://schemas.microsoft.com/office/drawing/2010/main" xmlns="" w="9525">
                     <a:solidFill>
                       <a:srgbClr val="000000"/>
                     </a:solidFill>
@@ -11544,7 +11547,7 @@
               </a:ln>
               <a:extLst>
                 <a:ext uri="{91240B29-F687-4f45-9708-019B960494DF}">
-                  <a14:hiddenLine xmlns="" xmlns:a14="http://schemas.microsoft.com/office/drawing/2010/main" w="9525">
+                  <a14:hiddenLine xmlns:a14="http://schemas.microsoft.com/office/drawing/2010/main" xmlns="" w="9525">
                     <a:solidFill>
                       <a:srgbClr val="000000"/>
                     </a:solidFill>
@@ -11606,7 +11609,7 @@
               </a:ln>
               <a:extLst>
                 <a:ext uri="{91240B29-F687-4f45-9708-019B960494DF}">
-                  <a14:hiddenLine xmlns="" xmlns:a14="http://schemas.microsoft.com/office/drawing/2010/main" w="9525">
+                  <a14:hiddenLine xmlns:a14="http://schemas.microsoft.com/office/drawing/2010/main" xmlns="" w="9525">
                     <a:solidFill>
                       <a:srgbClr val="000000"/>
                     </a:solidFill>
@@ -11696,7 +11699,7 @@
               </a:ln>
               <a:extLst>
                 <a:ext uri="{91240B29-F687-4f45-9708-019B960494DF}">
-                  <a14:hiddenLine xmlns="" xmlns:a14="http://schemas.microsoft.com/office/drawing/2010/main" w="9525">
+                  <a14:hiddenLine xmlns:a14="http://schemas.microsoft.com/office/drawing/2010/main" xmlns="" w="9525">
                     <a:solidFill>
                       <a:srgbClr val="000000"/>
                     </a:solidFill>
@@ -11761,7 +11764,7 @@
               </a:ln>
               <a:extLst>
                 <a:ext uri="{91240B29-F687-4f45-9708-019B960494DF}">
-                  <a14:hiddenLine xmlns="" xmlns:a14="http://schemas.microsoft.com/office/drawing/2010/main" w="9525">
+                  <a14:hiddenLine xmlns:a14="http://schemas.microsoft.com/office/drawing/2010/main" xmlns="" w="9525">
                     <a:solidFill>
                       <a:srgbClr val="000000"/>
                     </a:solidFill>
@@ -11823,7 +11826,7 @@
               </a:ln>
               <a:extLst>
                 <a:ext uri="{91240B29-F687-4f45-9708-019B960494DF}">
-                  <a14:hiddenLine xmlns="" xmlns:a14="http://schemas.microsoft.com/office/drawing/2010/main" w="9525">
+                  <a14:hiddenLine xmlns:a14="http://schemas.microsoft.com/office/drawing/2010/main" xmlns="" w="9525">
                     <a:solidFill>
                       <a:srgbClr val="000000"/>
                     </a:solidFill>
@@ -11913,7 +11916,7 @@
               </a:ln>
               <a:extLst>
                 <a:ext uri="{91240B29-F687-4f45-9708-019B960494DF}">
-                  <a14:hiddenLine xmlns="" xmlns:a14="http://schemas.microsoft.com/office/drawing/2010/main" w="9525">
+                  <a14:hiddenLine xmlns:a14="http://schemas.microsoft.com/office/drawing/2010/main" xmlns="" w="9525">
                     <a:solidFill>
                       <a:srgbClr val="000000"/>
                     </a:solidFill>
@@ -12003,7 +12006,7 @@
               </a:ln>
               <a:extLst>
                 <a:ext uri="{91240B29-F687-4f45-9708-019B960494DF}">
-                  <a14:hiddenLine xmlns="" xmlns:a14="http://schemas.microsoft.com/office/drawing/2010/main" w="9525">
+                  <a14:hiddenLine xmlns:a14="http://schemas.microsoft.com/office/drawing/2010/main" xmlns="" w="9525">
                     <a:solidFill>
                       <a:srgbClr val="000000"/>
                     </a:solidFill>
@@ -12068,7 +12071,7 @@
               </a:ln>
               <a:extLst>
                 <a:ext uri="{91240B29-F687-4f45-9708-019B960494DF}">
-                  <a14:hiddenLine xmlns="" xmlns:a14="http://schemas.microsoft.com/office/drawing/2010/main" w="9525">
+                  <a14:hiddenLine xmlns:a14="http://schemas.microsoft.com/office/drawing/2010/main" xmlns="" w="9525">
                     <a:solidFill>
                       <a:srgbClr val="000000"/>
                     </a:solidFill>
@@ -12188,7 +12191,7 @@
               </a:ln>
               <a:extLst>
                 <a:ext uri="{91240B29-F687-4f45-9708-019B960494DF}">
-                  <a14:hiddenLine xmlns="" xmlns:a14="http://schemas.microsoft.com/office/drawing/2010/main" w="9525">
+                  <a14:hiddenLine xmlns:a14="http://schemas.microsoft.com/office/drawing/2010/main" xmlns="" w="9525">
                     <a:solidFill>
                       <a:srgbClr val="000000"/>
                     </a:solidFill>
@@ -12269,7 +12272,7 @@
               </a:ln>
               <a:extLst>
                 <a:ext uri="{91240B29-F687-4f45-9708-019B960494DF}">
-                  <a14:hiddenLine xmlns="" xmlns:a14="http://schemas.microsoft.com/office/drawing/2010/main" w="9525">
+                  <a14:hiddenLine xmlns:a14="http://schemas.microsoft.com/office/drawing/2010/main" xmlns="" w="9525">
                     <a:solidFill>
                       <a:srgbClr val="000000"/>
                     </a:solidFill>
@@ -12384,7 +12387,7 @@
               </a:ln>
               <a:extLst>
                 <a:ext uri="{91240B29-F687-4f45-9708-019B960494DF}">
-                  <a14:hiddenLine xmlns="" xmlns:a14="http://schemas.microsoft.com/office/drawing/2010/main" w="9525">
+                  <a14:hiddenLine xmlns:a14="http://schemas.microsoft.com/office/drawing/2010/main" xmlns="" w="9525">
                     <a:solidFill>
                       <a:srgbClr val="000000"/>
                     </a:solidFill>
@@ -12474,7 +12477,7 @@
               </a:ln>
               <a:extLst>
                 <a:ext uri="{91240B29-F687-4f45-9708-019B960494DF}">
-                  <a14:hiddenLine xmlns="" xmlns:a14="http://schemas.microsoft.com/office/drawing/2010/main" w="9525">
+                  <a14:hiddenLine xmlns:a14="http://schemas.microsoft.com/office/drawing/2010/main" xmlns="" w="9525">
                     <a:solidFill>
                       <a:srgbClr val="000000"/>
                     </a:solidFill>
@@ -12539,7 +12542,7 @@
               </a:ln>
               <a:extLst>
                 <a:ext uri="{91240B29-F687-4f45-9708-019B960494DF}">
-                  <a14:hiddenLine xmlns="" xmlns:a14="http://schemas.microsoft.com/office/drawing/2010/main" w="9525">
+                  <a14:hiddenLine xmlns:a14="http://schemas.microsoft.com/office/drawing/2010/main" xmlns="" w="9525">
                     <a:solidFill>
                       <a:srgbClr val="000000"/>
                     </a:solidFill>
@@ -12629,7 +12632,7 @@
               </a:ln>
               <a:extLst>
                 <a:ext uri="{91240B29-F687-4f45-9708-019B960494DF}">
-                  <a14:hiddenLine xmlns="" xmlns:a14="http://schemas.microsoft.com/office/drawing/2010/main" w="9525">
+                  <a14:hiddenLine xmlns:a14="http://schemas.microsoft.com/office/drawing/2010/main" xmlns="" w="9525">
                     <a:solidFill>
                       <a:srgbClr val="000000"/>
                     </a:solidFill>
@@ -12697,7 +12700,7 @@
               </a:ln>
               <a:extLst>
                 <a:ext uri="{91240B29-F687-4f45-9708-019B960494DF}">
-                  <a14:hiddenLine xmlns="" xmlns:a14="http://schemas.microsoft.com/office/drawing/2010/main" w="9525">
+                  <a14:hiddenLine xmlns:a14="http://schemas.microsoft.com/office/drawing/2010/main" xmlns="" w="9525">
                     <a:solidFill>
                       <a:srgbClr val="000000"/>
                     </a:solidFill>
@@ -12787,7 +12790,7 @@
               </a:ln>
               <a:extLst>
                 <a:ext uri="{91240B29-F687-4f45-9708-019B960494DF}">
-                  <a14:hiddenLine xmlns="" xmlns:a14="http://schemas.microsoft.com/office/drawing/2010/main" w="9525">
+                  <a14:hiddenLine xmlns:a14="http://schemas.microsoft.com/office/drawing/2010/main" xmlns="" w="9525">
                     <a:solidFill>
                       <a:srgbClr val="000000"/>
                     </a:solidFill>
@@ -12855,7 +12858,7 @@
               </a:ln>
               <a:extLst>
                 <a:ext uri="{91240B29-F687-4f45-9708-019B960494DF}">
-                  <a14:hiddenLine xmlns="" xmlns:a14="http://schemas.microsoft.com/office/drawing/2010/main" w="9525">
+                  <a14:hiddenLine xmlns:a14="http://schemas.microsoft.com/office/drawing/2010/main" xmlns="" w="9525">
                     <a:solidFill>
                       <a:srgbClr val="000000"/>
                     </a:solidFill>
@@ -12945,7 +12948,7 @@
               </a:ln>
               <a:extLst>
                 <a:ext uri="{91240B29-F687-4f45-9708-019B960494DF}">
-                  <a14:hiddenLine xmlns="" xmlns:a14="http://schemas.microsoft.com/office/drawing/2010/main" w="9525">
+                  <a14:hiddenLine xmlns:a14="http://schemas.microsoft.com/office/drawing/2010/main" xmlns="" w="9525">
                     <a:solidFill>
                       <a:srgbClr val="000000"/>
                     </a:solidFill>
@@ -12979,7 +12982,7 @@
               </a:ln>
               <a:extLst>
                 <a:ext uri="{91240B29-F687-4f45-9708-019B960494DF}">
-                  <a14:hiddenLine xmlns="" xmlns:a14="http://schemas.microsoft.com/office/drawing/2010/main" w="9525">
+                  <a14:hiddenLine xmlns:a14="http://schemas.microsoft.com/office/drawing/2010/main" xmlns="" w="9525">
                     <a:solidFill>
                       <a:srgbClr val="000000"/>
                     </a:solidFill>
@@ -13119,7 +13122,7 @@
           <a:p>
             <a:fld id="{6A05E64A-4F99-43A0-91F2-7A20BD946D18}" type="datetime1">
               <a:rPr lang="en-US" smtClean="0"/>
-              <a:t>5/9/2015</a:t>
+              <a:t>5/10/2015</a:t>
             </a:fld>
             <a:endParaRPr lang="en-US" dirty="0"/>
           </a:p>
@@ -13799,11 +13802,7 @@
           <a:p>
             <a:r>
               <a:rPr lang="fr-FR" sz="2800" dirty="0" smtClean="0"/>
-              <a:t>Fonctionnalités </a:t>
-            </a:r>
-            <a:r>
-              <a:rPr lang="fr-FR" sz="2800" dirty="0" smtClean="0"/>
-              <a:t>implantées</a:t>
+              <a:t>Fonctionnalités implantées</a:t>
             </a:r>
           </a:p>
           <a:p>
@@ -13817,14 +13816,12 @@
               <a:rPr lang="fr-FR" sz="2800" dirty="0" smtClean="0"/>
               <a:t>Architecture</a:t>
             </a:r>
-            <a:endParaRPr lang="fr-FR" sz="2800" dirty="0" smtClean="0"/>
           </a:p>
           <a:p>
             <a:r>
               <a:rPr lang="fr-FR" sz="2800" dirty="0" smtClean="0"/>
               <a:t>Démonstration</a:t>
             </a:r>
-            <a:endParaRPr lang="fr-FR" sz="2800" dirty="0" smtClean="0"/>
           </a:p>
           <a:p>
             <a:r>
@@ -14702,48 +14699,24 @@
           <a:bodyPr/>
           <a:lstStyle/>
           <a:p>
-            <a:pPr marL="0" indent="0">
-              <a:buNone/>
-            </a:pPr>
             <a:r>
               <a:rPr lang="fr-FR" dirty="0" smtClean="0"/>
-              <a:t>Serveur </a:t>
-            </a:r>
-            <a:r>
-              <a:rPr lang="fr-FR" dirty="0" err="1" smtClean="0"/>
-              <a:t>Jetty</a:t>
+              <a:t>Projet terminé</a:t>
+            </a:r>
+            <a:endParaRPr lang="fr-FR" dirty="0"/>
+          </a:p>
+          <a:p>
+            <a:r>
+              <a:rPr lang="fr-FR" dirty="0" smtClean="0"/>
+              <a:t>Apprentissage de nouvelles technologies</a:t>
+            </a:r>
+          </a:p>
+          <a:p>
+            <a:r>
+              <a:rPr lang="fr-FR" dirty="0" smtClean="0"/>
+              <a:t>Gestion de projet</a:t>
             </a:r>
             <a:endParaRPr lang="fr-FR" dirty="0" smtClean="0"/>
-          </a:p>
-          <a:p>
-            <a:pPr marL="0" indent="0">
-              <a:buNone/>
-            </a:pPr>
-            <a:r>
-              <a:rPr lang="fr-FR" dirty="0"/>
-              <a:t>API </a:t>
-            </a:r>
-            <a:r>
-              <a:rPr lang="fr-FR" dirty="0" smtClean="0"/>
-              <a:t>REST</a:t>
-            </a:r>
-            <a:r>
-              <a:rPr lang="fr-FR" dirty="0"/>
-              <a:t> </a:t>
-            </a:r>
-            <a:r>
-              <a:rPr lang="fr-FR" dirty="0" smtClean="0"/>
-              <a:t>(avec Jersey)</a:t>
-            </a:r>
-          </a:p>
-          <a:p>
-            <a:pPr marL="0" indent="0">
-              <a:buNone/>
-            </a:pPr>
-            <a:r>
-              <a:rPr lang="fr-FR" dirty="0" smtClean="0"/>
-              <a:t>Python</a:t>
-            </a:r>
           </a:p>
         </p:txBody>
       </p:sp>

</xml_diff>

<commit_message>
Nouvelle version du diaporama...
</commit_message>
<xml_diff>
--- a/Documents/diaporama_soutenance.pptx
+++ b/Documents/diaporama_soutenance.pptx
@@ -116,6 +116,11 @@
       </a:defRPr>
     </a:lvl9pPr>
   </p:defaultTextStyle>
+  <p:extLst>
+    <p:ext uri="{EFAFB233-063F-42B5-8137-9DF3F51BA10A}">
+      <p15:sldGuideLst xmlns:p15="http://schemas.microsoft.com/office/powerpoint/2012/main"/>
+    </p:ext>
+  </p:extLst>
 </p:presentation>
 </file>
 
@@ -19033,12 +19038,12 @@
               </a:lnSpc>
             </a:pPr>
             <a:r>
-              <a:rPr lang="en-US" sz="4400" dirty="0">
+              <a:rPr lang="en-US" sz="4800" dirty="0">
                 <a:latin typeface="Tw Cen MT"/>
               </a:rPr>
               <a:t>Plan</a:t>
             </a:r>
-            <a:endParaRPr dirty="0"/>
+            <a:endParaRPr sz="4800" dirty="0"/>
           </a:p>
         </p:txBody>
       </p:sp>
@@ -19070,36 +19075,36 @@
               <a:buChar char="•"/>
             </a:pPr>
             <a:r>
-              <a:rPr lang="en-US" sz="2800" dirty="0" smtClean="0">
+              <a:rPr lang="en-US" sz="3600" dirty="0" smtClean="0">
                 <a:latin typeface="Tw Cen MT"/>
               </a:rPr>
               <a:t>  </a:t>
             </a:r>
             <a:r>
-              <a:rPr lang="en-US" sz="2800" dirty="0" err="1" smtClean="0">
+              <a:rPr lang="en-US" sz="3600" dirty="0" err="1" smtClean="0">
                 <a:latin typeface="Tw Cen MT"/>
               </a:rPr>
               <a:t>Présentation</a:t>
             </a:r>
             <a:r>
-              <a:rPr lang="en-US" sz="2800" dirty="0" smtClean="0">
+              <a:rPr lang="en-US" sz="3600" dirty="0" smtClean="0">
                 <a:latin typeface="Tw Cen MT"/>
               </a:rPr>
               <a:t> </a:t>
             </a:r>
             <a:r>
-              <a:rPr lang="en-US" sz="2800" dirty="0">
+              <a:rPr lang="en-US" sz="3600" dirty="0">
                 <a:latin typeface="Tw Cen MT"/>
               </a:rPr>
               <a:t>du </a:t>
             </a:r>
             <a:r>
-              <a:rPr lang="en-US" sz="2800" dirty="0" err="1">
+              <a:rPr lang="en-US" sz="3600" dirty="0" err="1">
                 <a:latin typeface="Tw Cen MT"/>
               </a:rPr>
               <a:t>projet</a:t>
             </a:r>
-            <a:endParaRPr dirty="0"/>
+            <a:endParaRPr sz="3600" dirty="0"/>
           </a:p>
           <a:p>
             <a:pPr>
@@ -19111,36 +19116,36 @@
               <a:buChar char="•"/>
             </a:pPr>
             <a:r>
-              <a:rPr lang="en-US" sz="2800" dirty="0" smtClean="0">
+              <a:rPr lang="en-US" sz="3600" dirty="0" smtClean="0">
                 <a:latin typeface="Tw Cen MT"/>
               </a:rPr>
               <a:t>  </a:t>
             </a:r>
             <a:r>
-              <a:rPr lang="en-US" sz="2800" dirty="0" err="1" smtClean="0">
+              <a:rPr lang="en-US" sz="3600" dirty="0" err="1" smtClean="0">
                 <a:latin typeface="Tw Cen MT"/>
               </a:rPr>
               <a:t>Répartition</a:t>
             </a:r>
             <a:r>
-              <a:rPr lang="en-US" sz="2800" dirty="0" smtClean="0">
+              <a:rPr lang="en-US" sz="3600" dirty="0" smtClean="0">
                 <a:latin typeface="Tw Cen MT"/>
               </a:rPr>
               <a:t> </a:t>
             </a:r>
             <a:r>
-              <a:rPr lang="en-US" sz="2800" dirty="0">
+              <a:rPr lang="en-US" sz="3600" dirty="0">
                 <a:latin typeface="Tw Cen MT"/>
               </a:rPr>
               <a:t>des </a:t>
             </a:r>
             <a:r>
-              <a:rPr lang="en-US" sz="2800" dirty="0" err="1">
+              <a:rPr lang="en-US" sz="3600" dirty="0" err="1">
                 <a:latin typeface="Tw Cen MT"/>
               </a:rPr>
               <a:t>tâches</a:t>
             </a:r>
-            <a:endParaRPr dirty="0"/>
+            <a:endParaRPr sz="3600" dirty="0"/>
           </a:p>
           <a:p>
             <a:pPr>
@@ -19152,30 +19157,30 @@
               <a:buChar char="•"/>
             </a:pPr>
             <a:r>
-              <a:rPr lang="en-US" sz="2800" dirty="0" smtClean="0">
+              <a:rPr lang="en-US" sz="3600" dirty="0" smtClean="0">
                 <a:latin typeface="Tw Cen MT"/>
               </a:rPr>
               <a:t>  </a:t>
             </a:r>
             <a:r>
-              <a:rPr lang="en-US" sz="2800" dirty="0" err="1" smtClean="0">
+              <a:rPr lang="en-US" sz="3600" dirty="0" err="1" smtClean="0">
                 <a:latin typeface="Tw Cen MT"/>
               </a:rPr>
               <a:t>Fonctionnalités</a:t>
             </a:r>
             <a:r>
-              <a:rPr lang="en-US" sz="2800" dirty="0" smtClean="0">
+              <a:rPr lang="en-US" sz="3600" dirty="0" smtClean="0">
                 <a:latin typeface="Tw Cen MT"/>
               </a:rPr>
               <a:t> </a:t>
             </a:r>
             <a:r>
-              <a:rPr lang="en-US" sz="2800" dirty="0" err="1">
+              <a:rPr lang="en-US" sz="3600" dirty="0" err="1">
                 <a:latin typeface="Tw Cen MT"/>
               </a:rPr>
               <a:t>implantées</a:t>
             </a:r>
-            <a:endParaRPr dirty="0"/>
+            <a:endParaRPr sz="3600" dirty="0"/>
           </a:p>
           <a:p>
             <a:pPr>
@@ -19187,30 +19192,30 @@
               <a:buChar char="•"/>
             </a:pPr>
             <a:r>
-              <a:rPr lang="en-US" sz="2800" dirty="0" smtClean="0">
+              <a:rPr lang="en-US" sz="3600" dirty="0" smtClean="0">
                 <a:latin typeface="Tw Cen MT"/>
               </a:rPr>
               <a:t>  </a:t>
             </a:r>
             <a:r>
-              <a:rPr lang="en-US" sz="2800" dirty="0" err="1" smtClean="0">
+              <a:rPr lang="en-US" sz="3600" dirty="0" err="1" smtClean="0">
                 <a:latin typeface="Tw Cen MT"/>
               </a:rPr>
               <a:t>Problèmes</a:t>
             </a:r>
             <a:r>
-              <a:rPr lang="en-US" sz="2800" dirty="0" smtClean="0">
+              <a:rPr lang="en-US" sz="3600" dirty="0" smtClean="0">
                 <a:latin typeface="Tw Cen MT"/>
               </a:rPr>
               <a:t> </a:t>
             </a:r>
             <a:r>
-              <a:rPr lang="en-US" sz="2800" dirty="0" err="1">
+              <a:rPr lang="en-US" sz="3600" dirty="0" err="1">
                 <a:latin typeface="Tw Cen MT"/>
               </a:rPr>
               <a:t>rencontrés</a:t>
             </a:r>
-            <a:endParaRPr dirty="0"/>
+            <a:endParaRPr sz="3600" dirty="0"/>
           </a:p>
           <a:p>
             <a:pPr>
@@ -19222,12 +19227,12 @@
               <a:buChar char="•"/>
             </a:pPr>
             <a:r>
-              <a:rPr lang="en-US" sz="2800" dirty="0" smtClean="0">
+              <a:rPr lang="en-US" sz="3600" dirty="0" smtClean="0">
                 <a:latin typeface="Tw Cen MT"/>
               </a:rPr>
               <a:t>  Architecture</a:t>
             </a:r>
-            <a:endParaRPr dirty="0"/>
+            <a:endParaRPr sz="3600" dirty="0"/>
           </a:p>
           <a:p>
             <a:pPr>
@@ -19239,18 +19244,18 @@
               <a:buChar char="•"/>
             </a:pPr>
             <a:r>
-              <a:rPr lang="en-US" sz="2800" dirty="0" smtClean="0">
+              <a:rPr lang="en-US" sz="3600" dirty="0" smtClean="0">
                 <a:latin typeface="Tw Cen MT"/>
               </a:rPr>
               <a:t>  </a:t>
             </a:r>
             <a:r>
-              <a:rPr lang="en-US" sz="2800" dirty="0" err="1" smtClean="0">
+              <a:rPr lang="en-US" sz="3600" dirty="0" err="1" smtClean="0">
                 <a:latin typeface="Tw Cen MT"/>
               </a:rPr>
               <a:t>Démonstration</a:t>
             </a:r>
-            <a:endParaRPr dirty="0"/>
+            <a:endParaRPr sz="3600" dirty="0"/>
           </a:p>
           <a:p>
             <a:pPr>
@@ -19262,12 +19267,12 @@
               <a:buChar char="•"/>
             </a:pPr>
             <a:r>
-              <a:rPr lang="en-US" sz="2800" dirty="0" smtClean="0">
+              <a:rPr lang="en-US" sz="3600" dirty="0" smtClean="0">
                 <a:latin typeface="Tw Cen MT"/>
               </a:rPr>
               <a:t>  Conclusion</a:t>
             </a:r>
-            <a:endParaRPr dirty="0"/>
+            <a:endParaRPr sz="3600" dirty="0"/>
           </a:p>
         </p:txBody>
       </p:sp>
@@ -19368,7 +19373,7 @@
         </p:nvSpPr>
         <p:spPr>
           <a:xfrm>
-            <a:off x="1141560" y="618480"/>
+            <a:off x="1220582" y="-281823"/>
             <a:ext cx="9905760" cy="1478160"/>
           </a:xfrm>
           <a:prstGeom prst="rect">
@@ -19402,7 +19407,7 @@
               </a:rPr>
               <a:t>projet</a:t>
             </a:r>
-            <a:endParaRPr dirty="0"/>
+            <a:endParaRPr sz="3600" dirty="0"/>
           </a:p>
         </p:txBody>
       </p:sp>
@@ -19414,7 +19419,7 @@
         </p:nvSpPr>
         <p:spPr>
           <a:xfrm>
-            <a:off x="1141560" y="1872000"/>
+            <a:off x="1220582" y="1099820"/>
             <a:ext cx="9658440" cy="1944000"/>
           </a:xfrm>
           <a:prstGeom prst="rect">
@@ -19434,36 +19439,36 @@
               <a:buChar char="•"/>
             </a:pPr>
             <a:r>
-              <a:rPr lang="en-US" sz="2400" dirty="0" smtClean="0">
+              <a:rPr lang="en-US" sz="2800" dirty="0" smtClean="0">
                 <a:latin typeface="Tw Cen MT"/>
               </a:rPr>
               <a:t> Robot </a:t>
             </a:r>
             <a:r>
-              <a:rPr lang="en-US" sz="2400" dirty="0" err="1">
+              <a:rPr lang="en-US" sz="2800" dirty="0" err="1">
                 <a:latin typeface="Tw Cen MT"/>
               </a:rPr>
               <a:t>piloté</a:t>
             </a:r>
             <a:r>
-              <a:rPr lang="en-US" sz="2400" dirty="0">
+              <a:rPr lang="en-US" sz="2800" dirty="0">
                 <a:latin typeface="Tw Cen MT"/>
               </a:rPr>
               <a:t> à distance (hotspot </a:t>
             </a:r>
             <a:r>
-              <a:rPr lang="en-US" sz="2400" dirty="0" err="1">
+              <a:rPr lang="en-US" sz="2800" dirty="0" err="1">
                 <a:latin typeface="Tw Cen MT"/>
               </a:rPr>
               <a:t>wifi+serveur</a:t>
             </a:r>
             <a:r>
-              <a:rPr lang="en-US" sz="2400" dirty="0">
+              <a:rPr lang="en-US" sz="2800" dirty="0">
                 <a:latin typeface="Tw Cen MT"/>
               </a:rPr>
               <a:t> Jetty)</a:t>
             </a:r>
-            <a:endParaRPr dirty="0"/>
+            <a:endParaRPr sz="2800" dirty="0"/>
           </a:p>
           <a:p>
             <a:pPr>
@@ -19475,66 +19480,66 @@
               <a:buChar char="•"/>
             </a:pPr>
             <a:r>
-              <a:rPr lang="en-US" sz="2400" dirty="0" smtClean="0">
+              <a:rPr lang="en-US" sz="2800" dirty="0" smtClean="0">
                 <a:latin typeface="Tw Cen MT"/>
               </a:rPr>
               <a:t> Raspberry </a:t>
             </a:r>
             <a:r>
-              <a:rPr lang="en-US" sz="2400" dirty="0">
+              <a:rPr lang="en-US" sz="2800" dirty="0">
                 <a:latin typeface="Tw Cen MT"/>
               </a:rPr>
               <a:t>pi (</a:t>
             </a:r>
             <a:r>
-              <a:rPr lang="en-US" sz="2400" dirty="0" err="1">
+              <a:rPr lang="en-US" sz="2800" dirty="0" err="1">
                 <a:latin typeface="Tw Cen MT"/>
               </a:rPr>
               <a:t>décrire</a:t>
             </a:r>
             <a:r>
-              <a:rPr lang="en-US" sz="2400" dirty="0">
+              <a:rPr lang="en-US" sz="2800" dirty="0">
                 <a:latin typeface="Tw Cen MT"/>
               </a:rPr>
               <a:t> </a:t>
             </a:r>
             <a:r>
-              <a:rPr lang="en-US" sz="2400" dirty="0" err="1">
+              <a:rPr lang="en-US" sz="2800" dirty="0" err="1">
                 <a:latin typeface="Tw Cen MT"/>
               </a:rPr>
               <a:t>brièvement</a:t>
             </a:r>
             <a:r>
-              <a:rPr lang="en-US" sz="2400" dirty="0">
+              <a:rPr lang="en-US" sz="2800" dirty="0">
                 <a:latin typeface="Tw Cen MT"/>
               </a:rPr>
               <a:t> la distribution </a:t>
             </a:r>
             <a:r>
-              <a:rPr lang="en-US" sz="2400" dirty="0" err="1">
+              <a:rPr lang="en-US" sz="2800" dirty="0" err="1">
                 <a:latin typeface="Tw Cen MT"/>
               </a:rPr>
               <a:t>installée</a:t>
             </a:r>
             <a:r>
-              <a:rPr lang="en-US" sz="2400" dirty="0">
+              <a:rPr lang="en-US" sz="2800" dirty="0">
                 <a:latin typeface="Tw Cen MT"/>
               </a:rPr>
               <a:t> et </a:t>
             </a:r>
             <a:r>
-              <a:rPr lang="en-US" sz="2400" dirty="0" err="1">
+              <a:rPr lang="en-US" sz="2800" dirty="0" err="1">
                 <a:latin typeface="Tw Cen MT"/>
               </a:rPr>
               <a:t>ses</a:t>
             </a:r>
             <a:r>
-              <a:rPr lang="en-US" sz="2400" dirty="0">
+              <a:rPr lang="en-US" sz="2800" dirty="0">
                 <a:latin typeface="Tw Cen MT"/>
               </a:rPr>
               <a:t> limitations techniques)</a:t>
             </a:r>
-            <a:endParaRPr dirty="0"/>
+            <a:endParaRPr sz="2800" dirty="0"/>
           </a:p>
           <a:p>
             <a:pPr>
@@ -19546,109 +19551,96 @@
               <a:buChar char="•"/>
             </a:pPr>
             <a:r>
-              <a:rPr lang="en-US" sz="2400" dirty="0" smtClean="0">
+              <a:rPr lang="en-US" sz="2800" dirty="0" smtClean="0">
                 <a:latin typeface="Tw Cen MT"/>
               </a:rPr>
               <a:t> Carte </a:t>
             </a:r>
             <a:r>
-              <a:rPr lang="en-US" sz="2400" dirty="0" err="1">
+              <a:rPr lang="en-US" sz="2800" dirty="0" err="1">
                 <a:latin typeface="Tw Cen MT"/>
               </a:rPr>
               <a:t>Gopigo</a:t>
             </a:r>
             <a:r>
-              <a:rPr lang="en-US" sz="2400" dirty="0">
+              <a:rPr lang="en-US" sz="2800" dirty="0">
                 <a:latin typeface="Tw Cen MT"/>
               </a:rPr>
               <a:t> (</a:t>
             </a:r>
             <a:r>
-              <a:rPr lang="en-US" sz="2400" dirty="0" err="1">
+              <a:rPr lang="en-US" sz="2800" dirty="0" err="1">
                 <a:latin typeface="Tw Cen MT"/>
               </a:rPr>
               <a:t>décrire</a:t>
             </a:r>
             <a:r>
-              <a:rPr lang="en-US" sz="2400" dirty="0">
+              <a:rPr lang="en-US" sz="2800" dirty="0">
                 <a:latin typeface="Tw Cen MT"/>
               </a:rPr>
               <a:t> les </a:t>
             </a:r>
             <a:r>
-              <a:rPr lang="en-US" sz="2400" dirty="0" err="1">
+              <a:rPr lang="en-US" sz="2800" dirty="0" err="1">
                 <a:latin typeface="Tw Cen MT"/>
               </a:rPr>
               <a:t>composants</a:t>
             </a:r>
             <a:r>
-              <a:rPr lang="en-US" sz="2400" dirty="0">
+              <a:rPr lang="en-US" sz="2800" dirty="0">
                 <a:latin typeface="Tw Cen MT"/>
               </a:rPr>
               <a:t> </a:t>
             </a:r>
             <a:r>
-              <a:rPr lang="en-US" sz="2400" dirty="0" err="1">
+              <a:rPr lang="en-US" sz="2800" dirty="0" err="1">
                 <a:latin typeface="Tw Cen MT"/>
               </a:rPr>
               <a:t>greffés</a:t>
             </a:r>
             <a:r>
-              <a:rPr lang="en-US" sz="2400" dirty="0">
+              <a:rPr lang="en-US" sz="2800" dirty="0">
                 <a:latin typeface="Tw Cen MT"/>
               </a:rPr>
               <a:t> </a:t>
             </a:r>
             <a:r>
-              <a:rPr lang="en-US" sz="2400" dirty="0" err="1">
+              <a:rPr lang="en-US" sz="2800" dirty="0" err="1">
                 <a:latin typeface="Tw Cen MT"/>
               </a:rPr>
               <a:t>sur</a:t>
             </a:r>
             <a:r>
-              <a:rPr lang="en-US" sz="2400" dirty="0">
+              <a:rPr lang="en-US" sz="2800" dirty="0">
                 <a:latin typeface="Tw Cen MT"/>
               </a:rPr>
               <a:t> la carte : </a:t>
             </a:r>
             <a:r>
-              <a:rPr lang="en-US" sz="2400" dirty="0" err="1">
+              <a:rPr lang="en-US" sz="2800" dirty="0" err="1">
                 <a:latin typeface="Tw Cen MT"/>
               </a:rPr>
               <a:t>moteurs</a:t>
             </a:r>
             <a:r>
-              <a:rPr lang="en-US" sz="2400" dirty="0">
+              <a:rPr lang="en-US" sz="2800" dirty="0">
                 <a:latin typeface="Tw Cen MT"/>
               </a:rPr>
               <a:t>, </a:t>
             </a:r>
             <a:r>
-              <a:rPr lang="en-US" sz="2400" dirty="0" err="1">
+              <a:rPr lang="en-US" sz="2800" dirty="0" err="1">
                 <a:latin typeface="Tw Cen MT"/>
               </a:rPr>
               <a:t>capteurs</a:t>
             </a:r>
             <a:r>
-              <a:rPr lang="en-US" sz="2400" dirty="0">
-                <a:latin typeface="Tw Cen MT"/>
-              </a:rPr>
-              <a:t> </a:t>
-            </a:r>
-            <a:r>
-              <a:rPr lang="en-US" sz="2400" dirty="0">
-                <a:solidFill>
-                  <a:schemeClr val="bg1"/>
-                </a:solidFill>
-                <a:latin typeface="Tw Cen MT"/>
-              </a:rPr>
-              <a:t>etc...)</a:t>
-            </a:r>
-            <a:endParaRPr dirty="0">
-              <a:solidFill>
-                <a:schemeClr val="bg1"/>
-              </a:solidFill>
-            </a:endParaRPr>
+              <a:rPr lang="en-US" sz="2800" dirty="0">
+                <a:latin typeface="Tw Cen MT"/>
+              </a:rPr>
+              <a:t> etc...)</a:t>
+            </a:r>
+            <a:endParaRPr sz="2800" dirty="0"/>
           </a:p>
           <a:p>
             <a:pPr>
@@ -19711,7 +19703,7 @@
         </p:blipFill>
         <p:spPr>
           <a:xfrm>
-            <a:off x="5256000" y="3816000"/>
+            <a:off x="5970780" y="3737846"/>
             <a:ext cx="4752000" cy="2808000"/>
           </a:xfrm>
           <a:prstGeom prst="rect">
@@ -19720,6 +19712,36 @@
           <a:ln>
             <a:noFill/>
           </a:ln>
+        </p:spPr>
+      </p:pic>
+      <p:pic>
+        <p:nvPicPr>
+          <p:cNvPr id="2" name="Image 1"/>
+          <p:cNvPicPr>
+            <a:picLocks noChangeAspect="1"/>
+          </p:cNvPicPr>
+          <p:nvPr/>
+        </p:nvPicPr>
+        <p:blipFill>
+          <a:blip r:embed="rId4">
+            <a:extLst>
+              <a:ext uri="{28A0092B-C50C-407E-A947-70E740481C1C}">
+                <a14:useLocalDpi xmlns:a14="http://schemas.microsoft.com/office/drawing/2010/main" val="0"/>
+              </a:ext>
+            </a:extLst>
+          </a:blip>
+          <a:stretch>
+            <a:fillRect/>
+          </a:stretch>
+        </p:blipFill>
+        <p:spPr>
+          <a:xfrm>
+            <a:off x="1668038" y="3816000"/>
+            <a:ext cx="3776264" cy="2869961"/>
+          </a:xfrm>
+          <a:prstGeom prst="rect">
+            <a:avLst/>
+          </a:prstGeom>
         </p:spPr>
       </p:pic>
     </p:spTree>
@@ -19816,7 +19838,7 @@
               </a:rPr>
               <a:t>tâches</a:t>
             </a:r>
-            <a:endParaRPr dirty="0"/>
+            <a:endParaRPr sz="3600" dirty="0"/>
           </a:p>
         </p:txBody>
       </p:sp>
@@ -19938,7 +19960,7 @@
               </a:rPr>
               <a:t> robot)</a:t>
             </a:r>
-            <a:endParaRPr dirty="0"/>
+            <a:endParaRPr sz="2800" dirty="0"/>
           </a:p>
           <a:p>
             <a:pPr>
@@ -19991,7 +20013,7 @@
               </a:rPr>
               <a:t> parallèle</a:t>
             </a:r>
-            <a:endParaRPr dirty="0"/>
+            <a:endParaRPr sz="2800" dirty="0"/>
           </a:p>
           <a:p>
             <a:pPr>
@@ -20050,7 +20072,7 @@
               </a:rPr>
               <a:t>projet</a:t>
             </a:r>
-            <a:endParaRPr dirty="0"/>
+            <a:endParaRPr sz="2800" dirty="0"/>
           </a:p>
           <a:p>
             <a:pPr>
@@ -20109,7 +20131,7 @@
               </a:rPr>
               <a:t> le robot)</a:t>
             </a:r>
-            <a:endParaRPr dirty="0"/>
+            <a:endParaRPr sz="2800" dirty="0"/>
           </a:p>
         </p:txBody>
       </p:sp>
@@ -20239,84 +20261,84 @@
               <a:buChar char="•"/>
             </a:pPr>
             <a:r>
-              <a:rPr lang="en-US" sz="3600" dirty="0">
+              <a:rPr lang="en-US" sz="2800" dirty="0">
                 <a:latin typeface="Tw Cen MT"/>
               </a:rPr>
               <a:t> </a:t>
             </a:r>
             <a:r>
-              <a:rPr lang="en-US" sz="3600" dirty="0" err="1">
+              <a:rPr lang="en-US" sz="2800" dirty="0" err="1">
                 <a:latin typeface="Tw Cen MT"/>
               </a:rPr>
               <a:t>Déplacement</a:t>
             </a:r>
             <a:r>
-              <a:rPr lang="en-US" sz="3600" dirty="0">
+              <a:rPr lang="en-US" sz="2800" dirty="0">
                 <a:latin typeface="Tw Cen MT"/>
               </a:rPr>
               <a:t> du robot (</a:t>
             </a:r>
             <a:r>
-              <a:rPr lang="en-US" sz="3600" dirty="0" err="1">
+              <a:rPr lang="en-US" sz="2800" dirty="0" err="1">
                 <a:latin typeface="Tw Cen MT"/>
               </a:rPr>
               <a:t>avant</a:t>
             </a:r>
             <a:r>
-              <a:rPr lang="en-US" sz="3600" dirty="0">
+              <a:rPr lang="en-US" sz="2800" dirty="0">
                 <a:latin typeface="Tw Cen MT"/>
               </a:rPr>
               <a:t>, </a:t>
             </a:r>
             <a:r>
-              <a:rPr lang="en-US" sz="3600" dirty="0" err="1">
+              <a:rPr lang="en-US" sz="2800" dirty="0" err="1">
                 <a:latin typeface="Tw Cen MT"/>
               </a:rPr>
               <a:t>arrière</a:t>
             </a:r>
             <a:r>
-              <a:rPr lang="en-US" sz="3600" dirty="0">
+              <a:rPr lang="en-US" sz="2800" dirty="0">
                 <a:latin typeface="Tw Cen MT"/>
               </a:rPr>
               <a:t>, </a:t>
             </a:r>
             <a:r>
-              <a:rPr lang="en-US" sz="3600" dirty="0" err="1">
+              <a:rPr lang="en-US" sz="2800" dirty="0" err="1">
                 <a:latin typeface="Tw Cen MT"/>
               </a:rPr>
               <a:t>droite</a:t>
             </a:r>
             <a:r>
-              <a:rPr lang="en-US" sz="3600" dirty="0">
+              <a:rPr lang="en-US" sz="2800" dirty="0">
                 <a:latin typeface="Tw Cen MT"/>
               </a:rPr>
               <a:t>, gauche, demi-tour, </a:t>
             </a:r>
             <a:r>
-              <a:rPr lang="en-US" sz="3600" dirty="0" err="1">
+              <a:rPr lang="en-US" sz="2800" dirty="0" err="1">
                 <a:latin typeface="Tw Cen MT"/>
               </a:rPr>
               <a:t>choix</a:t>
             </a:r>
             <a:r>
-              <a:rPr lang="en-US" sz="3600" dirty="0">
+              <a:rPr lang="en-US" sz="2800" dirty="0">
                 <a:latin typeface="Tw Cen MT"/>
               </a:rPr>
               <a:t> </a:t>
             </a:r>
             <a:r>
-              <a:rPr lang="en-US" sz="3600" dirty="0" err="1">
+              <a:rPr lang="en-US" sz="2800" dirty="0" err="1">
                 <a:latin typeface="Tw Cen MT"/>
               </a:rPr>
               <a:t>vitesse</a:t>
             </a:r>
             <a:r>
-              <a:rPr lang="en-US" sz="3600" dirty="0">
+              <a:rPr lang="en-US" sz="2800" dirty="0">
                 <a:latin typeface="Tw Cen MT"/>
               </a:rPr>
               <a:t>)</a:t>
             </a:r>
-            <a:endParaRPr dirty="0"/>
+            <a:endParaRPr sz="2800" dirty="0"/>
           </a:p>
           <a:p>
             <a:pPr>
@@ -20328,42 +20350,42 @@
               <a:buChar char="•"/>
             </a:pPr>
             <a:r>
-              <a:rPr lang="en-US" sz="3600" dirty="0">
+              <a:rPr lang="en-US" sz="2800" dirty="0">
                 <a:latin typeface="Tw Cen MT"/>
               </a:rPr>
               <a:t> </a:t>
             </a:r>
             <a:r>
-              <a:rPr lang="en-US" sz="3600" dirty="0" err="1">
+              <a:rPr lang="en-US" sz="2800" dirty="0" err="1">
                 <a:latin typeface="Tw Cen MT"/>
               </a:rPr>
               <a:t>Réception</a:t>
             </a:r>
             <a:r>
-              <a:rPr lang="en-US" sz="3600" dirty="0">
+              <a:rPr lang="en-US" sz="2800" dirty="0">
                 <a:latin typeface="Tw Cen MT"/>
               </a:rPr>
               <a:t> </a:t>
             </a:r>
             <a:r>
-              <a:rPr lang="en-US" sz="3600" dirty="0" err="1">
+              <a:rPr lang="en-US" sz="2800" dirty="0" err="1">
                 <a:latin typeface="Tw Cen MT"/>
               </a:rPr>
               <a:t>vidéo</a:t>
             </a:r>
             <a:r>
-              <a:rPr lang="en-US" sz="3600" dirty="0">
+              <a:rPr lang="en-US" sz="2800" dirty="0">
                 <a:latin typeface="Tw Cen MT"/>
               </a:rPr>
               <a:t> </a:t>
             </a:r>
             <a:r>
-              <a:rPr lang="en-US" sz="3600" dirty="0" err="1">
+              <a:rPr lang="en-US" sz="2800" dirty="0" err="1">
                 <a:latin typeface="Tw Cen MT"/>
               </a:rPr>
               <a:t>distante</a:t>
             </a:r>
-            <a:endParaRPr dirty="0"/>
+            <a:endParaRPr sz="2800" dirty="0"/>
           </a:p>
           <a:p>
             <a:pPr>
@@ -20375,36 +20397,36 @@
               <a:buChar char="•"/>
             </a:pPr>
             <a:r>
-              <a:rPr lang="en-US" sz="3600" dirty="0">
+              <a:rPr lang="en-US" sz="2800" dirty="0">
                 <a:latin typeface="Tw Cen MT"/>
               </a:rPr>
               <a:t> Reconnaissance </a:t>
             </a:r>
             <a:r>
-              <a:rPr lang="en-US" sz="3600" dirty="0" err="1">
+              <a:rPr lang="en-US" sz="2800" dirty="0" err="1">
                 <a:latin typeface="Tw Cen MT"/>
               </a:rPr>
               <a:t>vocale</a:t>
             </a:r>
             <a:r>
-              <a:rPr lang="en-US" sz="3600" dirty="0">
+              <a:rPr lang="en-US" sz="2800" dirty="0">
                 <a:latin typeface="Tw Cen MT"/>
               </a:rPr>
               <a:t> (*</a:t>
             </a:r>
             <a:r>
-              <a:rPr lang="en-US" sz="3600" dirty="0" err="1">
+              <a:rPr lang="en-US" sz="2800" dirty="0" err="1">
                 <a:latin typeface="Tw Cen MT"/>
               </a:rPr>
               <a:t>requiert</a:t>
             </a:r>
             <a:r>
-              <a:rPr lang="en-US" sz="3600" dirty="0">
+              <a:rPr lang="en-US" sz="2800" dirty="0">
                 <a:latin typeface="Tw Cen MT"/>
               </a:rPr>
               <a:t> internet)</a:t>
             </a:r>
-            <a:endParaRPr dirty="0"/>
+            <a:endParaRPr sz="2800" dirty="0"/>
           </a:p>
         </p:txBody>
       </p:sp>
@@ -20642,7 +20664,7 @@
               </a:rPr>
               <a:t>compliqué</a:t>
             </a:r>
-            <a:endParaRPr dirty="0"/>
+            <a:endParaRPr sz="2800" dirty="0"/>
           </a:p>
           <a:p>
             <a:pPr>
@@ -20713,7 +20735,7 @@
               </a:rPr>
               <a:t>semaines</a:t>
             </a:r>
-            <a:endParaRPr dirty="0"/>
+            <a:endParaRPr sz="2800" dirty="0"/>
           </a:p>
           <a:p>
             <a:pPr>
@@ -20772,7 +20794,7 @@
               </a:rPr>
               <a:t> du robot</a:t>
             </a:r>
-            <a:endParaRPr dirty="0"/>
+            <a:endParaRPr sz="2800" dirty="0"/>
           </a:p>
           <a:p>
             <a:pPr>
@@ -20856,7 +20878,7 @@
               </a:rPr>
               <a:t>matérielles</a:t>
             </a:r>
-            <a:endParaRPr dirty="0"/>
+            <a:endParaRPr sz="2800" dirty="0"/>
           </a:p>
           <a:p>
             <a:pPr>
@@ -20982,12 +21004,12 @@
               </a:lnSpc>
             </a:pPr>
             <a:r>
-              <a:rPr lang="en-US" sz="4800" dirty="0">
+              <a:rPr lang="en-US" sz="3600" dirty="0">
                 <a:latin typeface="Tw Cen MT"/>
               </a:rPr>
               <a:t>Architecture</a:t>
             </a:r>
-            <a:endParaRPr sz="4800" dirty="0"/>
+            <a:endParaRPr sz="3600" dirty="0"/>
           </a:p>
         </p:txBody>
       </p:sp>
@@ -21165,7 +21187,7 @@
               </a:rPr>
               <a:t> Physique)</a:t>
             </a:r>
-            <a:endParaRPr dirty="0"/>
+            <a:endParaRPr sz="3600" dirty="0"/>
           </a:p>
         </p:txBody>
       </p:sp>
@@ -21288,7 +21310,7 @@
               </a:rPr>
               <a:t>Conclusion</a:t>
             </a:r>
-            <a:endParaRPr dirty="0"/>
+            <a:endParaRPr sz="3600" dirty="0"/>
           </a:p>
         </p:txBody>
       </p:sp>
@@ -21320,57 +21342,54 @@
               <a:buChar char="•"/>
             </a:pPr>
             <a:r>
-              <a:rPr lang="en-US" sz="2400" dirty="0" smtClean="0">
-                <a:solidFill>
-                  <a:schemeClr val="bg1"/>
-                </a:solidFill>
+              <a:rPr lang="en-US" sz="2800" dirty="0" smtClean="0">
                 <a:latin typeface="Tw Cen MT"/>
               </a:rPr>
               <a:t> </a:t>
             </a:r>
             <a:r>
-              <a:rPr lang="en-US" sz="2400" dirty="0" err="1" smtClean="0">
+              <a:rPr lang="en-US" sz="2800" dirty="0" err="1" smtClean="0">
                 <a:latin typeface="Tw Cen MT"/>
               </a:rPr>
               <a:t>Découverte</a:t>
             </a:r>
             <a:r>
-              <a:rPr lang="en-US" sz="2400" dirty="0" smtClean="0">
+              <a:rPr lang="en-US" sz="2800" dirty="0" smtClean="0">
                 <a:latin typeface="Tw Cen MT"/>
               </a:rPr>
               <a:t> </a:t>
             </a:r>
             <a:r>
-              <a:rPr lang="en-US" sz="2400" dirty="0" err="1">
+              <a:rPr lang="en-US" sz="2800" dirty="0" err="1">
                 <a:latin typeface="Tw Cen MT"/>
               </a:rPr>
               <a:t>intéressante</a:t>
             </a:r>
             <a:r>
-              <a:rPr lang="en-US" sz="2400" dirty="0">
+              <a:rPr lang="en-US" sz="2800" dirty="0">
                 <a:latin typeface="Tw Cen MT"/>
               </a:rPr>
               <a:t> de la </a:t>
             </a:r>
             <a:r>
-              <a:rPr lang="en-US" sz="2400" dirty="0" err="1">
+              <a:rPr lang="en-US" sz="2800" dirty="0" err="1">
                 <a:latin typeface="Tw Cen MT"/>
               </a:rPr>
               <a:t>programmation</a:t>
             </a:r>
             <a:r>
-              <a:rPr lang="en-US" sz="2400" dirty="0">
+              <a:rPr lang="en-US" sz="2800" dirty="0">
                 <a:latin typeface="Tw Cen MT"/>
               </a:rPr>
               <a:t> </a:t>
             </a:r>
             <a:r>
-              <a:rPr lang="en-US" sz="2400" dirty="0" err="1">
+              <a:rPr lang="en-US" sz="2800" dirty="0" err="1">
                 <a:latin typeface="Tw Cen MT"/>
               </a:rPr>
               <a:t>embarquée</a:t>
             </a:r>
-            <a:endParaRPr dirty="0"/>
+            <a:endParaRPr sz="2800" dirty="0"/>
           </a:p>
           <a:p>
             <a:pPr>
@@ -21382,54 +21401,54 @@
               <a:buChar char="•"/>
             </a:pPr>
             <a:r>
-              <a:rPr lang="en-US" sz="2400" dirty="0" smtClean="0">
+              <a:rPr lang="en-US" sz="2800" dirty="0" smtClean="0">
                 <a:latin typeface="Tw Cen MT"/>
               </a:rPr>
               <a:t> </a:t>
             </a:r>
             <a:r>
-              <a:rPr lang="en-US" sz="2400" dirty="0" err="1" smtClean="0">
+              <a:rPr lang="en-US" sz="2800" dirty="0" err="1" smtClean="0">
                 <a:latin typeface="Tw Cen MT"/>
               </a:rPr>
               <a:t>Apprentissage</a:t>
             </a:r>
             <a:r>
-              <a:rPr lang="en-US" sz="2400" dirty="0" smtClean="0">
+              <a:rPr lang="en-US" sz="2800" dirty="0" smtClean="0">
                 <a:latin typeface="Tw Cen MT"/>
               </a:rPr>
               <a:t> </a:t>
             </a:r>
             <a:r>
-              <a:rPr lang="en-US" sz="2400" dirty="0">
+              <a:rPr lang="en-US" sz="2800" dirty="0">
                 <a:latin typeface="Tw Cen MT"/>
               </a:rPr>
               <a:t>du </a:t>
             </a:r>
             <a:r>
-              <a:rPr lang="en-US" sz="2400" dirty="0" err="1">
+              <a:rPr lang="en-US" sz="2800" dirty="0" err="1">
                 <a:latin typeface="Tw Cen MT"/>
               </a:rPr>
               <a:t>modèle</a:t>
             </a:r>
             <a:r>
-              <a:rPr lang="en-US" sz="2400" dirty="0">
+              <a:rPr lang="en-US" sz="2800" dirty="0">
                 <a:latin typeface="Tw Cen MT"/>
               </a:rPr>
               <a:t> de </a:t>
             </a:r>
             <a:r>
-              <a:rPr lang="en-US" sz="2400" dirty="0" err="1">
+              <a:rPr lang="en-US" sz="2800" dirty="0" err="1">
                 <a:latin typeface="Tw Cen MT"/>
               </a:rPr>
               <a:t>programmation</a:t>
             </a:r>
             <a:r>
-              <a:rPr lang="en-US" sz="2400" dirty="0">
+              <a:rPr lang="en-US" sz="2800" dirty="0">
                 <a:latin typeface="Tw Cen MT"/>
               </a:rPr>
               <a:t> REST</a:t>
             </a:r>
-            <a:endParaRPr dirty="0"/>
+            <a:endParaRPr sz="2800" dirty="0"/>
           </a:p>
           <a:p>
             <a:pPr>
@@ -21441,42 +21460,42 @@
               <a:buChar char="•"/>
             </a:pPr>
             <a:r>
-              <a:rPr lang="en-US" sz="2400" dirty="0" smtClean="0">
+              <a:rPr lang="en-US" sz="2800" dirty="0" smtClean="0">
                 <a:latin typeface="Tw Cen MT"/>
               </a:rPr>
               <a:t> Issue </a:t>
             </a:r>
             <a:r>
-              <a:rPr lang="en-US" sz="2400" dirty="0">
+              <a:rPr lang="en-US" sz="2800" dirty="0">
                 <a:latin typeface="Tw Cen MT"/>
               </a:rPr>
               <a:t>du </a:t>
             </a:r>
             <a:r>
-              <a:rPr lang="en-US" sz="2400" dirty="0" err="1">
+              <a:rPr lang="en-US" sz="2800" dirty="0" err="1">
                 <a:latin typeface="Tw Cen MT"/>
               </a:rPr>
               <a:t>projet</a:t>
             </a:r>
             <a:r>
-              <a:rPr lang="en-US" sz="2400" dirty="0">
+              <a:rPr lang="en-US" sz="2800" dirty="0">
                 <a:latin typeface="Tw Cen MT"/>
               </a:rPr>
               <a:t> </a:t>
             </a:r>
             <a:r>
-              <a:rPr lang="en-US" sz="2400" dirty="0" err="1">
+              <a:rPr lang="en-US" sz="2800" dirty="0" err="1">
                 <a:latin typeface="Tw Cen MT"/>
               </a:rPr>
               <a:t>plutôt</a:t>
             </a:r>
             <a:r>
-              <a:rPr lang="en-US" sz="2400" dirty="0">
+              <a:rPr lang="en-US" sz="2800" dirty="0">
                 <a:latin typeface="Tw Cen MT"/>
               </a:rPr>
               <a:t> positive</a:t>
             </a:r>
-            <a:endParaRPr dirty="0"/>
+            <a:endParaRPr sz="2800" dirty="0"/>
           </a:p>
           <a:p>
             <a:pPr>
@@ -21488,42 +21507,42 @@
               <a:buChar char="•"/>
             </a:pPr>
             <a:r>
-              <a:rPr lang="en-US" sz="2400" dirty="0" smtClean="0">
+              <a:rPr lang="en-US" sz="2800" dirty="0" smtClean="0">
                 <a:latin typeface="Tw Cen MT"/>
               </a:rPr>
               <a:t> Bonne </a:t>
             </a:r>
             <a:r>
-              <a:rPr lang="en-US" sz="2400" dirty="0" err="1">
+              <a:rPr lang="en-US" sz="2800" dirty="0" err="1">
                 <a:latin typeface="Tw Cen MT"/>
               </a:rPr>
               <a:t>cohésion</a:t>
             </a:r>
             <a:r>
-              <a:rPr lang="en-US" sz="2400" dirty="0">
+              <a:rPr lang="en-US" sz="2800" dirty="0">
                 <a:latin typeface="Tw Cen MT"/>
               </a:rPr>
               <a:t> de </a:t>
             </a:r>
             <a:r>
-              <a:rPr lang="en-US" sz="2400" dirty="0" err="1" smtClean="0">
+              <a:rPr lang="en-US" sz="2800" dirty="0" err="1" smtClean="0">
                 <a:latin typeface="Tw Cen MT"/>
               </a:rPr>
               <a:t>groupe</a:t>
             </a:r>
             <a:r>
-              <a:rPr lang="en-US" sz="2400" dirty="0" smtClean="0">
+              <a:rPr lang="en-US" sz="2800" dirty="0" smtClean="0">
                 <a:latin typeface="Tw Cen MT"/>
               </a:rPr>
               <a:t> </a:t>
             </a:r>
             <a:r>
-              <a:rPr lang="en-US" sz="2400" dirty="0" err="1" smtClean="0">
+              <a:rPr lang="en-US" sz="2800" dirty="0" err="1" smtClean="0">
                 <a:latin typeface="Tw Cen MT"/>
               </a:rPr>
               <a:t>globalement</a:t>
             </a:r>
-            <a:endParaRPr dirty="0"/>
+            <a:endParaRPr sz="2800" dirty="0"/>
           </a:p>
         </p:txBody>
       </p:sp>

</xml_diff>

<commit_message>
Il manquait les numéros de diapositives
</commit_message>
<xml_diff>
--- a/Documents/diaporama_soutenance.pptx
+++ b/Documents/diaporama_soutenance.pptx
@@ -1,6 +1,6 @@
 
 <file path=ppt/presentation.xml><?xml version="1.0" encoding="utf-8"?>
-<p:presentation xmlns:a="http://schemas.openxmlformats.org/drawingml/2006/main" xmlns:r="http://schemas.openxmlformats.org/officeDocument/2006/relationships" xmlns:p="http://schemas.openxmlformats.org/presentationml/2006/main">
+<p:presentation xmlns:a="http://schemas.openxmlformats.org/drawingml/2006/main" xmlns:r="http://schemas.openxmlformats.org/officeDocument/2006/relationships" xmlns:p="http://schemas.openxmlformats.org/presentationml/2006/main" showSpecialPlsOnTitleSld="0">
   <p:sldMasterIdLst>
     <p:sldMasterId id="2147483674" r:id="rId1"/>
     <p:sldMasterId id="2147484118" r:id="rId2"/>
@@ -17583,6 +17583,7 @@
     <p:sldLayoutId id="2147483691" r:id="rId17"/>
     <p:sldLayoutId id="2147483692" r:id="rId18"/>
   </p:sldLayoutIdLst>
+  <p:hf hdr="0" ftr="0" dt="0"/>
   <p:txStyles>
     <p:titleStyle>
       <a:lvl1pPr algn="l" defTabSz="457200" rtl="0" eaLnBrk="1" latinLnBrk="0" hangingPunct="1">
@@ -18303,6 +18304,7 @@
     <p:sldLayoutId id="2147484128" r:id="rId10"/>
     <p:sldLayoutId id="2147484129" r:id="rId11"/>
   </p:sldLayoutIdLst>
+  <p:hf hdr="0" ftr="0" dt="0"/>
   <p:txStyles>
     <p:titleStyle>
       <a:lvl1pPr algn="l" defTabSz="914400" rtl="0" eaLnBrk="1" latinLnBrk="0" hangingPunct="1">
@@ -19313,6 +19315,41 @@
           </a:p>
         </p:txBody>
       </p:sp>
+      <p:sp>
+        <p:nvSpPr>
+          <p:cNvPr id="3" name="Espace réservé du numéro de diapositive 2"/>
+          <p:cNvSpPr>
+            <a:spLocks noGrp="1"/>
+          </p:cNvSpPr>
+          <p:nvPr>
+            <p:ph type="sldNum" sz="quarter" idx="12"/>
+          </p:nvPr>
+        </p:nvSpPr>
+        <p:spPr/>
+        <p:txBody>
+          <a:bodyPr>
+            <a:normAutofit fontScale="92500" lnSpcReduction="20000"/>
+          </a:bodyPr>
+          <a:lstStyle/>
+          <a:p>
+            <a:pPr algn="r">
+              <a:lnSpc>
+                <a:spcPct val="100000"/>
+              </a:lnSpc>
+            </a:pPr>
+            <a:r>
+              <a:rPr lang="fr-FR" sz="4000" dirty="0" smtClean="0">
+                <a:solidFill>
+                  <a:srgbClr val="FFFFFF"/>
+                </a:solidFill>
+                <a:latin typeface="Tw Cen MT"/>
+              </a:rPr>
+              <a:t>2</a:t>
+            </a:r>
+            <a:endParaRPr lang="fr-FR" sz="4000" dirty="0"/>
+          </a:p>
+        </p:txBody>
+      </p:sp>
     </p:spTree>
   </p:cSld>
   <p:clrMapOvr>
@@ -19744,6 +19781,41 @@
           </a:prstGeom>
         </p:spPr>
       </p:pic>
+      <p:sp>
+        <p:nvSpPr>
+          <p:cNvPr id="4" name="Espace réservé du numéro de diapositive 3"/>
+          <p:cNvSpPr>
+            <a:spLocks noGrp="1"/>
+          </p:cNvSpPr>
+          <p:nvPr>
+            <p:ph type="sldNum" sz="quarter" idx="12"/>
+          </p:nvPr>
+        </p:nvSpPr>
+        <p:spPr/>
+        <p:txBody>
+          <a:bodyPr>
+            <a:normAutofit fontScale="92500" lnSpcReduction="20000"/>
+          </a:bodyPr>
+          <a:lstStyle/>
+          <a:p>
+            <a:pPr algn="r">
+              <a:lnSpc>
+                <a:spcPct val="100000"/>
+              </a:lnSpc>
+            </a:pPr>
+            <a:fld id="{A1393EA7-EEEE-49D8-8F1D-758FF5FD22C6}" type="slidenum">
+              <a:rPr lang="fr-FR" sz="4000" smtClean="0">
+                <a:solidFill>
+                  <a:srgbClr val="FFFFFF"/>
+                </a:solidFill>
+                <a:latin typeface="Tw Cen MT"/>
+              </a:rPr>
+              <a:t>3</a:t>
+            </a:fld>
+            <a:endParaRPr lang="fr-FR" sz="4000" dirty="0"/>
+          </a:p>
+        </p:txBody>
+      </p:sp>
     </p:spTree>
   </p:cSld>
   <p:clrMapOvr>
@@ -20135,6 +20207,41 @@
           </a:p>
         </p:txBody>
       </p:sp>
+      <p:sp>
+        <p:nvSpPr>
+          <p:cNvPr id="3" name="Espace réservé du numéro de diapositive 2"/>
+          <p:cNvSpPr>
+            <a:spLocks noGrp="1"/>
+          </p:cNvSpPr>
+          <p:nvPr>
+            <p:ph type="sldNum" sz="quarter" idx="12"/>
+          </p:nvPr>
+        </p:nvSpPr>
+        <p:spPr/>
+        <p:txBody>
+          <a:bodyPr>
+            <a:normAutofit fontScale="92500" lnSpcReduction="20000"/>
+          </a:bodyPr>
+          <a:lstStyle/>
+          <a:p>
+            <a:pPr algn="r">
+              <a:lnSpc>
+                <a:spcPct val="100000"/>
+              </a:lnSpc>
+            </a:pPr>
+            <a:fld id="{A1393EA7-EEEE-49D8-8F1D-758FF5FD22C6}" type="slidenum">
+              <a:rPr lang="fr-FR" sz="4000" smtClean="0">
+                <a:solidFill>
+                  <a:srgbClr val="FFFFFF"/>
+                </a:solidFill>
+                <a:latin typeface="Tw Cen MT"/>
+              </a:rPr>
+              <a:t>4</a:t>
+            </a:fld>
+            <a:endParaRPr lang="fr-FR" sz="4000" dirty="0"/>
+          </a:p>
+        </p:txBody>
+      </p:sp>
     </p:spTree>
   </p:cSld>
   <p:clrMapOvr>
@@ -20467,6 +20574,41 @@
           </a:p>
         </p:txBody>
       </p:sp>
+      <p:sp>
+        <p:nvSpPr>
+          <p:cNvPr id="4" name="Espace réservé du numéro de diapositive 3"/>
+          <p:cNvSpPr>
+            <a:spLocks noGrp="1"/>
+          </p:cNvSpPr>
+          <p:nvPr>
+            <p:ph type="sldNum" sz="quarter" idx="12"/>
+          </p:nvPr>
+        </p:nvSpPr>
+        <p:spPr/>
+        <p:txBody>
+          <a:bodyPr>
+            <a:normAutofit fontScale="92500" lnSpcReduction="20000"/>
+          </a:bodyPr>
+          <a:lstStyle/>
+          <a:p>
+            <a:pPr algn="r">
+              <a:lnSpc>
+                <a:spcPct val="100000"/>
+              </a:lnSpc>
+            </a:pPr>
+            <a:fld id="{A1393EA7-EEEE-49D8-8F1D-758FF5FD22C6}" type="slidenum">
+              <a:rPr lang="fr-FR" sz="4000" smtClean="0">
+                <a:solidFill>
+                  <a:srgbClr val="FFFFFF"/>
+                </a:solidFill>
+                <a:latin typeface="Tw Cen MT"/>
+              </a:rPr>
+              <a:t>5</a:t>
+            </a:fld>
+            <a:endParaRPr lang="fr-FR" sz="4000" dirty="0"/>
+          </a:p>
+        </p:txBody>
+      </p:sp>
     </p:spTree>
   </p:cSld>
   <p:clrMapOvr>
@@ -20927,6 +21069,41 @@
           </a:p>
         </p:txBody>
       </p:sp>
+      <p:sp>
+        <p:nvSpPr>
+          <p:cNvPr id="3" name="Espace réservé du numéro de diapositive 2"/>
+          <p:cNvSpPr>
+            <a:spLocks noGrp="1"/>
+          </p:cNvSpPr>
+          <p:nvPr>
+            <p:ph type="sldNum" sz="quarter" idx="12"/>
+          </p:nvPr>
+        </p:nvSpPr>
+        <p:spPr/>
+        <p:txBody>
+          <a:bodyPr>
+            <a:normAutofit fontScale="92500" lnSpcReduction="20000"/>
+          </a:bodyPr>
+          <a:lstStyle/>
+          <a:p>
+            <a:pPr algn="r">
+              <a:lnSpc>
+                <a:spcPct val="100000"/>
+              </a:lnSpc>
+            </a:pPr>
+            <a:fld id="{A1393EA7-EEEE-49D8-8F1D-758FF5FD22C6}" type="slidenum">
+              <a:rPr lang="fr-FR" sz="4000" smtClean="0">
+                <a:solidFill>
+                  <a:srgbClr val="FFFFFF"/>
+                </a:solidFill>
+                <a:latin typeface="Tw Cen MT"/>
+              </a:rPr>
+              <a:t>6</a:t>
+            </a:fld>
+            <a:endParaRPr lang="fr-FR" sz="4000" dirty="0"/>
+          </a:p>
+        </p:txBody>
+      </p:sp>
     </p:spTree>
   </p:cSld>
   <p:clrMapOvr>
@@ -21075,6 +21252,41 @@
           </a:ln>
         </p:spPr>
       </p:pic>
+      <p:sp>
+        <p:nvSpPr>
+          <p:cNvPr id="3" name="Espace réservé du numéro de diapositive 2"/>
+          <p:cNvSpPr>
+            <a:spLocks noGrp="1"/>
+          </p:cNvSpPr>
+          <p:nvPr>
+            <p:ph type="sldNum" sz="quarter" idx="12"/>
+          </p:nvPr>
+        </p:nvSpPr>
+        <p:spPr/>
+        <p:txBody>
+          <a:bodyPr>
+            <a:normAutofit fontScale="92500" lnSpcReduction="20000"/>
+          </a:bodyPr>
+          <a:lstStyle/>
+          <a:p>
+            <a:pPr algn="r">
+              <a:lnSpc>
+                <a:spcPct val="100000"/>
+              </a:lnSpc>
+            </a:pPr>
+            <a:fld id="{A1393EA7-EEEE-49D8-8F1D-758FF5FD22C6}" type="slidenum">
+              <a:rPr lang="fr-FR" sz="4000" smtClean="0">
+                <a:solidFill>
+                  <a:srgbClr val="FFFFFF"/>
+                </a:solidFill>
+                <a:latin typeface="Tw Cen MT"/>
+              </a:rPr>
+              <a:t>7</a:t>
+            </a:fld>
+            <a:endParaRPr lang="fr-FR" sz="4000" dirty="0"/>
+          </a:p>
+        </p:txBody>
+      </p:sp>
     </p:spTree>
   </p:cSld>
   <p:clrMapOvr>
@@ -21228,6 +21440,41 @@
           </a:p>
         </p:txBody>
       </p:sp>
+      <p:sp>
+        <p:nvSpPr>
+          <p:cNvPr id="3" name="Espace réservé du numéro de diapositive 2"/>
+          <p:cNvSpPr>
+            <a:spLocks noGrp="1"/>
+          </p:cNvSpPr>
+          <p:nvPr>
+            <p:ph type="sldNum" sz="quarter" idx="12"/>
+          </p:nvPr>
+        </p:nvSpPr>
+        <p:spPr/>
+        <p:txBody>
+          <a:bodyPr>
+            <a:normAutofit fontScale="92500" lnSpcReduction="20000"/>
+          </a:bodyPr>
+          <a:lstStyle/>
+          <a:p>
+            <a:pPr algn="r">
+              <a:lnSpc>
+                <a:spcPct val="100000"/>
+              </a:lnSpc>
+            </a:pPr>
+            <a:fld id="{A1393EA7-EEEE-49D8-8F1D-758FF5FD22C6}" type="slidenum">
+              <a:rPr lang="fr-FR" sz="4000" smtClean="0">
+                <a:solidFill>
+                  <a:srgbClr val="FFFFFF"/>
+                </a:solidFill>
+                <a:latin typeface="Tw Cen MT"/>
+              </a:rPr>
+              <a:t>8</a:t>
+            </a:fld>
+            <a:endParaRPr lang="fr-FR" sz="4000" dirty="0"/>
+          </a:p>
+        </p:txBody>
+      </p:sp>
     </p:spTree>
   </p:cSld>
   <p:clrMapOvr>
@@ -21580,6 +21827,41 @@
               <a:t>9</a:t>
             </a:fld>
             <a:endParaRPr/>
+          </a:p>
+        </p:txBody>
+      </p:sp>
+      <p:sp>
+        <p:nvSpPr>
+          <p:cNvPr id="3" name="Espace réservé du numéro de diapositive 2"/>
+          <p:cNvSpPr>
+            <a:spLocks noGrp="1"/>
+          </p:cNvSpPr>
+          <p:nvPr>
+            <p:ph type="sldNum" sz="quarter" idx="12"/>
+          </p:nvPr>
+        </p:nvSpPr>
+        <p:spPr/>
+        <p:txBody>
+          <a:bodyPr>
+            <a:normAutofit fontScale="92500" lnSpcReduction="20000"/>
+          </a:bodyPr>
+          <a:lstStyle/>
+          <a:p>
+            <a:pPr algn="r">
+              <a:lnSpc>
+                <a:spcPct val="100000"/>
+              </a:lnSpc>
+            </a:pPr>
+            <a:fld id="{A1393EA7-EEEE-49D8-8F1D-758FF5FD22C6}" type="slidenum">
+              <a:rPr lang="fr-FR" sz="4400" smtClean="0">
+                <a:solidFill>
+                  <a:srgbClr val="FFFFFF"/>
+                </a:solidFill>
+                <a:latin typeface="Tw Cen MT"/>
+              </a:rPr>
+              <a:t>9</a:t>
+            </a:fld>
+            <a:endParaRPr lang="fr-FR" sz="4400" dirty="0"/>
           </a:p>
         </p:txBody>
       </p:sp>

</xml_diff>